<commit_message>
added changes to finalpresentation
</commit_message>
<xml_diff>
--- a/final/presentation.pptx
+++ b/final/presentation.pptx
@@ -12,13 +12,13 @@
     <p:sldId id="266" r:id="rId3"/>
     <p:sldId id="259" r:id="rId4"/>
     <p:sldId id="257" r:id="rId5"/>
-    <p:sldId id="260" r:id="rId6"/>
-    <p:sldId id="261" r:id="rId7"/>
-    <p:sldId id="262" r:id="rId8"/>
-    <p:sldId id="268" r:id="rId9"/>
-    <p:sldId id="263" r:id="rId10"/>
-    <p:sldId id="264" r:id="rId11"/>
-    <p:sldId id="265" r:id="rId12"/>
+    <p:sldId id="265" r:id="rId6"/>
+    <p:sldId id="260" r:id="rId7"/>
+    <p:sldId id="261" r:id="rId8"/>
+    <p:sldId id="262" r:id="rId9"/>
+    <p:sldId id="268" r:id="rId10"/>
+    <p:sldId id="263" r:id="rId11"/>
+    <p:sldId id="264" r:id="rId12"/>
   </p:sldIdLst>
   <p:sldSz cx="9144000" cy="6858000" type="screen4x3"/>
   <p:notesSz cx="6858000" cy="9144000"/>
@@ -218,28 +218,6 @@
         </a:ln>
         <a:effectLst/>
       </c:spPr>
-      <c:txPr>
-        <a:bodyPr rot="0" spcFirstLastPara="1" vertOverflow="ellipsis" vert="horz" wrap="square" anchor="ctr" anchorCtr="1"/>
-        <a:lstStyle/>
-        <a:p>
-          <a:pPr>
-            <a:defRPr sz="1400" b="1" i="0" u="none" strike="noStrike" kern="1200" spc="-1" baseline="0">
-              <a:solidFill>
-                <a:schemeClr val="tx1"/>
-              </a:solidFill>
-              <a:uFill>
-                <a:solidFill>
-                  <a:srgbClr val="FFFFFF"/>
-                </a:solidFill>
-              </a:uFill>
-              <a:latin typeface="Calibri"/>
-              <a:ea typeface="+mn-ea"/>
-              <a:cs typeface="+mn-cs"/>
-            </a:defRPr>
-          </a:pPr>
-          <a:endParaRPr lang="de-DE"/>
-        </a:p>
-      </c:txPr>
     </c:title>
     <c:autoTitleDeleted val="0"/>
     <c:plotArea>
@@ -611,23 +589,6 @@
             </a:ln>
             <a:effectLst/>
           </c:spPr>
-          <c:txPr>
-            <a:bodyPr rot="0" spcFirstLastPara="1" vertOverflow="ellipsis" vert="horz" wrap="square" anchor="ctr" anchorCtr="1"/>
-            <a:lstStyle/>
-            <a:p>
-              <a:pPr>
-                <a:defRPr sz="1000" b="1" i="0" u="none" strike="noStrike" kern="1200" baseline="0">
-                  <a:solidFill>
-                    <a:schemeClr val="tx1"/>
-                  </a:solidFill>
-                  <a:latin typeface="+mn-lt"/>
-                  <a:ea typeface="+mn-ea"/>
-                  <a:cs typeface="+mn-cs"/>
-                </a:defRPr>
-              </a:pPr>
-              <a:endParaRPr lang="de-DE"/>
-            </a:p>
-          </c:txPr>
         </c:title>
         <c:numFmt formatCode="m/d/yyyy" sourceLinked="1"/>
         <c:majorTickMark val="out"/>
@@ -722,23 +683,6 @@
             </a:ln>
             <a:effectLst/>
           </c:spPr>
-          <c:txPr>
-            <a:bodyPr rot="-5400000" spcFirstLastPara="1" vertOverflow="ellipsis" vert="horz" wrap="square" anchor="ctr" anchorCtr="1"/>
-            <a:lstStyle/>
-            <a:p>
-              <a:pPr>
-                <a:defRPr sz="1000" b="1" i="0" u="none" strike="noStrike" kern="1200" baseline="0">
-                  <a:solidFill>
-                    <a:schemeClr val="tx1"/>
-                  </a:solidFill>
-                  <a:latin typeface="+mn-lt"/>
-                  <a:ea typeface="+mn-ea"/>
-                  <a:cs typeface="+mn-cs"/>
-                </a:defRPr>
-              </a:pPr>
-              <a:endParaRPr lang="de-DE"/>
-            </a:p>
-          </c:txPr>
         </c:title>
         <c:numFmt formatCode="0" sourceLinked="0"/>
         <c:majorTickMark val="none"/>
@@ -842,7 +786,7 @@
       <a:endParaRPr lang="de-DE"/>
     </a:p>
   </c:txPr>
-  <c:externalData r:id="rId3">
+  <c:externalData r:id="rId1">
     <c:autoUpdate val="0"/>
   </c:externalData>
 </c:chartSpace>
@@ -1536,466 +1480,7 @@
 </cs:colorStyle>
 </file>
 
-<file path=ppt/charts/colors2.xml><?xml version="1.0" encoding="utf-8"?>
-<cs:colorStyle xmlns:cs="http://schemas.microsoft.com/office/drawing/2012/chartStyle" xmlns:a="http://schemas.openxmlformats.org/drawingml/2006/main" meth="cycle" id="20">
-  <a:schemeClr val="dk1"/>
-  <cs:variation>
-    <a:tint val="88500"/>
-  </cs:variation>
-  <cs:variation>
-    <a:tint val="55000"/>
-  </cs:variation>
-  <cs:variation>
-    <a:tint val="75000"/>
-  </cs:variation>
-  <cs:variation>
-    <a:tint val="98500"/>
-  </cs:variation>
-  <cs:variation>
-    <a:tint val="30000"/>
-  </cs:variation>
-  <cs:variation>
-    <a:tint val="60000"/>
-  </cs:variation>
-  <cs:variation>
-    <a:tint val="80000"/>
-  </cs:variation>
-</cs:colorStyle>
-</file>
-
 <file path=ppt/charts/style1.xml><?xml version="1.0" encoding="utf-8"?>
-<cs:chartStyle xmlns:cs="http://schemas.microsoft.com/office/drawing/2012/chartStyle" xmlns:a="http://schemas.openxmlformats.org/drawingml/2006/main" id="2">
-  <cs:axisTitle>
-    <cs:lnRef idx="0"/>
-    <cs:fillRef idx="0"/>
-    <cs:effectRef idx="0"/>
-    <cs:fontRef idx="minor">
-      <a:schemeClr val="tx1"/>
-    </cs:fontRef>
-    <cs:defRPr sz="1000" b="1" kern="1200"/>
-  </cs:axisTitle>
-  <cs:categoryAxis>
-    <cs:lnRef idx="1">
-      <a:schemeClr val="tx1"/>
-    </cs:lnRef>
-    <cs:fillRef idx="0"/>
-    <cs:effectRef idx="0"/>
-    <cs:fontRef idx="minor">
-      <a:schemeClr val="tx1"/>
-    </cs:fontRef>
-    <cs:spPr>
-      <a:ln>
-        <a:round/>
-      </a:ln>
-    </cs:spPr>
-    <cs:defRPr sz="1000" kern="1200"/>
-  </cs:categoryAxis>
-  <cs:chartArea mods="allowNoFillOverride allowNoLineOverride">
-    <cs:lnRef idx="1">
-      <a:schemeClr val="tx1">
-        <a:tint val="75000"/>
-      </a:schemeClr>
-    </cs:lnRef>
-    <cs:fillRef idx="1">
-      <a:schemeClr val="bg1"/>
-    </cs:fillRef>
-    <cs:effectRef idx="0"/>
-    <cs:fontRef idx="minor">
-      <a:schemeClr val="tx1"/>
-    </cs:fontRef>
-    <cs:spPr>
-      <a:ln>
-        <a:round/>
-      </a:ln>
-    </cs:spPr>
-    <cs:defRPr sz="1000" kern="1200"/>
-  </cs:chartArea>
-  <cs:dataLabel>
-    <cs:lnRef idx="0"/>
-    <cs:fillRef idx="0"/>
-    <cs:effectRef idx="0"/>
-    <cs:fontRef idx="minor">
-      <a:schemeClr val="tx1"/>
-    </cs:fontRef>
-    <cs:defRPr sz="1000" kern="1200"/>
-  </cs:dataLabel>
-  <cs:dataLabelCallout>
-    <cs:lnRef idx="0"/>
-    <cs:fillRef idx="0"/>
-    <cs:effectRef idx="0"/>
-    <cs:fontRef idx="minor">
-      <a:schemeClr val="dk1"/>
-    </cs:fontRef>
-    <cs:spPr>
-      <a:solidFill>
-        <a:schemeClr val="lt1"/>
-      </a:solidFill>
-      <a:ln>
-        <a:solidFill>
-          <a:schemeClr val="dk1">
-            <a:lumMod val="65000"/>
-            <a:lumOff val="35000"/>
-          </a:schemeClr>
-        </a:solidFill>
-      </a:ln>
-    </cs:spPr>
-    <cs:defRPr sz="1000" kern="1200"/>
-  </cs:dataLabelCallout>
-  <cs:dataPoint>
-    <cs:lnRef idx="0"/>
-    <cs:fillRef idx="1">
-      <cs:styleClr val="auto"/>
-    </cs:fillRef>
-    <cs:effectRef idx="0"/>
-    <cs:fontRef idx="minor">
-      <a:schemeClr val="tx1"/>
-    </cs:fontRef>
-  </cs:dataPoint>
-  <cs:dataPoint3D>
-    <cs:lnRef idx="0"/>
-    <cs:fillRef idx="1">
-      <cs:styleClr val="auto"/>
-    </cs:fillRef>
-    <cs:effectRef idx="0"/>
-    <cs:fontRef idx="minor">
-      <a:schemeClr val="tx1"/>
-    </cs:fontRef>
-  </cs:dataPoint3D>
-  <cs:dataPointLine>
-    <cs:lnRef idx="1">
-      <cs:styleClr val="auto"/>
-    </cs:lnRef>
-    <cs:lineWidthScale>3</cs:lineWidthScale>
-    <cs:fillRef idx="0"/>
-    <cs:effectRef idx="0"/>
-    <cs:fontRef idx="minor">
-      <a:schemeClr val="tx1"/>
-    </cs:fontRef>
-    <cs:spPr>
-      <a:ln cap="rnd">
-        <a:round/>
-      </a:ln>
-    </cs:spPr>
-  </cs:dataPointLine>
-  <cs:dataPointMarker>
-    <cs:lnRef idx="1">
-      <cs:styleClr val="auto"/>
-    </cs:lnRef>
-    <cs:fillRef idx="1">
-      <cs:styleClr val="auto"/>
-    </cs:fillRef>
-    <cs:effectRef idx="0"/>
-    <cs:fontRef idx="minor">
-      <a:schemeClr val="tx1"/>
-    </cs:fontRef>
-    <cs:spPr>
-      <a:ln>
-        <a:round/>
-      </a:ln>
-    </cs:spPr>
-  </cs:dataPointMarker>
-  <cs:dataPointMarkerLayout/>
-  <cs:dataPointWireframe>
-    <cs:lnRef idx="1">
-      <cs:styleClr val="auto"/>
-    </cs:lnRef>
-    <cs:fillRef idx="0"/>
-    <cs:effectRef idx="0"/>
-    <cs:fontRef idx="minor">
-      <a:schemeClr val="tx1"/>
-    </cs:fontRef>
-    <cs:spPr>
-      <a:ln>
-        <a:round/>
-      </a:ln>
-    </cs:spPr>
-  </cs:dataPointWireframe>
-  <cs:dataTable>
-    <cs:lnRef idx="1">
-      <a:schemeClr val="tx1">
-        <a:tint val="75000"/>
-      </a:schemeClr>
-    </cs:lnRef>
-    <cs:fillRef idx="0"/>
-    <cs:effectRef idx="0"/>
-    <cs:fontRef idx="minor">
-      <a:schemeClr val="tx1"/>
-    </cs:fontRef>
-    <cs:spPr>
-      <a:ln>
-        <a:round/>
-      </a:ln>
-    </cs:spPr>
-    <cs:defRPr sz="1000" kern="1200"/>
-  </cs:dataTable>
-  <cs:downBar>
-    <cs:lnRef idx="1">
-      <a:schemeClr val="tx1"/>
-    </cs:lnRef>
-    <cs:fillRef idx="1">
-      <a:schemeClr val="dk1">
-        <a:tint val="95000"/>
-      </a:schemeClr>
-    </cs:fillRef>
-    <cs:effectRef idx="0"/>
-    <cs:fontRef idx="minor">
-      <a:schemeClr val="tx1"/>
-    </cs:fontRef>
-    <cs:spPr>
-      <a:ln>
-        <a:round/>
-      </a:ln>
-    </cs:spPr>
-  </cs:downBar>
-  <cs:dropLine>
-    <cs:lnRef idx="1">
-      <a:schemeClr val="tx1"/>
-    </cs:lnRef>
-    <cs:fillRef idx="0"/>
-    <cs:effectRef idx="0"/>
-    <cs:fontRef idx="minor">
-      <a:schemeClr val="tx1"/>
-    </cs:fontRef>
-    <cs:spPr>
-      <a:ln>
-        <a:round/>
-      </a:ln>
-    </cs:spPr>
-  </cs:dropLine>
-  <cs:errorBar>
-    <cs:lnRef idx="1">
-      <a:schemeClr val="tx1"/>
-    </cs:lnRef>
-    <cs:fillRef idx="1">
-      <a:schemeClr val="tx1"/>
-    </cs:fillRef>
-    <cs:effectRef idx="0"/>
-    <cs:fontRef idx="minor">
-      <a:schemeClr val="tx1"/>
-    </cs:fontRef>
-    <cs:spPr>
-      <a:ln>
-        <a:round/>
-      </a:ln>
-    </cs:spPr>
-  </cs:errorBar>
-  <cs:floor>
-    <cs:lnRef idx="1">
-      <a:schemeClr val="tx1">
-        <a:tint val="75000"/>
-      </a:schemeClr>
-    </cs:lnRef>
-    <cs:fillRef idx="0"/>
-    <cs:effectRef idx="0"/>
-    <cs:fontRef idx="minor">
-      <a:schemeClr val="tx1"/>
-    </cs:fontRef>
-    <cs:spPr>
-      <a:ln>
-        <a:round/>
-      </a:ln>
-    </cs:spPr>
-  </cs:floor>
-  <cs:gridlineMajor>
-    <cs:lnRef idx="1">
-      <a:schemeClr val="tx1"/>
-    </cs:lnRef>
-    <cs:fillRef idx="0"/>
-    <cs:effectRef idx="0"/>
-    <cs:fontRef idx="minor">
-      <a:schemeClr val="tx1"/>
-    </cs:fontRef>
-    <cs:spPr>
-      <a:ln>
-        <a:round/>
-      </a:ln>
-    </cs:spPr>
-  </cs:gridlineMajor>
-  <cs:gridlineMinor>
-    <cs:lnRef idx="1">
-      <a:schemeClr val="tx1">
-        <a:tint val="50000"/>
-      </a:schemeClr>
-    </cs:lnRef>
-    <cs:fillRef idx="0"/>
-    <cs:effectRef idx="0"/>
-    <cs:fontRef idx="minor">
-      <a:schemeClr val="tx1"/>
-    </cs:fontRef>
-    <cs:spPr>
-      <a:ln>
-        <a:round/>
-      </a:ln>
-    </cs:spPr>
-  </cs:gridlineMinor>
-  <cs:hiLoLine>
-    <cs:lnRef idx="1">
-      <a:schemeClr val="tx1"/>
-    </cs:lnRef>
-    <cs:fillRef idx="0"/>
-    <cs:effectRef idx="0"/>
-    <cs:fontRef idx="minor">
-      <a:schemeClr val="tx1"/>
-    </cs:fontRef>
-    <cs:spPr>
-      <a:ln>
-        <a:round/>
-      </a:ln>
-    </cs:spPr>
-  </cs:hiLoLine>
-  <cs:leaderLine>
-    <cs:lnRef idx="1">
-      <a:schemeClr val="tx1"/>
-    </cs:lnRef>
-    <cs:fillRef idx="0"/>
-    <cs:effectRef idx="0"/>
-    <cs:fontRef idx="minor">
-      <a:schemeClr val="tx1"/>
-    </cs:fontRef>
-    <cs:spPr>
-      <a:ln>
-        <a:round/>
-      </a:ln>
-    </cs:spPr>
-  </cs:leaderLine>
-  <cs:legend>
-    <cs:lnRef idx="0"/>
-    <cs:fillRef idx="0"/>
-    <cs:effectRef idx="0"/>
-    <cs:fontRef idx="minor">
-      <a:schemeClr val="tx1"/>
-    </cs:fontRef>
-    <cs:defRPr sz="1000" kern="1200"/>
-  </cs:legend>
-  <cs:plotArea mods="allowNoFillOverride allowNoLineOverride">
-    <cs:lnRef idx="0"/>
-    <cs:fillRef idx="1">
-      <a:schemeClr val="bg1"/>
-    </cs:fillRef>
-    <cs:effectRef idx="0"/>
-    <cs:fontRef idx="minor">
-      <a:schemeClr val="tx1"/>
-    </cs:fontRef>
-  </cs:plotArea>
-  <cs:plotArea3D>
-    <cs:lnRef idx="0"/>
-    <cs:fillRef idx="0"/>
-    <cs:effectRef idx="0"/>
-    <cs:fontRef idx="minor">
-      <a:schemeClr val="tx1"/>
-    </cs:fontRef>
-  </cs:plotArea3D>
-  <cs:seriesAxis>
-    <cs:lnRef idx="1">
-      <a:schemeClr val="tx1"/>
-    </cs:lnRef>
-    <cs:fillRef idx="0"/>
-    <cs:effectRef idx="0"/>
-    <cs:fontRef idx="minor">
-      <a:schemeClr val="tx1"/>
-    </cs:fontRef>
-    <cs:spPr>
-      <a:ln>
-        <a:round/>
-      </a:ln>
-    </cs:spPr>
-    <cs:defRPr sz="1000" kern="1200"/>
-  </cs:seriesAxis>
-  <cs:seriesLine>
-    <cs:lnRef idx="1">
-      <a:schemeClr val="tx1"/>
-    </cs:lnRef>
-    <cs:fillRef idx="0"/>
-    <cs:effectRef idx="0"/>
-    <cs:fontRef idx="minor">
-      <a:schemeClr val="tx1"/>
-    </cs:fontRef>
-    <cs:spPr>
-      <a:ln>
-        <a:round/>
-      </a:ln>
-    </cs:spPr>
-  </cs:seriesLine>
-  <cs:title>
-    <cs:lnRef idx="0"/>
-    <cs:fillRef idx="0"/>
-    <cs:effectRef idx="0"/>
-    <cs:fontRef idx="minor">
-      <a:schemeClr val="tx1"/>
-    </cs:fontRef>
-    <cs:defRPr sz="1000" b="1" kern="1200"/>
-  </cs:title>
-  <cs:trendline>
-    <cs:lnRef idx="1">
-      <a:schemeClr val="tx1"/>
-    </cs:lnRef>
-    <cs:fillRef idx="0"/>
-    <cs:effectRef idx="0"/>
-    <cs:fontRef idx="minor">
-      <a:schemeClr val="tx1"/>
-    </cs:fontRef>
-    <cs:spPr>
-      <a:ln cap="rnd">
-        <a:round/>
-      </a:ln>
-    </cs:spPr>
-  </cs:trendline>
-  <cs:trendlineLabel>
-    <cs:lnRef idx="0"/>
-    <cs:fillRef idx="0"/>
-    <cs:effectRef idx="0"/>
-    <cs:fontRef idx="minor">
-      <a:schemeClr val="tx1"/>
-    </cs:fontRef>
-    <cs:defRPr sz="1000" kern="1200"/>
-  </cs:trendlineLabel>
-  <cs:upBar>
-    <cs:lnRef idx="1">
-      <a:schemeClr val="tx1"/>
-    </cs:lnRef>
-    <cs:fillRef idx="1">
-      <a:schemeClr val="dk1">
-        <a:tint val="5000"/>
-      </a:schemeClr>
-    </cs:fillRef>
-    <cs:effectRef idx="0"/>
-    <cs:fontRef idx="minor">
-      <a:schemeClr val="tx1"/>
-    </cs:fontRef>
-    <cs:spPr>
-      <a:ln>
-        <a:round/>
-      </a:ln>
-    </cs:spPr>
-  </cs:upBar>
-  <cs:valueAxis>
-    <cs:lnRef idx="1">
-      <a:schemeClr val="tx1"/>
-    </cs:lnRef>
-    <cs:fillRef idx="0"/>
-    <cs:effectRef idx="0"/>
-    <cs:fontRef idx="minor">
-      <a:schemeClr val="tx1"/>
-    </cs:fontRef>
-    <cs:spPr>
-      <a:ln>
-        <a:round/>
-      </a:ln>
-    </cs:spPr>
-    <cs:defRPr sz="1000" kern="1200"/>
-  </cs:valueAxis>
-  <cs:wall>
-    <cs:lnRef idx="0"/>
-    <cs:fillRef idx="0"/>
-    <cs:effectRef idx="0"/>
-    <cs:fontRef idx="minor">
-      <a:schemeClr val="tx1"/>
-    </cs:fontRef>
-  </cs:wall>
-</cs:chartStyle>
-</file>
-
-<file path=ppt/charts/style2.xml><?xml version="1.0" encoding="utf-8"?>
 <cs:chartStyle xmlns:cs="http://schemas.microsoft.com/office/drawing/2012/chartStyle" xmlns:a="http://schemas.openxmlformats.org/drawingml/2006/main" id="297">
   <cs:axisTitle>
     <cs:lnRef idx="0"/>
@@ -2582,7 +2067,7 @@
           <a:p>
             <a:fld id="{8525EBD8-2338-401D-BEBD-1C4CA260E0A3}" type="datetimeFigureOut">
               <a:rPr lang="de-DE" smtClean="0"/>
-              <a:t>01.09.2016</a:t>
+              <a:t>08.09.2016</a:t>
             </a:fld>
             <a:endParaRPr lang="de-DE"/>
           </a:p>
@@ -2677,7 +2162,6 @@
               <a:rPr lang="de-DE"/>
               <a:t>Fünfte Ebene</a:t>
             </a:r>
-            <a:endParaRPr lang="de-DE"/>
           </a:p>
         </p:txBody>
       </p:sp>
@@ -3211,7 +2695,7 @@
           <a:p>
             <a:fld id="{F95B695E-2CB7-4AE2-A912-DE1F0704EC18}" type="datetimeFigureOut">
               <a:rPr lang="de-DE" smtClean="0"/>
-              <a:t>01.09.2016</a:t>
+              <a:t>08.09.2016</a:t>
             </a:fld>
             <a:endParaRPr lang="de-DE"/>
           </a:p>
@@ -4365,14 +3849,19 @@
             <p:ph type="title"/>
           </p:nvPr>
         </p:nvSpPr>
-        <p:spPr/>
+        <p:spPr>
+          <a:xfrm>
+            <a:off x="250825" y="-5936"/>
+            <a:ext cx="8750331" cy="857250"/>
+          </a:xfrm>
+        </p:spPr>
         <p:txBody>
           <a:bodyPr/>
           <a:lstStyle/>
           <a:p>
             <a:r>
               <a:rPr lang="de-DE" dirty="0"/>
-              <a:t>Graph von Ansicht</a:t>
+              <a:t>Qualitätssicherung</a:t>
             </a:r>
           </a:p>
         </p:txBody>
@@ -4386,7 +3875,7 @@
         <p:spPr>
           <a:xfrm>
             <a:off x="628650" y="1690689"/>
-            <a:ext cx="7674601" cy="369332"/>
+            <a:ext cx="6448240" cy="369332"/>
           </a:xfrm>
           <a:prstGeom prst="rect">
             <a:avLst/>
@@ -4401,15 +3890,15 @@
           <a:p>
             <a:r>
               <a:rPr lang="de-DE" dirty="0"/>
-              <a:t>Erweiterbarer </a:t>
+              <a:t>Viele Fehler waren bereits aus der </a:t>
             </a:r>
             <a:r>
               <a:rPr lang="de-DE" dirty="0" err="1"/>
-              <a:t>GraphViewer</a:t>
+              <a:t>Implementierungphase</a:t>
             </a:r>
             <a:r>
               <a:rPr lang="de-DE" dirty="0"/>
-              <a:t> zur Visualisierung von JOANA-Abhängigkeitsgraphen</a:t>
+              <a:t> bekannt.</a:t>
             </a:r>
           </a:p>
         </p:txBody>
@@ -4422,8 +3911,8 @@
         </p:nvSpPr>
         <p:spPr>
           <a:xfrm>
-            <a:off x="628650" y="2817845"/>
-            <a:ext cx="5048113" cy="923330"/>
+            <a:off x="628650" y="4905843"/>
+            <a:ext cx="5728996" cy="923330"/>
           </a:xfrm>
           <a:prstGeom prst="rect">
             <a:avLst/>
@@ -4431,7 +3920,7 @@
           <a:noFill/>
         </p:spPr>
         <p:txBody>
-          <a:bodyPr wrap="none" rtlCol="0">
+          <a:bodyPr wrap="square" rtlCol="0">
             <a:spAutoFit/>
           </a:bodyPr>
           <a:lstStyle/>
@@ -4444,9 +3933,18 @@
               <a:buChar char="§"/>
             </a:pPr>
             <a:r>
+              <a:rPr lang="de-DE" dirty="0" err="1"/>
+              <a:t>JUnit</a:t>
+            </a:r>
+            <a:r>
               <a:rPr lang="de-DE" dirty="0"/>
-              <a:t>Alle Pflichtkriterien umgesetzt</a:t>
-            </a:r>
+              <a:t> Testfälle für einzelne </a:t>
+            </a:r>
+            <a:r>
+              <a:rPr lang="de-DE" dirty="0" err="1"/>
+              <a:t>Plugins</a:t>
+            </a:r>
+            <a:endParaRPr lang="de-DE" dirty="0"/>
           </a:p>
           <a:p>
             <a:pPr marL="285750" indent="-285750">
@@ -4458,7 +3956,7 @@
             </a:pPr>
             <a:r>
               <a:rPr lang="de-DE" dirty="0"/>
-              <a:t>Alle nichtfunktionalen Anforderungen umgesetzt</a:t>
+              <a:t>Testszenarien </a:t>
             </a:r>
           </a:p>
           <a:p>
@@ -4471,20 +3969,105 @@
             </a:pPr>
             <a:r>
               <a:rPr lang="de-DE" dirty="0"/>
-              <a:t>Einfach erweiterbar durch neue </a:t>
-            </a:r>
-            <a:r>
-              <a:rPr lang="de-DE" dirty="0" err="1"/>
-              <a:t>Plugins</a:t>
-            </a:r>
-            <a:endParaRPr lang="de-DE" dirty="0"/>
-          </a:p>
-        </p:txBody>
-      </p:sp>
+              <a:t>Codeüberdeckung von 76,2%</a:t>
+            </a:r>
+          </a:p>
+        </p:txBody>
+      </p:sp>
+      <p:pic>
+        <p:nvPicPr>
+          <p:cNvPr id="6" name="Grafik 5"/>
+          <p:cNvPicPr>
+            <a:picLocks noChangeAspect="1"/>
+          </p:cNvPicPr>
+          <p:nvPr/>
+        </p:nvPicPr>
+        <p:blipFill>
+          <a:blip r:embed="rId2">
+            <a:extLst>
+              <a:ext uri="{28A0092B-C50C-407E-A947-70E740481C1C}">
+                <a14:useLocalDpi xmlns:a14="http://schemas.microsoft.com/office/drawing/2010/main" val="0"/>
+              </a:ext>
+            </a:extLst>
+          </a:blip>
+          <a:stretch>
+            <a:fillRect/>
+          </a:stretch>
+        </p:blipFill>
+        <p:spPr>
+          <a:xfrm>
+            <a:off x="964552" y="2746714"/>
+            <a:ext cx="1625741" cy="650296"/>
+          </a:xfrm>
+          <a:prstGeom prst="rect">
+            <a:avLst/>
+          </a:prstGeom>
+        </p:spPr>
+      </p:pic>
+      <p:sp>
+        <p:nvSpPr>
+          <p:cNvPr id="7" name="Textfeld 6"/>
+          <p:cNvSpPr txBox="1"/>
+          <p:nvPr/>
+        </p:nvSpPr>
+        <p:spPr>
+          <a:xfrm>
+            <a:off x="6357646" y="2746710"/>
+            <a:ext cx="2268891" cy="769441"/>
+          </a:xfrm>
+          <a:prstGeom prst="rect">
+            <a:avLst/>
+          </a:prstGeom>
+          <a:noFill/>
+        </p:spPr>
+        <p:txBody>
+          <a:bodyPr wrap="none" rtlCol="0">
+            <a:spAutoFit/>
+          </a:bodyPr>
+          <a:lstStyle/>
+          <a:p>
+            <a:r>
+              <a:rPr lang="de-DE" sz="4400" dirty="0" err="1"/>
+              <a:t>EclEmma</a:t>
+            </a:r>
+            <a:endParaRPr lang="de-DE" sz="4400" dirty="0"/>
+          </a:p>
+        </p:txBody>
+      </p:sp>
+      <p:pic>
+        <p:nvPicPr>
+          <p:cNvPr id="5" name="Grafik 4"/>
+          <p:cNvPicPr>
+            <a:picLocks noChangeAspect="1"/>
+          </p:cNvPicPr>
+          <p:nvPr/>
+        </p:nvPicPr>
+        <p:blipFill>
+          <a:blip r:embed="rId3">
+            <a:extLst>
+              <a:ext uri="{28A0092B-C50C-407E-A947-70E740481C1C}">
+                <a14:useLocalDpi xmlns:a14="http://schemas.microsoft.com/office/drawing/2010/main" val="0"/>
+              </a:ext>
+            </a:extLst>
+          </a:blip>
+          <a:stretch>
+            <a:fillRect/>
+          </a:stretch>
+        </p:blipFill>
+        <p:spPr>
+          <a:xfrm>
+            <a:off x="3673491" y="2360147"/>
+            <a:ext cx="1905000" cy="1857375"/>
+          </a:xfrm>
+          <a:prstGeom prst="rect">
+            <a:avLst/>
+          </a:prstGeom>
+        </p:spPr>
+      </p:pic>
     </p:spTree>
     <p:extLst>
       <p:ext uri="{BB962C8B-B14F-4D97-AF65-F5344CB8AC3E}">
-        <p14:creationId xmlns:p14="http://schemas.microsoft.com/office/powerpoint/2010/main" val="3737024079"/>
+        <p14:creationId xmlns:p14="http://schemas.microsoft.com/office/powerpoint/2010/main" val="1427434407"/>
       </p:ext>
     </p:extLst>
   </p:cSld>
@@ -4528,45 +4111,15 @@
           <a:p>
             <a:r>
               <a:rPr lang="de-DE" dirty="0"/>
-              <a:t>Live-demo</a:t>
-            </a:r>
-          </a:p>
-        </p:txBody>
-      </p:sp>
-      <p:pic>
-        <p:nvPicPr>
-          <p:cNvPr id="3" name="Grafik 2"/>
-          <p:cNvPicPr>
-            <a:picLocks noChangeAspect="1"/>
-          </p:cNvPicPr>
-          <p:nvPr/>
-        </p:nvPicPr>
-        <p:blipFill>
-          <a:blip r:embed="rId2">
-            <a:extLst>
-              <a:ext uri="{28A0092B-C50C-407E-A947-70E740481C1C}">
-                <a14:useLocalDpi xmlns:a14="http://schemas.microsoft.com/office/drawing/2010/main" val="0"/>
-              </a:ext>
-            </a:extLst>
-          </a:blip>
-          <a:stretch>
-            <a:fillRect/>
-          </a:stretch>
-        </p:blipFill>
-        <p:spPr>
-          <a:xfrm>
-            <a:off x="1682563" y="1529319"/>
-            <a:ext cx="5886856" cy="4672766"/>
-          </a:xfrm>
-          <a:prstGeom prst="rect">
-            <a:avLst/>
-          </a:prstGeom>
-        </p:spPr>
-      </p:pic>
+              <a:t>Fazit</a:t>
+            </a:r>
+          </a:p>
+        </p:txBody>
+      </p:sp>
     </p:spTree>
     <p:extLst>
       <p:ext uri="{BB962C8B-B14F-4D97-AF65-F5344CB8AC3E}">
-        <p14:creationId xmlns:p14="http://schemas.microsoft.com/office/powerpoint/2010/main" val="2174044139"/>
+        <p14:creationId xmlns:p14="http://schemas.microsoft.com/office/powerpoint/2010/main" val="3737024079"/>
       </p:ext>
     </p:extLst>
   </p:cSld>
@@ -4655,7 +4208,7 @@
               <a:rPr lang="de-DE" sz="1800" dirty="0">
                 <a:ea typeface="ヒラギノ角ゴ Pro W3" pitchFamily="1" charset="-128"/>
               </a:rPr>
-              <a:t>Pflichtenheft</a:t>
+              <a:t>Live Demo</a:t>
             </a:r>
           </a:p>
         </p:txBody>
@@ -4700,7 +4253,7 @@
               <a:rPr lang="de-DE" sz="1800" dirty="0">
                 <a:ea typeface="ヒラギノ角ゴ Pro W3" pitchFamily="1" charset="-128"/>
               </a:rPr>
-              <a:t>Entwurf</a:t>
+              <a:t>Pflichtenheft</a:t>
             </a:r>
           </a:p>
         </p:txBody>
@@ -4745,7 +4298,7 @@
               <a:rPr lang="de-DE" sz="1800" dirty="0">
                 <a:ea typeface="ヒラギノ角ゴ Pro W3" pitchFamily="1" charset="-128"/>
               </a:rPr>
-              <a:t>Implementierung</a:t>
+              <a:t>Entwurf</a:t>
             </a:r>
           </a:p>
         </p:txBody>
@@ -4790,7 +4343,7 @@
               <a:rPr lang="de-DE" sz="1800" dirty="0">
                 <a:ea typeface="ヒラギノ角ゴ Pro W3" pitchFamily="1" charset="-128"/>
               </a:rPr>
-              <a:t>Qualitätssicherung</a:t>
+              <a:t>Implementierung</a:t>
             </a:r>
           </a:p>
         </p:txBody>
@@ -5152,11 +4705,14 @@
           <a:p>
             <a:pPr lvl="1"/>
             <a:r>
-              <a:rPr lang="de-DE" sz="1800" dirty="0">
+              <a:rPr lang="de-DE" dirty="0">
                 <a:ea typeface="ヒラギノ角ゴ Pro W3" pitchFamily="1" charset="-128"/>
               </a:rPr>
-              <a:t>Live Demo</a:t>
-            </a:r>
+              <a:t>Qualitätssicherung</a:t>
+            </a:r>
+            <a:endParaRPr lang="de-DE" sz="1800" dirty="0">
+              <a:ea typeface="ヒラギノ角ゴ Pro W3" pitchFamily="1" charset="-128"/>
+            </a:endParaRPr>
           </a:p>
         </p:txBody>
       </p:sp>
@@ -5221,8 +4777,7 @@
           <p:nvPr/>
         </p:nvPicPr>
         <p:blipFill>
-          <a:blip r:embed="rId2" cstate="print">
-            <a:biLevel thresh="75000"/>
+          <a:blip r:embed="rId2">
             <a:extLst>
               <a:ext uri="{28A0092B-C50C-407E-A947-70E740481C1C}">
                 <a14:useLocalDpi xmlns:a14="http://schemas.microsoft.com/office/drawing/2010/main" val="0"/>
@@ -5235,8 +4790,8 @@
         </p:blipFill>
         <p:spPr>
           <a:xfrm>
-            <a:off x="277300" y="3922863"/>
-            <a:ext cx="693451" cy="693451"/>
+            <a:off x="329567" y="4940217"/>
+            <a:ext cx="599473" cy="599473"/>
           </a:xfrm>
           <a:prstGeom prst="rect">
             <a:avLst/>
@@ -5265,8 +4820,8 @@
         </p:blipFill>
         <p:spPr>
           <a:xfrm>
-            <a:off x="311062" y="3065760"/>
-            <a:ext cx="625927" cy="625927"/>
+            <a:off x="344946" y="4028351"/>
+            <a:ext cx="573960" cy="573960"/>
           </a:xfrm>
           <a:prstGeom prst="rect">
             <a:avLst/>
@@ -5295,7 +4850,7 @@
         </p:blipFill>
         <p:spPr>
           <a:xfrm>
-            <a:off x="310672" y="5820961"/>
+            <a:off x="310671" y="2132685"/>
             <a:ext cx="626707" cy="626707"/>
           </a:xfrm>
           <a:prstGeom prst="rect">
@@ -5325,8 +4880,8 @@
         </p:blipFill>
         <p:spPr>
           <a:xfrm>
-            <a:off x="282784" y="4889313"/>
-            <a:ext cx="682483" cy="682483"/>
+            <a:off x="366798" y="5821156"/>
+            <a:ext cx="626317" cy="626317"/>
           </a:xfrm>
           <a:prstGeom prst="rect">
             <a:avLst/>
@@ -5384,7 +4939,7 @@
         </p:blipFill>
         <p:spPr>
           <a:xfrm>
-            <a:off x="403498" y="2172415"/>
+            <a:off x="427249" y="3099163"/>
             <a:ext cx="441054" cy="537889"/>
           </a:xfrm>
           <a:prstGeom prst="rect">
@@ -5453,7 +5008,7 @@
         <p:spPr>
           <a:xfrm>
             <a:off x="682641" y="2595758"/>
-            <a:ext cx="7886700" cy="2523768"/>
+            <a:ext cx="7886700" cy="2831544"/>
           </a:xfrm>
           <a:prstGeom prst="rect">
             <a:avLst/>
@@ -5516,6 +5071,24 @@
               <a:rPr lang="de-DE" sz="2000" dirty="0"/>
               <a:t>Leicht austauschbare Bausteine</a:t>
             </a:r>
+          </a:p>
+          <a:p>
+            <a:pPr marL="742950" lvl="1" indent="-285750">
+              <a:buClr>
+                <a:srgbClr val="80A5AB"/>
+              </a:buClr>
+              <a:buFont typeface="Wingdings" panose="05000000000000000000" pitchFamily="2" charset="2"/>
+              <a:buChar char="§"/>
+            </a:pPr>
+            <a:r>
+              <a:rPr lang="de-DE" sz="2000" dirty="0"/>
+              <a:t>Kein </a:t>
+            </a:r>
+            <a:r>
+              <a:rPr lang="de-DE" sz="2000" dirty="0" err="1"/>
+              <a:t>Grapheditor</a:t>
+            </a:r>
+            <a:endParaRPr lang="de-DE" sz="2000" dirty="0"/>
           </a:p>
           <a:p>
             <a:pPr marL="285750" indent="-285750">
@@ -5657,15 +5230,510 @@
           </a:p>
         </p:txBody>
       </p:sp>
+      <p:sp>
+        <p:nvSpPr>
+          <p:cNvPr id="3" name="Pfeil nach rechts 2"/>
+          <p:cNvSpPr/>
+          <p:nvPr/>
+        </p:nvSpPr>
+        <p:spPr>
+          <a:xfrm>
+            <a:off x="4374643" y="2454854"/>
+            <a:ext cx="394714" cy="1556426"/>
+          </a:xfrm>
+          <a:prstGeom prst="rightArrow">
+            <a:avLst>
+              <a:gd name="adj1" fmla="val 100000"/>
+              <a:gd name="adj2" fmla="val 100000"/>
+            </a:avLst>
+          </a:prstGeom>
+          <a:solidFill>
+            <a:schemeClr val="tx1"/>
+          </a:solidFill>
+          <a:ln>
+            <a:solidFill>
+              <a:schemeClr val="tx1"/>
+            </a:solidFill>
+          </a:ln>
+        </p:spPr>
+        <p:style>
+          <a:lnRef idx="2">
+            <a:schemeClr val="accent1">
+              <a:shade val="50000"/>
+            </a:schemeClr>
+          </a:lnRef>
+          <a:fillRef idx="1">
+            <a:schemeClr val="accent1"/>
+          </a:fillRef>
+          <a:effectRef idx="0">
+            <a:schemeClr val="accent1"/>
+          </a:effectRef>
+          <a:fontRef idx="minor">
+            <a:schemeClr val="lt1"/>
+          </a:fontRef>
+        </p:style>
+        <p:txBody>
+          <a:bodyPr rtlCol="0" anchor="ctr"/>
+          <a:lstStyle/>
+          <a:p>
+            <a:pPr algn="ctr"/>
+            <a:endParaRPr lang="de-DE"/>
+          </a:p>
+        </p:txBody>
+      </p:sp>
+      <p:sp>
+        <p:nvSpPr>
+          <p:cNvPr id="10" name="Abgerundetes Rechteck 9"/>
+          <p:cNvSpPr/>
+          <p:nvPr/>
+        </p:nvSpPr>
+        <p:spPr>
+          <a:xfrm>
+            <a:off x="632006" y="1437041"/>
+            <a:ext cx="1809642" cy="314844"/>
+          </a:xfrm>
+          <a:prstGeom prst="roundRect">
+            <a:avLst/>
+          </a:prstGeom>
+          <a:solidFill>
+            <a:schemeClr val="bg1"/>
+          </a:solidFill>
+          <a:ln>
+            <a:noFill/>
+          </a:ln>
+        </p:spPr>
+        <p:style>
+          <a:lnRef idx="2">
+            <a:schemeClr val="accent1">
+              <a:shade val="50000"/>
+            </a:schemeClr>
+          </a:lnRef>
+          <a:fillRef idx="1">
+            <a:schemeClr val="accent1"/>
+          </a:fillRef>
+          <a:effectRef idx="0">
+            <a:schemeClr val="accent1"/>
+          </a:effectRef>
+          <a:fontRef idx="minor">
+            <a:schemeClr val="lt1"/>
+          </a:fontRef>
+        </p:style>
+        <p:txBody>
+          <a:bodyPr rtlCol="0" anchor="ctr"/>
+          <a:lstStyle/>
+          <a:p>
+            <a:r>
+              <a:rPr lang="de-DE" sz="1600" b="1" dirty="0">
+                <a:solidFill>
+                  <a:schemeClr val="tx1"/>
+                </a:solidFill>
+                <a:latin typeface="Arial" panose="020B0604020202020204" pitchFamily="34" charset="0"/>
+                <a:cs typeface="Arial" panose="020B0604020202020204" pitchFamily="34" charset="0"/>
+              </a:rPr>
+              <a:t>Ausgangslage</a:t>
+            </a:r>
+          </a:p>
+        </p:txBody>
+      </p:sp>
+      <p:sp>
+        <p:nvSpPr>
+          <p:cNvPr id="11" name="Textfeld 10"/>
+          <p:cNvSpPr txBox="1"/>
+          <p:nvPr/>
+        </p:nvSpPr>
+        <p:spPr>
+          <a:xfrm>
+            <a:off x="4866995" y="1594463"/>
+            <a:ext cx="3845205" cy="3333170"/>
+          </a:xfrm>
+          <a:prstGeom prst="rect">
+            <a:avLst/>
+          </a:prstGeom>
+          <a:noFill/>
+          <a:ln>
+            <a:solidFill>
+              <a:srgbClr val="80A5AB"/>
+            </a:solidFill>
+          </a:ln>
+        </p:spPr>
+        <p:txBody>
+          <a:bodyPr wrap="square" rtlCol="0" anchor="t" anchorCtr="0">
+            <a:noAutofit/>
+          </a:bodyPr>
+          <a:lstStyle/>
+          <a:p>
+            <a:endParaRPr lang="en-US" sz="1600" dirty="0">
+              <a:latin typeface="Arial" panose="020B0604020202020204" pitchFamily="34" charset="0"/>
+              <a:cs typeface="Arial" panose="020B0604020202020204" pitchFamily="34" charset="0"/>
+              <a:sym typeface="Wingdings" panose="05000000000000000000" pitchFamily="2" charset="2"/>
+            </a:endParaRPr>
+          </a:p>
+        </p:txBody>
+      </p:sp>
+      <p:sp>
+        <p:nvSpPr>
+          <p:cNvPr id="12" name="Abgerundetes Rechteck 11"/>
+          <p:cNvSpPr/>
+          <p:nvPr/>
+        </p:nvSpPr>
+        <p:spPr>
+          <a:xfrm>
+            <a:off x="5066685" y="1437947"/>
+            <a:ext cx="1809642" cy="314844"/>
+          </a:xfrm>
+          <a:prstGeom prst="roundRect">
+            <a:avLst/>
+          </a:prstGeom>
+          <a:solidFill>
+            <a:schemeClr val="bg1"/>
+          </a:solidFill>
+          <a:ln>
+            <a:noFill/>
+          </a:ln>
+        </p:spPr>
+        <p:style>
+          <a:lnRef idx="2">
+            <a:schemeClr val="accent1">
+              <a:shade val="50000"/>
+            </a:schemeClr>
+          </a:lnRef>
+          <a:fillRef idx="1">
+            <a:schemeClr val="accent1"/>
+          </a:fillRef>
+          <a:effectRef idx="0">
+            <a:schemeClr val="accent1"/>
+          </a:effectRef>
+          <a:fontRef idx="minor">
+            <a:schemeClr val="lt1"/>
+          </a:fontRef>
+        </p:style>
+        <p:txBody>
+          <a:bodyPr rtlCol="0" anchor="ctr"/>
+          <a:lstStyle/>
+          <a:p>
+            <a:r>
+              <a:rPr lang="de-DE" sz="1600" b="1" dirty="0">
+                <a:solidFill>
+                  <a:schemeClr val="tx1"/>
+                </a:solidFill>
+                <a:latin typeface="Arial" panose="020B0604020202020204" pitchFamily="34" charset="0"/>
+                <a:cs typeface="Arial" panose="020B0604020202020204" pitchFamily="34" charset="0"/>
+              </a:rPr>
+              <a:t>Ergebnis</a:t>
+            </a:r>
+          </a:p>
+        </p:txBody>
+      </p:sp>
+      <p:sp>
+        <p:nvSpPr>
+          <p:cNvPr id="13" name="Abgerundetes Rechteck 12"/>
+          <p:cNvSpPr/>
+          <p:nvPr/>
+        </p:nvSpPr>
+        <p:spPr>
+          <a:xfrm>
+            <a:off x="296124" y="5397401"/>
+            <a:ext cx="8416076" cy="1127943"/>
+          </a:xfrm>
+          <a:prstGeom prst="roundRect">
+            <a:avLst/>
+          </a:prstGeom>
+          <a:solidFill>
+            <a:srgbClr val="D7D7D7"/>
+          </a:solidFill>
+          <a:ln>
+            <a:noFill/>
+          </a:ln>
+        </p:spPr>
+        <p:style>
+          <a:lnRef idx="2">
+            <a:schemeClr val="accent1">
+              <a:shade val="50000"/>
+            </a:schemeClr>
+          </a:lnRef>
+          <a:fillRef idx="1">
+            <a:schemeClr val="accent1"/>
+          </a:fillRef>
+          <a:effectRef idx="0">
+            <a:schemeClr val="accent1"/>
+          </a:effectRef>
+          <a:fontRef idx="minor">
+            <a:schemeClr val="lt1"/>
+          </a:fontRef>
+        </p:style>
+        <p:txBody>
+          <a:bodyPr rtlCol="0" anchor="t"/>
+          <a:lstStyle/>
+          <a:p>
+            <a:r>
+              <a:rPr lang="en-US" sz="1600" b="1" dirty="0">
+                <a:solidFill>
+                  <a:schemeClr val="tx1"/>
+                </a:solidFill>
+                <a:latin typeface="Arial" panose="020B0604020202020204" pitchFamily="34" charset="0"/>
+                <a:cs typeface="Arial" panose="020B0604020202020204" pitchFamily="34" charset="0"/>
+              </a:rPr>
+              <a:t>Die JOANA-</a:t>
+            </a:r>
+            <a:r>
+              <a:rPr lang="en-US" sz="1600" b="1" dirty="0" err="1">
+                <a:solidFill>
+                  <a:schemeClr val="tx1"/>
+                </a:solidFill>
+                <a:latin typeface="Arial" panose="020B0604020202020204" pitchFamily="34" charset="0"/>
+                <a:cs typeface="Arial" panose="020B0604020202020204" pitchFamily="34" charset="0"/>
+              </a:rPr>
+              <a:t>Programmabhängigkeitsgraphen</a:t>
+            </a:r>
+            <a:r>
+              <a:rPr lang="en-US" sz="1600" b="1" dirty="0">
+                <a:solidFill>
+                  <a:schemeClr val="tx1"/>
+                </a:solidFill>
+                <a:latin typeface="Arial" panose="020B0604020202020204" pitchFamily="34" charset="0"/>
+                <a:cs typeface="Arial" panose="020B0604020202020204" pitchFamily="34" charset="0"/>
+              </a:rPr>
+              <a:t> </a:t>
+            </a:r>
+            <a:r>
+              <a:rPr lang="en-US" sz="1600" b="1" dirty="0" err="1">
+                <a:solidFill>
+                  <a:schemeClr val="tx1"/>
+                </a:solidFill>
+                <a:latin typeface="Arial" panose="020B0604020202020204" pitchFamily="34" charset="0"/>
+                <a:cs typeface="Arial" panose="020B0604020202020204" pitchFamily="34" charset="0"/>
+              </a:rPr>
+              <a:t>sollen</a:t>
+            </a:r>
+            <a:r>
+              <a:rPr lang="en-US" sz="1600" b="1" dirty="0">
+                <a:solidFill>
+                  <a:schemeClr val="tx1"/>
+                </a:solidFill>
+                <a:latin typeface="Arial" panose="020B0604020202020204" pitchFamily="34" charset="0"/>
+                <a:cs typeface="Arial" panose="020B0604020202020204" pitchFamily="34" charset="0"/>
+              </a:rPr>
+              <a:t> </a:t>
+            </a:r>
+            <a:r>
+              <a:rPr lang="en-US" sz="1600" b="1" dirty="0" err="1">
+                <a:solidFill>
+                  <a:schemeClr val="tx1"/>
+                </a:solidFill>
+                <a:latin typeface="Arial" panose="020B0604020202020204" pitchFamily="34" charset="0"/>
+                <a:cs typeface="Arial" panose="020B0604020202020204" pitchFamily="34" charset="0"/>
+              </a:rPr>
+              <a:t>für</a:t>
+            </a:r>
+            <a:r>
+              <a:rPr lang="en-US" sz="1600" b="1" dirty="0">
+                <a:solidFill>
+                  <a:schemeClr val="tx1"/>
+                </a:solidFill>
+                <a:latin typeface="Arial" panose="020B0604020202020204" pitchFamily="34" charset="0"/>
+                <a:cs typeface="Arial" panose="020B0604020202020204" pitchFamily="34" charset="0"/>
+              </a:rPr>
+              <a:t> das </a:t>
+            </a:r>
+            <a:r>
+              <a:rPr lang="en-US" sz="1600" b="1" dirty="0" err="1">
+                <a:solidFill>
+                  <a:schemeClr val="tx1"/>
+                </a:solidFill>
+                <a:latin typeface="Arial" panose="020B0604020202020204" pitchFamily="34" charset="0"/>
+                <a:cs typeface="Arial" panose="020B0604020202020204" pitchFamily="34" charset="0"/>
+              </a:rPr>
+              <a:t>menschliche</a:t>
+            </a:r>
+            <a:r>
+              <a:rPr lang="en-US" sz="1600" b="1" dirty="0">
+                <a:solidFill>
+                  <a:schemeClr val="tx1"/>
+                </a:solidFill>
+                <a:latin typeface="Arial" panose="020B0604020202020204" pitchFamily="34" charset="0"/>
+                <a:cs typeface="Arial" panose="020B0604020202020204" pitchFamily="34" charset="0"/>
+              </a:rPr>
+              <a:t> </a:t>
+            </a:r>
+            <a:r>
+              <a:rPr lang="en-US" sz="1600" b="1" dirty="0" err="1">
+                <a:solidFill>
+                  <a:schemeClr val="tx1"/>
+                </a:solidFill>
+                <a:latin typeface="Arial" panose="020B0604020202020204" pitchFamily="34" charset="0"/>
+                <a:cs typeface="Arial" panose="020B0604020202020204" pitchFamily="34" charset="0"/>
+              </a:rPr>
+              <a:t>Auge</a:t>
+            </a:r>
+            <a:r>
+              <a:rPr lang="en-US" sz="1600" b="1" dirty="0">
+                <a:solidFill>
+                  <a:schemeClr val="tx1"/>
+                </a:solidFill>
+                <a:latin typeface="Arial" panose="020B0604020202020204" pitchFamily="34" charset="0"/>
+                <a:cs typeface="Arial" panose="020B0604020202020204" pitchFamily="34" charset="0"/>
+              </a:rPr>
+              <a:t> </a:t>
+            </a:r>
+            <a:r>
+              <a:rPr lang="en-US" sz="1600" b="1" dirty="0" err="1">
+                <a:solidFill>
+                  <a:schemeClr val="tx1"/>
+                </a:solidFill>
+                <a:latin typeface="Arial" panose="020B0604020202020204" pitchFamily="34" charset="0"/>
+                <a:cs typeface="Arial" panose="020B0604020202020204" pitchFamily="34" charset="0"/>
+              </a:rPr>
+              <a:t>übersichtlicht</a:t>
+            </a:r>
+            <a:r>
+              <a:rPr lang="en-US" sz="1600" b="1" dirty="0">
+                <a:solidFill>
+                  <a:schemeClr val="tx1"/>
+                </a:solidFill>
+                <a:latin typeface="Arial" panose="020B0604020202020204" pitchFamily="34" charset="0"/>
+                <a:cs typeface="Arial" panose="020B0604020202020204" pitchFamily="34" charset="0"/>
+              </a:rPr>
+              <a:t> </a:t>
+            </a:r>
+            <a:r>
+              <a:rPr lang="en-US" sz="1600" b="1" dirty="0" err="1">
+                <a:solidFill>
+                  <a:schemeClr val="tx1"/>
+                </a:solidFill>
+                <a:latin typeface="Arial" panose="020B0604020202020204" pitchFamily="34" charset="0"/>
+                <a:cs typeface="Arial" panose="020B0604020202020204" pitchFamily="34" charset="0"/>
+              </a:rPr>
+              <a:t>dargestellt</a:t>
+            </a:r>
+            <a:r>
+              <a:rPr lang="en-US" sz="1600" b="1" dirty="0">
+                <a:solidFill>
+                  <a:schemeClr val="tx1"/>
+                </a:solidFill>
+                <a:latin typeface="Arial" panose="020B0604020202020204" pitchFamily="34" charset="0"/>
+                <a:cs typeface="Arial" panose="020B0604020202020204" pitchFamily="34" charset="0"/>
+              </a:rPr>
+              <a:t> </a:t>
+            </a:r>
+            <a:r>
+              <a:rPr lang="en-US" sz="1600" b="1" dirty="0" err="1">
+                <a:solidFill>
+                  <a:schemeClr val="tx1"/>
+                </a:solidFill>
+                <a:latin typeface="Arial" panose="020B0604020202020204" pitchFamily="34" charset="0"/>
+                <a:cs typeface="Arial" panose="020B0604020202020204" pitchFamily="34" charset="0"/>
+              </a:rPr>
+              <a:t>werden</a:t>
+            </a:r>
+            <a:r>
+              <a:rPr lang="en-US" sz="1600" b="1" dirty="0">
+                <a:solidFill>
+                  <a:schemeClr val="tx1"/>
+                </a:solidFill>
+                <a:latin typeface="Arial" panose="020B0604020202020204" pitchFamily="34" charset="0"/>
+                <a:cs typeface="Arial" panose="020B0604020202020204" pitchFamily="34" charset="0"/>
+              </a:rPr>
+              <a:t>, um </a:t>
+            </a:r>
+            <a:r>
+              <a:rPr lang="en-US" sz="1600" b="1" dirty="0" err="1">
+                <a:solidFill>
+                  <a:schemeClr val="tx1"/>
+                </a:solidFill>
+                <a:latin typeface="Arial" panose="020B0604020202020204" pitchFamily="34" charset="0"/>
+                <a:cs typeface="Arial" panose="020B0604020202020204" pitchFamily="34" charset="0"/>
+              </a:rPr>
+              <a:t>Programmstrukturen</a:t>
+            </a:r>
+            <a:r>
+              <a:rPr lang="en-US" sz="1600" b="1" dirty="0">
+                <a:solidFill>
+                  <a:schemeClr val="tx1"/>
+                </a:solidFill>
+                <a:latin typeface="Arial" panose="020B0604020202020204" pitchFamily="34" charset="0"/>
+                <a:cs typeface="Arial" panose="020B0604020202020204" pitchFamily="34" charset="0"/>
+              </a:rPr>
+              <a:t> </a:t>
+            </a:r>
+            <a:r>
+              <a:rPr lang="en-US" sz="1600" b="1" dirty="0" err="1">
+                <a:solidFill>
+                  <a:schemeClr val="tx1"/>
+                </a:solidFill>
+                <a:latin typeface="Arial" panose="020B0604020202020204" pitchFamily="34" charset="0"/>
+                <a:cs typeface="Arial" panose="020B0604020202020204" pitchFamily="34" charset="0"/>
+              </a:rPr>
+              <a:t>leicht</a:t>
+            </a:r>
+            <a:r>
+              <a:rPr lang="en-US" sz="1600" b="1" dirty="0">
+                <a:solidFill>
+                  <a:schemeClr val="tx1"/>
+                </a:solidFill>
+                <a:latin typeface="Arial" panose="020B0604020202020204" pitchFamily="34" charset="0"/>
+                <a:cs typeface="Arial" panose="020B0604020202020204" pitchFamily="34" charset="0"/>
+              </a:rPr>
+              <a:t> </a:t>
+            </a:r>
+            <a:r>
+              <a:rPr lang="en-US" sz="1600" b="1" dirty="0" err="1">
+                <a:solidFill>
+                  <a:schemeClr val="tx1"/>
+                </a:solidFill>
+                <a:latin typeface="Arial" panose="020B0604020202020204" pitchFamily="34" charset="0"/>
+                <a:cs typeface="Arial" panose="020B0604020202020204" pitchFamily="34" charset="0"/>
+              </a:rPr>
+              <a:t>zu</a:t>
+            </a:r>
+            <a:r>
+              <a:rPr lang="en-US" sz="1600" b="1" dirty="0">
+                <a:solidFill>
+                  <a:schemeClr val="tx1"/>
+                </a:solidFill>
+                <a:latin typeface="Arial" panose="020B0604020202020204" pitchFamily="34" charset="0"/>
+                <a:cs typeface="Arial" panose="020B0604020202020204" pitchFamily="34" charset="0"/>
+              </a:rPr>
+              <a:t> </a:t>
+            </a:r>
+            <a:r>
+              <a:rPr lang="en-US" sz="1600" b="1" dirty="0" err="1">
+                <a:solidFill>
+                  <a:schemeClr val="tx1"/>
+                </a:solidFill>
+                <a:latin typeface="Arial" panose="020B0604020202020204" pitchFamily="34" charset="0"/>
+                <a:cs typeface="Arial" panose="020B0604020202020204" pitchFamily="34" charset="0"/>
+              </a:rPr>
+              <a:t>erkennen</a:t>
+            </a:r>
+            <a:r>
+              <a:rPr lang="en-US" sz="1600" b="1" dirty="0">
+                <a:solidFill>
+                  <a:schemeClr val="tx1"/>
+                </a:solidFill>
+                <a:latin typeface="Arial" panose="020B0604020202020204" pitchFamily="34" charset="0"/>
+                <a:cs typeface="Arial" panose="020B0604020202020204" pitchFamily="34" charset="0"/>
+              </a:rPr>
+              <a:t>.</a:t>
+            </a:r>
+            <a:endParaRPr lang="en-US" sz="1600" dirty="0">
+              <a:solidFill>
+                <a:schemeClr val="tx1"/>
+              </a:solidFill>
+              <a:latin typeface="Arial" panose="020B0604020202020204" pitchFamily="34" charset="0"/>
+              <a:cs typeface="Arial" panose="020B0604020202020204" pitchFamily="34" charset="0"/>
+            </a:endParaRPr>
+          </a:p>
+        </p:txBody>
+      </p:sp>
       <p:pic>
         <p:nvPicPr>
-          <p:cNvPr id="5" name="Grafik 4"/>
+          <p:cNvPr id="4" name="Grafik 3"/>
           <p:cNvPicPr>
             <a:picLocks noChangeAspect="1"/>
           </p:cNvPicPr>
           <p:nvPr/>
         </p:nvPicPr>
-        <p:blipFill rotWithShape="1">
+        <p:blipFill>
           <a:blip r:embed="rId2">
             <a:extLst>
               <a:ext uri="{28A0092B-C50C-407E-A947-70E740481C1C}">
@@ -5673,13 +5741,14 @@
               </a:ext>
             </a:extLst>
           </a:blip>
-          <a:srcRect b="16199"/>
-          <a:stretch/>
+          <a:stretch>
+            <a:fillRect/>
+          </a:stretch>
         </p:blipFill>
         <p:spPr>
           <a:xfrm>
-            <a:off x="633989" y="1913590"/>
-            <a:ext cx="3149082" cy="2638955"/>
+            <a:off x="904976" y="2017272"/>
+            <a:ext cx="2743388" cy="2586436"/>
           </a:xfrm>
           <a:prstGeom prst="rect">
             <a:avLst/>
@@ -5688,7 +5757,7 @@
       </p:pic>
       <p:pic>
         <p:nvPicPr>
-          <p:cNvPr id="6" name="Grafik 5"/>
+          <p:cNvPr id="7" name="Grafik 6"/>
           <p:cNvPicPr>
             <a:picLocks noChangeAspect="1"/>
           </p:cNvPicPr>
@@ -5708,509 +5777,14 @@
         </p:blipFill>
         <p:spPr>
           <a:xfrm>
-            <a:off x="5167260" y="1755232"/>
-            <a:ext cx="3107094" cy="3107094"/>
+            <a:off x="4979522" y="2304581"/>
+            <a:ext cx="3620150" cy="2011817"/>
           </a:xfrm>
           <a:prstGeom prst="rect">
             <a:avLst/>
           </a:prstGeom>
         </p:spPr>
       </p:pic>
-      <p:sp>
-        <p:nvSpPr>
-          <p:cNvPr id="3" name="Pfeil nach rechts 2"/>
-          <p:cNvSpPr/>
-          <p:nvPr/>
-        </p:nvSpPr>
-        <p:spPr>
-          <a:xfrm>
-            <a:off x="4374643" y="2454854"/>
-            <a:ext cx="394714" cy="1556426"/>
-          </a:xfrm>
-          <a:prstGeom prst="rightArrow">
-            <a:avLst>
-              <a:gd name="adj1" fmla="val 100000"/>
-              <a:gd name="adj2" fmla="val 100000"/>
-            </a:avLst>
-          </a:prstGeom>
-          <a:solidFill>
-            <a:schemeClr val="tx1"/>
-          </a:solidFill>
-          <a:ln>
-            <a:solidFill>
-              <a:schemeClr val="tx1"/>
-            </a:solidFill>
-          </a:ln>
-        </p:spPr>
-        <p:style>
-          <a:lnRef idx="2">
-            <a:schemeClr val="accent1">
-              <a:shade val="50000"/>
-            </a:schemeClr>
-          </a:lnRef>
-          <a:fillRef idx="1">
-            <a:schemeClr val="accent1"/>
-          </a:fillRef>
-          <a:effectRef idx="0">
-            <a:schemeClr val="accent1"/>
-          </a:effectRef>
-          <a:fontRef idx="minor">
-            <a:schemeClr val="lt1"/>
-          </a:fontRef>
-        </p:style>
-        <p:txBody>
-          <a:bodyPr rtlCol="0" anchor="ctr"/>
-          <a:lstStyle/>
-          <a:p>
-            <a:pPr algn="ctr"/>
-            <a:endParaRPr lang="de-DE"/>
-          </a:p>
-        </p:txBody>
-      </p:sp>
-      <p:sp>
-        <p:nvSpPr>
-          <p:cNvPr id="10" name="Abgerundetes Rechteck 9"/>
-          <p:cNvSpPr/>
-          <p:nvPr/>
-        </p:nvSpPr>
-        <p:spPr>
-          <a:xfrm>
-            <a:off x="632006" y="1437041"/>
-            <a:ext cx="1809642" cy="314844"/>
-          </a:xfrm>
-          <a:prstGeom prst="roundRect">
-            <a:avLst/>
-          </a:prstGeom>
-          <a:solidFill>
-            <a:schemeClr val="bg1"/>
-          </a:solidFill>
-          <a:ln>
-            <a:noFill/>
-          </a:ln>
-        </p:spPr>
-        <p:style>
-          <a:lnRef idx="2">
-            <a:schemeClr val="accent1">
-              <a:shade val="50000"/>
-            </a:schemeClr>
-          </a:lnRef>
-          <a:fillRef idx="1">
-            <a:schemeClr val="accent1"/>
-          </a:fillRef>
-          <a:effectRef idx="0">
-            <a:schemeClr val="accent1"/>
-          </a:effectRef>
-          <a:fontRef idx="minor">
-            <a:schemeClr val="lt1"/>
-          </a:fontRef>
-        </p:style>
-        <p:txBody>
-          <a:bodyPr rtlCol="0" anchor="ctr"/>
-          <a:lstStyle/>
-          <a:p>
-            <a:r>
-              <a:rPr lang="de-DE" sz="1600" b="1" dirty="0">
-                <a:solidFill>
-                  <a:schemeClr val="tx1"/>
-                </a:solidFill>
-                <a:latin typeface="Arial" panose="020B0604020202020204" pitchFamily="34" charset="0"/>
-                <a:cs typeface="Arial" panose="020B0604020202020204" pitchFamily="34" charset="0"/>
-              </a:rPr>
-              <a:t>Ausgangslage</a:t>
-            </a:r>
-          </a:p>
-        </p:txBody>
-      </p:sp>
-      <p:sp>
-        <p:nvSpPr>
-          <p:cNvPr id="11" name="Textfeld 10"/>
-          <p:cNvSpPr txBox="1"/>
-          <p:nvPr/>
-        </p:nvSpPr>
-        <p:spPr>
-          <a:xfrm>
-            <a:off x="4866995" y="1599652"/>
-            <a:ext cx="3845205" cy="3333170"/>
-          </a:xfrm>
-          <a:prstGeom prst="rect">
-            <a:avLst/>
-          </a:prstGeom>
-          <a:noFill/>
-          <a:ln>
-            <a:solidFill>
-              <a:srgbClr val="80A5AB"/>
-            </a:solidFill>
-          </a:ln>
-        </p:spPr>
-        <p:txBody>
-          <a:bodyPr wrap="square" rtlCol="0" anchor="t" anchorCtr="0">
-            <a:noAutofit/>
-          </a:bodyPr>
-          <a:lstStyle/>
-          <a:p>
-            <a:endParaRPr lang="en-US" sz="1600" dirty="0">
-              <a:latin typeface="Arial" panose="020B0604020202020204" pitchFamily="34" charset="0"/>
-              <a:cs typeface="Arial" panose="020B0604020202020204" pitchFamily="34" charset="0"/>
-              <a:sym typeface="Wingdings" panose="05000000000000000000" pitchFamily="2" charset="2"/>
-            </a:endParaRPr>
-          </a:p>
-        </p:txBody>
-      </p:sp>
-      <p:sp>
-        <p:nvSpPr>
-          <p:cNvPr id="12" name="Abgerundetes Rechteck 11"/>
-          <p:cNvSpPr/>
-          <p:nvPr/>
-        </p:nvSpPr>
-        <p:spPr>
-          <a:xfrm>
-            <a:off x="5066685" y="1437947"/>
-            <a:ext cx="1809642" cy="314844"/>
-          </a:xfrm>
-          <a:prstGeom prst="roundRect">
-            <a:avLst/>
-          </a:prstGeom>
-          <a:solidFill>
-            <a:schemeClr val="bg1"/>
-          </a:solidFill>
-          <a:ln>
-            <a:noFill/>
-          </a:ln>
-        </p:spPr>
-        <p:style>
-          <a:lnRef idx="2">
-            <a:schemeClr val="accent1">
-              <a:shade val="50000"/>
-            </a:schemeClr>
-          </a:lnRef>
-          <a:fillRef idx="1">
-            <a:schemeClr val="accent1"/>
-          </a:fillRef>
-          <a:effectRef idx="0">
-            <a:schemeClr val="accent1"/>
-          </a:effectRef>
-          <a:fontRef idx="minor">
-            <a:schemeClr val="lt1"/>
-          </a:fontRef>
-        </p:style>
-        <p:txBody>
-          <a:bodyPr rtlCol="0" anchor="ctr"/>
-          <a:lstStyle/>
-          <a:p>
-            <a:r>
-              <a:rPr lang="de-DE" sz="1600" b="1" dirty="0">
-                <a:solidFill>
-                  <a:schemeClr val="tx1"/>
-                </a:solidFill>
-                <a:latin typeface="Arial" panose="020B0604020202020204" pitchFamily="34" charset="0"/>
-                <a:cs typeface="Arial" panose="020B0604020202020204" pitchFamily="34" charset="0"/>
-              </a:rPr>
-              <a:t>Ergebnis</a:t>
-            </a:r>
-          </a:p>
-        </p:txBody>
-      </p:sp>
-      <p:sp>
-        <p:nvSpPr>
-          <p:cNvPr id="13" name="Abgerundetes Rechteck 12"/>
-          <p:cNvSpPr/>
-          <p:nvPr/>
-        </p:nvSpPr>
-        <p:spPr>
-          <a:xfrm>
-            <a:off x="296124" y="5397401"/>
-            <a:ext cx="8416076" cy="1127943"/>
-          </a:xfrm>
-          <a:prstGeom prst="roundRect">
-            <a:avLst/>
-          </a:prstGeom>
-          <a:solidFill>
-            <a:srgbClr val="D7D7D7"/>
-          </a:solidFill>
-          <a:ln>
-            <a:noFill/>
-          </a:ln>
-        </p:spPr>
-        <p:style>
-          <a:lnRef idx="2">
-            <a:schemeClr val="accent1">
-              <a:shade val="50000"/>
-            </a:schemeClr>
-          </a:lnRef>
-          <a:fillRef idx="1">
-            <a:schemeClr val="accent1"/>
-          </a:fillRef>
-          <a:effectRef idx="0">
-            <a:schemeClr val="accent1"/>
-          </a:effectRef>
-          <a:fontRef idx="minor">
-            <a:schemeClr val="lt1"/>
-          </a:fontRef>
-        </p:style>
-        <p:txBody>
-          <a:bodyPr rtlCol="0" anchor="t"/>
-          <a:lstStyle/>
-          <a:p>
-            <a:r>
-              <a:rPr lang="en-US" sz="1600" b="1" dirty="0">
-                <a:solidFill>
-                  <a:schemeClr val="tx1"/>
-                </a:solidFill>
-                <a:latin typeface="Arial" panose="020B0604020202020204" pitchFamily="34" charset="0"/>
-                <a:cs typeface="Arial" panose="020B0604020202020204" pitchFamily="34" charset="0"/>
-              </a:rPr>
-              <a:t>Die JOANA-</a:t>
-            </a:r>
-            <a:r>
-              <a:rPr lang="en-US" sz="1600" b="1" dirty="0" err="1">
-                <a:solidFill>
-                  <a:schemeClr val="tx1"/>
-                </a:solidFill>
-                <a:latin typeface="Arial" panose="020B0604020202020204" pitchFamily="34" charset="0"/>
-                <a:cs typeface="Arial" panose="020B0604020202020204" pitchFamily="34" charset="0"/>
-              </a:rPr>
-              <a:t>Programmabhängigkeitsgraphen</a:t>
-            </a:r>
-            <a:r>
-              <a:rPr lang="en-US" sz="1600" b="1" dirty="0">
-                <a:solidFill>
-                  <a:schemeClr val="tx1"/>
-                </a:solidFill>
-                <a:latin typeface="Arial" panose="020B0604020202020204" pitchFamily="34" charset="0"/>
-                <a:cs typeface="Arial" panose="020B0604020202020204" pitchFamily="34" charset="0"/>
-              </a:rPr>
-              <a:t> </a:t>
-            </a:r>
-            <a:r>
-              <a:rPr lang="en-US" sz="1600" b="1" dirty="0" err="1">
-                <a:solidFill>
-                  <a:schemeClr val="tx1"/>
-                </a:solidFill>
-                <a:latin typeface="Arial" panose="020B0604020202020204" pitchFamily="34" charset="0"/>
-                <a:cs typeface="Arial" panose="020B0604020202020204" pitchFamily="34" charset="0"/>
-              </a:rPr>
-              <a:t>sollen</a:t>
-            </a:r>
-            <a:r>
-              <a:rPr lang="en-US" sz="1600" b="1" dirty="0">
-                <a:solidFill>
-                  <a:schemeClr val="tx1"/>
-                </a:solidFill>
-                <a:latin typeface="Arial" panose="020B0604020202020204" pitchFamily="34" charset="0"/>
-                <a:cs typeface="Arial" panose="020B0604020202020204" pitchFamily="34" charset="0"/>
-              </a:rPr>
-              <a:t> </a:t>
-            </a:r>
-            <a:r>
-              <a:rPr lang="en-US" sz="1600" b="1" dirty="0" err="1">
-                <a:solidFill>
-                  <a:schemeClr val="tx1"/>
-                </a:solidFill>
-                <a:latin typeface="Arial" panose="020B0604020202020204" pitchFamily="34" charset="0"/>
-                <a:cs typeface="Arial" panose="020B0604020202020204" pitchFamily="34" charset="0"/>
-              </a:rPr>
-              <a:t>für</a:t>
-            </a:r>
-            <a:r>
-              <a:rPr lang="en-US" sz="1600" b="1" dirty="0">
-                <a:solidFill>
-                  <a:schemeClr val="tx1"/>
-                </a:solidFill>
-                <a:latin typeface="Arial" panose="020B0604020202020204" pitchFamily="34" charset="0"/>
-                <a:cs typeface="Arial" panose="020B0604020202020204" pitchFamily="34" charset="0"/>
-              </a:rPr>
-              <a:t> das </a:t>
-            </a:r>
-            <a:r>
-              <a:rPr lang="en-US" sz="1600" b="1" dirty="0" err="1">
-                <a:solidFill>
-                  <a:schemeClr val="tx1"/>
-                </a:solidFill>
-                <a:latin typeface="Arial" panose="020B0604020202020204" pitchFamily="34" charset="0"/>
-                <a:cs typeface="Arial" panose="020B0604020202020204" pitchFamily="34" charset="0"/>
-              </a:rPr>
-              <a:t>menschliche</a:t>
-            </a:r>
-            <a:r>
-              <a:rPr lang="en-US" sz="1600" b="1" dirty="0">
-                <a:solidFill>
-                  <a:schemeClr val="tx1"/>
-                </a:solidFill>
-                <a:latin typeface="Arial" panose="020B0604020202020204" pitchFamily="34" charset="0"/>
-                <a:cs typeface="Arial" panose="020B0604020202020204" pitchFamily="34" charset="0"/>
-              </a:rPr>
-              <a:t> </a:t>
-            </a:r>
-            <a:r>
-              <a:rPr lang="en-US" sz="1600" b="1" dirty="0" err="1">
-                <a:solidFill>
-                  <a:schemeClr val="tx1"/>
-                </a:solidFill>
-                <a:latin typeface="Arial" panose="020B0604020202020204" pitchFamily="34" charset="0"/>
-                <a:cs typeface="Arial" panose="020B0604020202020204" pitchFamily="34" charset="0"/>
-              </a:rPr>
-              <a:t>Auge</a:t>
-            </a:r>
-            <a:r>
-              <a:rPr lang="en-US" sz="1600" b="1" dirty="0">
-                <a:solidFill>
-                  <a:schemeClr val="tx1"/>
-                </a:solidFill>
-                <a:latin typeface="Arial" panose="020B0604020202020204" pitchFamily="34" charset="0"/>
-                <a:cs typeface="Arial" panose="020B0604020202020204" pitchFamily="34" charset="0"/>
-              </a:rPr>
-              <a:t> </a:t>
-            </a:r>
-            <a:r>
-              <a:rPr lang="en-US" sz="1600" b="1" dirty="0" err="1">
-                <a:solidFill>
-                  <a:schemeClr val="tx1"/>
-                </a:solidFill>
-                <a:latin typeface="Arial" panose="020B0604020202020204" pitchFamily="34" charset="0"/>
-                <a:cs typeface="Arial" panose="020B0604020202020204" pitchFamily="34" charset="0"/>
-              </a:rPr>
-              <a:t>übersichtlicht</a:t>
-            </a:r>
-            <a:r>
-              <a:rPr lang="en-US" sz="1600" b="1" dirty="0">
-                <a:solidFill>
-                  <a:schemeClr val="tx1"/>
-                </a:solidFill>
-                <a:latin typeface="Arial" panose="020B0604020202020204" pitchFamily="34" charset="0"/>
-                <a:cs typeface="Arial" panose="020B0604020202020204" pitchFamily="34" charset="0"/>
-              </a:rPr>
-              <a:t> </a:t>
-            </a:r>
-            <a:r>
-              <a:rPr lang="en-US" sz="1600" b="1" dirty="0" err="1">
-                <a:solidFill>
-                  <a:schemeClr val="tx1"/>
-                </a:solidFill>
-                <a:latin typeface="Arial" panose="020B0604020202020204" pitchFamily="34" charset="0"/>
-                <a:cs typeface="Arial" panose="020B0604020202020204" pitchFamily="34" charset="0"/>
-              </a:rPr>
-              <a:t>dargestellt</a:t>
-            </a:r>
-            <a:r>
-              <a:rPr lang="en-US" sz="1600" b="1" dirty="0">
-                <a:solidFill>
-                  <a:schemeClr val="tx1"/>
-                </a:solidFill>
-                <a:latin typeface="Arial" panose="020B0604020202020204" pitchFamily="34" charset="0"/>
-                <a:cs typeface="Arial" panose="020B0604020202020204" pitchFamily="34" charset="0"/>
-              </a:rPr>
-              <a:t> </a:t>
-            </a:r>
-            <a:r>
-              <a:rPr lang="en-US" sz="1600" b="1" dirty="0" err="1">
-                <a:solidFill>
-                  <a:schemeClr val="tx1"/>
-                </a:solidFill>
-                <a:latin typeface="Arial" panose="020B0604020202020204" pitchFamily="34" charset="0"/>
-                <a:cs typeface="Arial" panose="020B0604020202020204" pitchFamily="34" charset="0"/>
-              </a:rPr>
-              <a:t>werden</a:t>
-            </a:r>
-            <a:r>
-              <a:rPr lang="en-US" sz="1600" b="1" dirty="0">
-                <a:solidFill>
-                  <a:schemeClr val="tx1"/>
-                </a:solidFill>
-                <a:latin typeface="Arial" panose="020B0604020202020204" pitchFamily="34" charset="0"/>
-                <a:cs typeface="Arial" panose="020B0604020202020204" pitchFamily="34" charset="0"/>
-              </a:rPr>
-              <a:t>, um </a:t>
-            </a:r>
-            <a:r>
-              <a:rPr lang="en-US" sz="1600" b="1" dirty="0" err="1">
-                <a:solidFill>
-                  <a:schemeClr val="tx1"/>
-                </a:solidFill>
-                <a:latin typeface="Arial" panose="020B0604020202020204" pitchFamily="34" charset="0"/>
-                <a:cs typeface="Arial" panose="020B0604020202020204" pitchFamily="34" charset="0"/>
-              </a:rPr>
-              <a:t>Programmstrukturen</a:t>
-            </a:r>
-            <a:r>
-              <a:rPr lang="en-US" sz="1600" b="1" dirty="0">
-                <a:solidFill>
-                  <a:schemeClr val="tx1"/>
-                </a:solidFill>
-                <a:latin typeface="Arial" panose="020B0604020202020204" pitchFamily="34" charset="0"/>
-                <a:cs typeface="Arial" panose="020B0604020202020204" pitchFamily="34" charset="0"/>
-              </a:rPr>
-              <a:t> </a:t>
-            </a:r>
-            <a:r>
-              <a:rPr lang="en-US" sz="1600" b="1" dirty="0" err="1">
-                <a:solidFill>
-                  <a:schemeClr val="tx1"/>
-                </a:solidFill>
-                <a:latin typeface="Arial" panose="020B0604020202020204" pitchFamily="34" charset="0"/>
-                <a:cs typeface="Arial" panose="020B0604020202020204" pitchFamily="34" charset="0"/>
-              </a:rPr>
-              <a:t>leicht</a:t>
-            </a:r>
-            <a:r>
-              <a:rPr lang="en-US" sz="1600" b="1" dirty="0">
-                <a:solidFill>
-                  <a:schemeClr val="tx1"/>
-                </a:solidFill>
-                <a:latin typeface="Arial" panose="020B0604020202020204" pitchFamily="34" charset="0"/>
-                <a:cs typeface="Arial" panose="020B0604020202020204" pitchFamily="34" charset="0"/>
-              </a:rPr>
-              <a:t> </a:t>
-            </a:r>
-            <a:r>
-              <a:rPr lang="en-US" sz="1600" b="1" dirty="0" err="1">
-                <a:solidFill>
-                  <a:schemeClr val="tx1"/>
-                </a:solidFill>
-                <a:latin typeface="Arial" panose="020B0604020202020204" pitchFamily="34" charset="0"/>
-                <a:cs typeface="Arial" panose="020B0604020202020204" pitchFamily="34" charset="0"/>
-              </a:rPr>
-              <a:t>zu</a:t>
-            </a:r>
-            <a:r>
-              <a:rPr lang="en-US" sz="1600" b="1" dirty="0">
-                <a:solidFill>
-                  <a:schemeClr val="tx1"/>
-                </a:solidFill>
-                <a:latin typeface="Arial" panose="020B0604020202020204" pitchFamily="34" charset="0"/>
-                <a:cs typeface="Arial" panose="020B0604020202020204" pitchFamily="34" charset="0"/>
-              </a:rPr>
-              <a:t> </a:t>
-            </a:r>
-            <a:r>
-              <a:rPr lang="en-US" sz="1600" b="1" dirty="0" err="1">
-                <a:solidFill>
-                  <a:schemeClr val="tx1"/>
-                </a:solidFill>
-                <a:latin typeface="Arial" panose="020B0604020202020204" pitchFamily="34" charset="0"/>
-                <a:cs typeface="Arial" panose="020B0604020202020204" pitchFamily="34" charset="0"/>
-              </a:rPr>
-              <a:t>erkennen</a:t>
-            </a:r>
-            <a:r>
-              <a:rPr lang="en-US" sz="1600" b="1" dirty="0">
-                <a:solidFill>
-                  <a:schemeClr val="tx1"/>
-                </a:solidFill>
-                <a:latin typeface="Arial" panose="020B0604020202020204" pitchFamily="34" charset="0"/>
-                <a:cs typeface="Arial" panose="020B0604020202020204" pitchFamily="34" charset="0"/>
-              </a:rPr>
-              <a:t>.</a:t>
-            </a:r>
-            <a:endParaRPr lang="en-US" sz="1600" dirty="0">
-              <a:solidFill>
-                <a:schemeClr val="tx1"/>
-              </a:solidFill>
-              <a:latin typeface="Arial" panose="020B0604020202020204" pitchFamily="34" charset="0"/>
-              <a:cs typeface="Arial" panose="020B0604020202020204" pitchFamily="34" charset="0"/>
-            </a:endParaRPr>
-          </a:p>
-        </p:txBody>
-      </p:sp>
     </p:spTree>
     <p:extLst>
       <p:ext uri="{BB962C8B-B14F-4D97-AF65-F5344CB8AC3E}">
@@ -6221,84 +5795,6 @@
   <p:clrMapOvr>
     <a:masterClrMapping/>
   </p:clrMapOvr>
-  <p:timing>
-    <p:tnLst>
-      <p:par>
-        <p:cTn id="1" dur="indefinite" restart="never" nodeType="tmRoot">
-          <p:childTnLst>
-            <p:seq concurrent="1" nextAc="seek">
-              <p:cTn id="2" dur="indefinite" nodeType="mainSeq">
-                <p:childTnLst>
-                  <p:par>
-                    <p:cTn id="3" fill="hold">
-                      <p:stCondLst>
-                        <p:cond delay="indefinite"/>
-                      </p:stCondLst>
-                      <p:childTnLst>
-                        <p:par>
-                          <p:cTn id="4" fill="hold">
-                            <p:stCondLst>
-                              <p:cond delay="0"/>
-                            </p:stCondLst>
-                            <p:childTnLst>
-                              <p:par>
-                                <p:cTn id="5" presetID="1" presetClass="entr" presetSubtype="0" fill="hold" grpId="0" nodeType="clickEffect">
-                                  <p:stCondLst>
-                                    <p:cond delay="0"/>
-                                  </p:stCondLst>
-                                  <p:childTnLst>
-                                    <p:set>
-                                      <p:cBhvr>
-                                        <p:cTn id="6" dur="1" fill="hold">
-                                          <p:stCondLst>
-                                            <p:cond delay="0"/>
-                                          </p:stCondLst>
-                                        </p:cTn>
-                                        <p:tgtEl>
-                                          <p:spTgt spid="13"/>
-                                        </p:tgtEl>
-                                        <p:attrNameLst>
-                                          <p:attrName>style.visibility</p:attrName>
-                                        </p:attrNameLst>
-                                      </p:cBhvr>
-                                      <p:to>
-                                        <p:strVal val="visible"/>
-                                      </p:to>
-                                    </p:set>
-                                  </p:childTnLst>
-                                </p:cTn>
-                              </p:par>
-                            </p:childTnLst>
-                          </p:cTn>
-                        </p:par>
-                      </p:childTnLst>
-                    </p:cTn>
-                  </p:par>
-                </p:childTnLst>
-              </p:cTn>
-              <p:prevCondLst>
-                <p:cond evt="onPrev" delay="0">
-                  <p:tgtEl>
-                    <p:sldTgt/>
-                  </p:tgtEl>
-                </p:cond>
-              </p:prevCondLst>
-              <p:nextCondLst>
-                <p:cond evt="onNext" delay="0">
-                  <p:tgtEl>
-                    <p:sldTgt/>
-                  </p:tgtEl>
-                </p:cond>
-              </p:nextCondLst>
-            </p:seq>
-          </p:childTnLst>
-        </p:cTn>
-      </p:par>
-    </p:tnLst>
-    <p:bldLst>
-      <p:bldP spid="13" grpId="0" animBg="1"/>
-    </p:bldLst>
-  </p:timing>
 </p:sld>
 </file>
 
@@ -6336,157 +5832,14 @@
           <a:p>
             <a:r>
               <a:rPr lang="de-DE" dirty="0"/>
-              <a:t>Pflichtenheft</a:t>
-            </a:r>
-          </a:p>
-        </p:txBody>
-      </p:sp>
-      <p:sp>
-        <p:nvSpPr>
-          <p:cNvPr id="3" name="Textfeld 2"/>
-          <p:cNvSpPr txBox="1"/>
-          <p:nvPr/>
-        </p:nvSpPr>
-        <p:spPr>
-          <a:xfrm>
-            <a:off x="628650" y="1690689"/>
-            <a:ext cx="6794296" cy="646331"/>
-          </a:xfrm>
-          <a:prstGeom prst="rect">
-            <a:avLst/>
-          </a:prstGeom>
-          <a:noFill/>
-        </p:spPr>
-        <p:txBody>
-          <a:bodyPr wrap="none" rtlCol="0">
-            <a:spAutoFit/>
-          </a:bodyPr>
-          <a:lstStyle/>
-          <a:p>
-            <a:r>
-              <a:rPr lang="de-DE" dirty="0"/>
-              <a:t>Entwicklung eines </a:t>
-            </a:r>
-            <a:r>
-              <a:rPr lang="de-DE" dirty="0" err="1"/>
-              <a:t>GraphViewer</a:t>
-            </a:r>
-            <a:r>
-              <a:rPr lang="de-DE" dirty="0"/>
-              <a:t>, welcher durch </a:t>
-            </a:r>
-            <a:r>
-              <a:rPr lang="de-DE" dirty="0" err="1"/>
-              <a:t>Plugins</a:t>
-            </a:r>
-            <a:r>
-              <a:rPr lang="de-DE" dirty="0"/>
-              <a:t> erweiterbar ist.</a:t>
-            </a:r>
-          </a:p>
-          <a:p>
-            <a:endParaRPr lang="de-DE" dirty="0"/>
-          </a:p>
-        </p:txBody>
-      </p:sp>
-      <p:sp>
-        <p:nvSpPr>
-          <p:cNvPr id="4" name="Textfeld 3"/>
-          <p:cNvSpPr txBox="1"/>
-          <p:nvPr/>
-        </p:nvSpPr>
-        <p:spPr>
-          <a:xfrm>
-            <a:off x="1281792" y="3894547"/>
-            <a:ext cx="5439747" cy="1754326"/>
-          </a:xfrm>
-          <a:prstGeom prst="rect">
-            <a:avLst/>
-          </a:prstGeom>
-          <a:noFill/>
-        </p:spPr>
-        <p:txBody>
-          <a:bodyPr wrap="square" rtlCol="0">
-            <a:spAutoFit/>
-          </a:bodyPr>
-          <a:lstStyle/>
-          <a:p>
-            <a:pPr marL="285750" indent="-285750">
-              <a:buClr>
-                <a:srgbClr val="80A5AB"/>
-              </a:buClr>
-              <a:buFont typeface="Wingdings" panose="05000000000000000000" pitchFamily="2" charset="2"/>
-              <a:buChar char="§"/>
-            </a:pPr>
-            <a:r>
-              <a:rPr lang="de-DE" dirty="0"/>
-              <a:t>Anzeigen und Navigieren von Graphen</a:t>
-            </a:r>
-          </a:p>
-          <a:p>
-            <a:pPr marL="285750" indent="-285750">
-              <a:buClr>
-                <a:srgbClr val="80A5AB"/>
-              </a:buClr>
-              <a:buFont typeface="Wingdings" panose="05000000000000000000" pitchFamily="2" charset="2"/>
-              <a:buChar char="§"/>
-            </a:pPr>
-            <a:r>
-              <a:rPr lang="de-DE" dirty="0"/>
-              <a:t>Filtern bestimmter Knoten und Kanten</a:t>
-            </a:r>
-          </a:p>
-          <a:p>
-            <a:pPr marL="285750" indent="-285750">
-              <a:buClr>
-                <a:srgbClr val="80A5AB"/>
-              </a:buClr>
-              <a:buFont typeface="Wingdings" panose="05000000000000000000" pitchFamily="2" charset="2"/>
-              <a:buChar char="§"/>
-            </a:pPr>
-            <a:r>
-              <a:rPr lang="de-DE" dirty="0"/>
-              <a:t>Speichern der visualisierten Graphen</a:t>
-            </a:r>
-          </a:p>
-          <a:p>
-            <a:pPr marL="285750" indent="-285750">
-              <a:buClr>
-                <a:srgbClr val="80A5AB"/>
-              </a:buClr>
-              <a:buFont typeface="Wingdings" panose="05000000000000000000" pitchFamily="2" charset="2"/>
-              <a:buChar char="§"/>
-            </a:pPr>
-            <a:r>
-              <a:rPr lang="de-DE" dirty="0"/>
-              <a:t>Laden von Programmgraphen</a:t>
-            </a:r>
-          </a:p>
-          <a:p>
-            <a:pPr marL="285750" indent="-285750">
-              <a:buClr>
-                <a:srgbClr val="80A5AB"/>
-              </a:buClr>
-              <a:buFont typeface="Wingdings" panose="05000000000000000000" pitchFamily="2" charset="2"/>
-              <a:buChar char="§"/>
-            </a:pPr>
-            <a:r>
-              <a:rPr lang="de-DE" dirty="0"/>
-              <a:t>An JOANA angepasste Visualisierung</a:t>
-            </a:r>
-          </a:p>
-          <a:p>
-            <a:pPr marL="285750" indent="-285750">
-              <a:buFontTx/>
-              <a:buChar char="-"/>
-            </a:pPr>
-            <a:endParaRPr lang="de-DE" dirty="0"/>
+              <a:t>Live-demo</a:t>
+            </a:r>
           </a:p>
         </p:txBody>
       </p:sp>
       <p:pic>
         <p:nvPicPr>
-          <p:cNvPr id="5" name="Grafik 4"/>
+          <p:cNvPr id="3" name="Grafik 2"/>
           <p:cNvPicPr>
             <a:picLocks noChangeAspect="1"/>
           </p:cNvPicPr>
@@ -6506,68 +5859,8 @@
         </p:blipFill>
         <p:spPr>
           <a:xfrm>
-            <a:off x="6721539" y="4459348"/>
-            <a:ext cx="910901" cy="910901"/>
-          </a:xfrm>
-          <a:prstGeom prst="rect">
-            <a:avLst/>
-          </a:prstGeom>
-        </p:spPr>
-      </p:pic>
-      <p:pic>
-        <p:nvPicPr>
-          <p:cNvPr id="6" name="Grafik 5"/>
-          <p:cNvPicPr>
-            <a:picLocks noChangeAspect="1"/>
-          </p:cNvPicPr>
-          <p:nvPr/>
-        </p:nvPicPr>
-        <p:blipFill>
-          <a:blip r:embed="rId3">
-            <a:extLst>
-              <a:ext uri="{28A0092B-C50C-407E-A947-70E740481C1C}">
-                <a14:useLocalDpi xmlns:a14="http://schemas.microsoft.com/office/drawing/2010/main" val="0"/>
-              </a:ext>
-            </a:extLst>
-          </a:blip>
-          <a:stretch>
-            <a:fillRect/>
-          </a:stretch>
-        </p:blipFill>
-        <p:spPr>
-          <a:xfrm>
-            <a:off x="6721540" y="3170459"/>
-            <a:ext cx="910901" cy="910901"/>
-          </a:xfrm>
-          <a:prstGeom prst="rect">
-            <a:avLst/>
-          </a:prstGeom>
-        </p:spPr>
-      </p:pic>
-      <p:pic>
-        <p:nvPicPr>
-          <p:cNvPr id="7" name="Grafik 6"/>
-          <p:cNvPicPr>
-            <a:picLocks noChangeAspect="1"/>
-          </p:cNvPicPr>
-          <p:nvPr/>
-        </p:nvPicPr>
-        <p:blipFill>
-          <a:blip r:embed="rId4">
-            <a:extLst>
-              <a:ext uri="{28A0092B-C50C-407E-A947-70E740481C1C}">
-                <a14:useLocalDpi xmlns:a14="http://schemas.microsoft.com/office/drawing/2010/main" val="0"/>
-              </a:ext>
-            </a:extLst>
-          </a:blip>
-          <a:stretch>
-            <a:fillRect/>
-          </a:stretch>
-        </p:blipFill>
-        <p:spPr>
-          <a:xfrm>
-            <a:off x="1326113" y="2337020"/>
-            <a:ext cx="1687674" cy="1119001"/>
+            <a:off x="1682563" y="1575194"/>
+            <a:ext cx="5886856" cy="4488652"/>
           </a:xfrm>
           <a:prstGeom prst="rect">
             <a:avLst/>
@@ -6577,7 +5870,7 @@
     </p:spTree>
     <p:extLst>
       <p:ext uri="{BB962C8B-B14F-4D97-AF65-F5344CB8AC3E}">
-        <p14:creationId xmlns:p14="http://schemas.microsoft.com/office/powerpoint/2010/main" val="605918426"/>
+        <p14:creationId xmlns:p14="http://schemas.microsoft.com/office/powerpoint/2010/main" val="2174044139"/>
       </p:ext>
     </p:extLst>
   </p:cSld>
@@ -6621,6 +5914,291 @@
           <a:p>
             <a:r>
               <a:rPr lang="de-DE" dirty="0"/>
+              <a:t>Pflichtenheft</a:t>
+            </a:r>
+          </a:p>
+        </p:txBody>
+      </p:sp>
+      <p:sp>
+        <p:nvSpPr>
+          <p:cNvPr id="3" name="Textfeld 2"/>
+          <p:cNvSpPr txBox="1"/>
+          <p:nvPr/>
+        </p:nvSpPr>
+        <p:spPr>
+          <a:xfrm>
+            <a:off x="628650" y="1690689"/>
+            <a:ext cx="6794296" cy="646331"/>
+          </a:xfrm>
+          <a:prstGeom prst="rect">
+            <a:avLst/>
+          </a:prstGeom>
+          <a:noFill/>
+        </p:spPr>
+        <p:txBody>
+          <a:bodyPr wrap="none" rtlCol="0">
+            <a:spAutoFit/>
+          </a:bodyPr>
+          <a:lstStyle/>
+          <a:p>
+            <a:r>
+              <a:rPr lang="de-DE" dirty="0"/>
+              <a:t>Entwicklung eines </a:t>
+            </a:r>
+            <a:r>
+              <a:rPr lang="de-DE" dirty="0" err="1"/>
+              <a:t>GraphViewer</a:t>
+            </a:r>
+            <a:r>
+              <a:rPr lang="de-DE" dirty="0"/>
+              <a:t>, welcher durch </a:t>
+            </a:r>
+            <a:r>
+              <a:rPr lang="de-DE" dirty="0" err="1"/>
+              <a:t>Plugins</a:t>
+            </a:r>
+            <a:r>
+              <a:rPr lang="de-DE" dirty="0"/>
+              <a:t> erweiterbar ist.</a:t>
+            </a:r>
+          </a:p>
+          <a:p>
+            <a:endParaRPr lang="de-DE" dirty="0"/>
+          </a:p>
+        </p:txBody>
+      </p:sp>
+      <p:sp>
+        <p:nvSpPr>
+          <p:cNvPr id="4" name="Textfeld 3"/>
+          <p:cNvSpPr txBox="1"/>
+          <p:nvPr/>
+        </p:nvSpPr>
+        <p:spPr>
+          <a:xfrm>
+            <a:off x="1281792" y="3894547"/>
+            <a:ext cx="5439747" cy="1754326"/>
+          </a:xfrm>
+          <a:prstGeom prst="rect">
+            <a:avLst/>
+          </a:prstGeom>
+          <a:noFill/>
+        </p:spPr>
+        <p:txBody>
+          <a:bodyPr wrap="square" rtlCol="0">
+            <a:spAutoFit/>
+          </a:bodyPr>
+          <a:lstStyle/>
+          <a:p>
+            <a:pPr marL="285750" indent="-285750">
+              <a:buClr>
+                <a:srgbClr val="80A5AB"/>
+              </a:buClr>
+              <a:buFont typeface="Wingdings" panose="05000000000000000000" pitchFamily="2" charset="2"/>
+              <a:buChar char="§"/>
+            </a:pPr>
+            <a:r>
+              <a:rPr lang="de-DE" dirty="0"/>
+              <a:t>Anzeigen und Navigieren von Graphen</a:t>
+            </a:r>
+          </a:p>
+          <a:p>
+            <a:pPr marL="285750" indent="-285750">
+              <a:buClr>
+                <a:srgbClr val="80A5AB"/>
+              </a:buClr>
+              <a:buFont typeface="Wingdings" panose="05000000000000000000" pitchFamily="2" charset="2"/>
+              <a:buChar char="§"/>
+            </a:pPr>
+            <a:r>
+              <a:rPr lang="de-DE" dirty="0"/>
+              <a:t>Filtern bestimmter Knoten und Kanten</a:t>
+            </a:r>
+          </a:p>
+          <a:p>
+            <a:pPr marL="285750" indent="-285750">
+              <a:buClr>
+                <a:srgbClr val="80A5AB"/>
+              </a:buClr>
+              <a:buFont typeface="Wingdings" panose="05000000000000000000" pitchFamily="2" charset="2"/>
+              <a:buChar char="§"/>
+            </a:pPr>
+            <a:r>
+              <a:rPr lang="de-DE" dirty="0"/>
+              <a:t>Speichern der visualisierten Graphen</a:t>
+            </a:r>
+          </a:p>
+          <a:p>
+            <a:pPr marL="285750" indent="-285750">
+              <a:buClr>
+                <a:srgbClr val="80A5AB"/>
+              </a:buClr>
+              <a:buFont typeface="Wingdings" panose="05000000000000000000" pitchFamily="2" charset="2"/>
+              <a:buChar char="§"/>
+            </a:pPr>
+            <a:r>
+              <a:rPr lang="de-DE" dirty="0"/>
+              <a:t>Laden von Programmgraphen</a:t>
+            </a:r>
+          </a:p>
+          <a:p>
+            <a:pPr marL="285750" indent="-285750">
+              <a:buClr>
+                <a:srgbClr val="80A5AB"/>
+              </a:buClr>
+              <a:buFont typeface="Wingdings" panose="05000000000000000000" pitchFamily="2" charset="2"/>
+              <a:buChar char="§"/>
+            </a:pPr>
+            <a:r>
+              <a:rPr lang="de-DE" dirty="0"/>
+              <a:t>An JOANA angepasste Visualisierung</a:t>
+            </a:r>
+          </a:p>
+          <a:p>
+            <a:pPr marL="285750" indent="-285750">
+              <a:buFontTx/>
+              <a:buChar char="-"/>
+            </a:pPr>
+            <a:endParaRPr lang="de-DE" dirty="0"/>
+          </a:p>
+        </p:txBody>
+      </p:sp>
+      <p:pic>
+        <p:nvPicPr>
+          <p:cNvPr id="5" name="Grafik 4"/>
+          <p:cNvPicPr>
+            <a:picLocks noChangeAspect="1"/>
+          </p:cNvPicPr>
+          <p:nvPr/>
+        </p:nvPicPr>
+        <p:blipFill>
+          <a:blip r:embed="rId2">
+            <a:extLst>
+              <a:ext uri="{28A0092B-C50C-407E-A947-70E740481C1C}">
+                <a14:useLocalDpi xmlns:a14="http://schemas.microsoft.com/office/drawing/2010/main" val="0"/>
+              </a:ext>
+            </a:extLst>
+          </a:blip>
+          <a:stretch>
+            <a:fillRect/>
+          </a:stretch>
+        </p:blipFill>
+        <p:spPr>
+          <a:xfrm>
+            <a:off x="6721539" y="4459348"/>
+            <a:ext cx="910901" cy="910901"/>
+          </a:xfrm>
+          <a:prstGeom prst="rect">
+            <a:avLst/>
+          </a:prstGeom>
+        </p:spPr>
+      </p:pic>
+      <p:pic>
+        <p:nvPicPr>
+          <p:cNvPr id="6" name="Grafik 5"/>
+          <p:cNvPicPr>
+            <a:picLocks noChangeAspect="1"/>
+          </p:cNvPicPr>
+          <p:nvPr/>
+        </p:nvPicPr>
+        <p:blipFill>
+          <a:blip r:embed="rId3">
+            <a:extLst>
+              <a:ext uri="{28A0092B-C50C-407E-A947-70E740481C1C}">
+                <a14:useLocalDpi xmlns:a14="http://schemas.microsoft.com/office/drawing/2010/main" val="0"/>
+              </a:ext>
+            </a:extLst>
+          </a:blip>
+          <a:stretch>
+            <a:fillRect/>
+          </a:stretch>
+        </p:blipFill>
+        <p:spPr>
+          <a:xfrm>
+            <a:off x="6721540" y="3170459"/>
+            <a:ext cx="910901" cy="910901"/>
+          </a:xfrm>
+          <a:prstGeom prst="rect">
+            <a:avLst/>
+          </a:prstGeom>
+        </p:spPr>
+      </p:pic>
+      <p:pic>
+        <p:nvPicPr>
+          <p:cNvPr id="7" name="Grafik 6"/>
+          <p:cNvPicPr>
+            <a:picLocks noChangeAspect="1"/>
+          </p:cNvPicPr>
+          <p:nvPr/>
+        </p:nvPicPr>
+        <p:blipFill>
+          <a:blip r:embed="rId4">
+            <a:extLst>
+              <a:ext uri="{28A0092B-C50C-407E-A947-70E740481C1C}">
+                <a14:useLocalDpi xmlns:a14="http://schemas.microsoft.com/office/drawing/2010/main" val="0"/>
+              </a:ext>
+            </a:extLst>
+          </a:blip>
+          <a:stretch>
+            <a:fillRect/>
+          </a:stretch>
+        </p:blipFill>
+        <p:spPr>
+          <a:xfrm>
+            <a:off x="1326113" y="2337020"/>
+            <a:ext cx="1687674" cy="1119001"/>
+          </a:xfrm>
+          <a:prstGeom prst="rect">
+            <a:avLst/>
+          </a:prstGeom>
+        </p:spPr>
+      </p:pic>
+    </p:spTree>
+    <p:extLst>
+      <p:ext uri="{BB962C8B-B14F-4D97-AF65-F5344CB8AC3E}">
+        <p14:creationId xmlns:p14="http://schemas.microsoft.com/office/powerpoint/2010/main" val="605918426"/>
+      </p:ext>
+    </p:extLst>
+  </p:cSld>
+  <p:clrMapOvr>
+    <a:masterClrMapping/>
+  </p:clrMapOvr>
+</p:sld>
+</file>
+
+<file path=ppt/slides/slide7.xml><?xml version="1.0" encoding="utf-8"?>
+<p:sld xmlns:a="http://schemas.openxmlformats.org/drawingml/2006/main" xmlns:r="http://schemas.openxmlformats.org/officeDocument/2006/relationships" xmlns:p="http://schemas.openxmlformats.org/presentationml/2006/main">
+  <p:cSld>
+    <p:spTree>
+      <p:nvGrpSpPr>
+        <p:cNvPr id="1" name=""/>
+        <p:cNvGrpSpPr/>
+        <p:nvPr/>
+      </p:nvGrpSpPr>
+      <p:grpSpPr>
+        <a:xfrm>
+          <a:off x="0" y="0"/>
+          <a:ext cx="0" cy="0"/>
+          <a:chOff x="0" y="0"/>
+          <a:chExt cx="0" cy="0"/>
+        </a:xfrm>
+      </p:grpSpPr>
+      <p:sp>
+        <p:nvSpPr>
+          <p:cNvPr id="2" name="Titel 1"/>
+          <p:cNvSpPr>
+            <a:spLocks noGrp="1"/>
+          </p:cNvSpPr>
+          <p:nvPr>
+            <p:ph type="title"/>
+          </p:nvPr>
+        </p:nvSpPr>
+        <p:spPr/>
+        <p:txBody>
+          <a:bodyPr/>
+          <a:lstStyle/>
+          <a:p>
+            <a:r>
+              <a:rPr lang="de-DE" dirty="0"/>
               <a:t>Entwurf</a:t>
             </a:r>
           </a:p>
@@ -7834,7 +7412,7 @@
 </p:sld>
 </file>
 
-<file path=ppt/slides/slide7.xml><?xml version="1.0" encoding="utf-8"?>
+<file path=ppt/slides/slide8.xml><?xml version="1.0" encoding="utf-8"?>
 <p:sld xmlns:a="http://schemas.openxmlformats.org/drawingml/2006/main" xmlns:r="http://schemas.openxmlformats.org/officeDocument/2006/relationships" xmlns:p="http://schemas.openxmlformats.org/presentationml/2006/main">
   <p:cSld>
     <p:spTree>
@@ -7939,7 +7517,7 @@
 </p:sld>
 </file>
 
-<file path=ppt/slides/slide8.xml><?xml version="1.0" encoding="utf-8"?>
+<file path=ppt/slides/slide9.xml><?xml version="1.0" encoding="utf-8"?>
 <p:sld xmlns:a="http://schemas.openxmlformats.org/drawingml/2006/main" xmlns:r="http://schemas.openxmlformats.org/officeDocument/2006/relationships" xmlns:p="http://schemas.openxmlformats.org/presentationml/2006/main">
   <p:cSld>
     <p:spTree>
@@ -8081,261 +7659,6 @@
     <p:extLst>
       <p:ext uri="{BB962C8B-B14F-4D97-AF65-F5344CB8AC3E}">
         <p14:creationId xmlns:p14="http://schemas.microsoft.com/office/powerpoint/2010/main" val="21897961"/>
-      </p:ext>
-    </p:extLst>
-  </p:cSld>
-  <p:clrMapOvr>
-    <a:masterClrMapping/>
-  </p:clrMapOvr>
-</p:sld>
-</file>
-
-<file path=ppt/slides/slide9.xml><?xml version="1.0" encoding="utf-8"?>
-<p:sld xmlns:a="http://schemas.openxmlformats.org/drawingml/2006/main" xmlns:r="http://schemas.openxmlformats.org/officeDocument/2006/relationships" xmlns:p="http://schemas.openxmlformats.org/presentationml/2006/main">
-  <p:cSld>
-    <p:spTree>
-      <p:nvGrpSpPr>
-        <p:cNvPr id="1" name=""/>
-        <p:cNvGrpSpPr/>
-        <p:nvPr/>
-      </p:nvGrpSpPr>
-      <p:grpSpPr>
-        <a:xfrm>
-          <a:off x="0" y="0"/>
-          <a:ext cx="0" cy="0"/>
-          <a:chOff x="0" y="0"/>
-          <a:chExt cx="0" cy="0"/>
-        </a:xfrm>
-      </p:grpSpPr>
-      <p:sp>
-        <p:nvSpPr>
-          <p:cNvPr id="2" name="Titel 1"/>
-          <p:cNvSpPr>
-            <a:spLocks noGrp="1"/>
-          </p:cNvSpPr>
-          <p:nvPr>
-            <p:ph type="title"/>
-          </p:nvPr>
-        </p:nvSpPr>
-        <p:spPr>
-          <a:xfrm>
-            <a:off x="250825" y="-5936"/>
-            <a:ext cx="8750331" cy="857250"/>
-          </a:xfrm>
-        </p:spPr>
-        <p:txBody>
-          <a:bodyPr/>
-          <a:lstStyle/>
-          <a:p>
-            <a:r>
-              <a:rPr lang="de-DE" dirty="0"/>
-              <a:t>Qualitätssicherung</a:t>
-            </a:r>
-          </a:p>
-        </p:txBody>
-      </p:sp>
-      <p:sp>
-        <p:nvSpPr>
-          <p:cNvPr id="3" name="Textfeld 2"/>
-          <p:cNvSpPr txBox="1"/>
-          <p:nvPr/>
-        </p:nvSpPr>
-        <p:spPr>
-          <a:xfrm>
-            <a:off x="628650" y="1690689"/>
-            <a:ext cx="6448240" cy="369332"/>
-          </a:xfrm>
-          <a:prstGeom prst="rect">
-            <a:avLst/>
-          </a:prstGeom>
-          <a:noFill/>
-        </p:spPr>
-        <p:txBody>
-          <a:bodyPr wrap="none" rtlCol="0">
-            <a:spAutoFit/>
-          </a:bodyPr>
-          <a:lstStyle/>
-          <a:p>
-            <a:r>
-              <a:rPr lang="de-DE" dirty="0"/>
-              <a:t>Viele Fehler waren bereits aus der </a:t>
-            </a:r>
-            <a:r>
-              <a:rPr lang="de-DE" dirty="0" err="1"/>
-              <a:t>Implementierungphase</a:t>
-            </a:r>
-            <a:r>
-              <a:rPr lang="de-DE" dirty="0"/>
-              <a:t> bekannt.</a:t>
-            </a:r>
-          </a:p>
-        </p:txBody>
-      </p:sp>
-      <p:sp>
-        <p:nvSpPr>
-          <p:cNvPr id="4" name="Textfeld 3"/>
-          <p:cNvSpPr txBox="1"/>
-          <p:nvPr/>
-        </p:nvSpPr>
-        <p:spPr>
-          <a:xfrm>
-            <a:off x="628650" y="4905843"/>
-            <a:ext cx="5728996" cy="923330"/>
-          </a:xfrm>
-          <a:prstGeom prst="rect">
-            <a:avLst/>
-          </a:prstGeom>
-          <a:noFill/>
-        </p:spPr>
-        <p:txBody>
-          <a:bodyPr wrap="square" rtlCol="0">
-            <a:spAutoFit/>
-          </a:bodyPr>
-          <a:lstStyle/>
-          <a:p>
-            <a:pPr marL="285750" indent="-285750">
-              <a:buClr>
-                <a:srgbClr val="80A5AB"/>
-              </a:buClr>
-              <a:buFont typeface="Wingdings" panose="05000000000000000000" pitchFamily="2" charset="2"/>
-              <a:buChar char="§"/>
-            </a:pPr>
-            <a:r>
-              <a:rPr lang="de-DE" dirty="0" err="1"/>
-              <a:t>JUnit</a:t>
-            </a:r>
-            <a:r>
-              <a:rPr lang="de-DE" dirty="0"/>
-              <a:t> Testfälle für einzelne </a:t>
-            </a:r>
-            <a:r>
-              <a:rPr lang="de-DE" dirty="0" err="1"/>
-              <a:t>Plugins</a:t>
-            </a:r>
-            <a:endParaRPr lang="de-DE" dirty="0"/>
-          </a:p>
-          <a:p>
-            <a:pPr marL="285750" indent="-285750">
-              <a:buClr>
-                <a:srgbClr val="80A5AB"/>
-              </a:buClr>
-              <a:buFont typeface="Wingdings" panose="05000000000000000000" pitchFamily="2" charset="2"/>
-              <a:buChar char="§"/>
-            </a:pPr>
-            <a:r>
-              <a:rPr lang="de-DE" dirty="0"/>
-              <a:t>Testszenarien </a:t>
-            </a:r>
-          </a:p>
-          <a:p>
-            <a:pPr marL="285750" indent="-285750">
-              <a:buClr>
-                <a:srgbClr val="80A5AB"/>
-              </a:buClr>
-              <a:buFont typeface="Wingdings" panose="05000000000000000000" pitchFamily="2" charset="2"/>
-              <a:buChar char="§"/>
-            </a:pPr>
-            <a:r>
-              <a:rPr lang="de-DE" dirty="0"/>
-              <a:t>Codeüberdeckung von 76,2%</a:t>
-            </a:r>
-          </a:p>
-        </p:txBody>
-      </p:sp>
-      <p:pic>
-        <p:nvPicPr>
-          <p:cNvPr id="6" name="Grafik 5"/>
-          <p:cNvPicPr>
-            <a:picLocks noChangeAspect="1"/>
-          </p:cNvPicPr>
-          <p:nvPr/>
-        </p:nvPicPr>
-        <p:blipFill>
-          <a:blip r:embed="rId2">
-            <a:extLst>
-              <a:ext uri="{28A0092B-C50C-407E-A947-70E740481C1C}">
-                <a14:useLocalDpi xmlns:a14="http://schemas.microsoft.com/office/drawing/2010/main" val="0"/>
-              </a:ext>
-            </a:extLst>
-          </a:blip>
-          <a:stretch>
-            <a:fillRect/>
-          </a:stretch>
-        </p:blipFill>
-        <p:spPr>
-          <a:xfrm>
-            <a:off x="964552" y="2746714"/>
-            <a:ext cx="1625741" cy="650296"/>
-          </a:xfrm>
-          <a:prstGeom prst="rect">
-            <a:avLst/>
-          </a:prstGeom>
-        </p:spPr>
-      </p:pic>
-      <p:sp>
-        <p:nvSpPr>
-          <p:cNvPr id="7" name="Textfeld 6"/>
-          <p:cNvSpPr txBox="1"/>
-          <p:nvPr/>
-        </p:nvSpPr>
-        <p:spPr>
-          <a:xfrm>
-            <a:off x="6357646" y="2746710"/>
-            <a:ext cx="2268891" cy="769441"/>
-          </a:xfrm>
-          <a:prstGeom prst="rect">
-            <a:avLst/>
-          </a:prstGeom>
-          <a:noFill/>
-        </p:spPr>
-        <p:txBody>
-          <a:bodyPr wrap="none" rtlCol="0">
-            <a:spAutoFit/>
-          </a:bodyPr>
-          <a:lstStyle/>
-          <a:p>
-            <a:r>
-              <a:rPr lang="de-DE" sz="4400" dirty="0" err="1"/>
-              <a:t>EclEmma</a:t>
-            </a:r>
-            <a:endParaRPr lang="de-DE" sz="4400" dirty="0"/>
-          </a:p>
-        </p:txBody>
-      </p:sp>
-      <p:pic>
-        <p:nvPicPr>
-          <p:cNvPr id="5" name="Grafik 4"/>
-          <p:cNvPicPr>
-            <a:picLocks noChangeAspect="1"/>
-          </p:cNvPicPr>
-          <p:nvPr/>
-        </p:nvPicPr>
-        <p:blipFill>
-          <a:blip r:embed="rId3">
-            <a:extLst>
-              <a:ext uri="{28A0092B-C50C-407E-A947-70E740481C1C}">
-                <a14:useLocalDpi xmlns:a14="http://schemas.microsoft.com/office/drawing/2010/main" val="0"/>
-              </a:ext>
-            </a:extLst>
-          </a:blip>
-          <a:stretch>
-            <a:fillRect/>
-          </a:stretch>
-        </p:blipFill>
-        <p:spPr>
-          <a:xfrm>
-            <a:off x="3673491" y="2360147"/>
-            <a:ext cx="1905000" cy="1857375"/>
-          </a:xfrm>
-          <a:prstGeom prst="rect">
-            <a:avLst/>
-          </a:prstGeom>
-        </p:spPr>
-      </p:pic>
-    </p:spTree>
-    <p:extLst>
-      <p:ext uri="{BB962C8B-B14F-4D97-AF65-F5344CB8AC3E}">
-        <p14:creationId xmlns:p14="http://schemas.microsoft.com/office/powerpoint/2010/main" val="1427434407"/>
       </p:ext>
     </p:extLst>
   </p:cSld>

</xml_diff>

<commit_message>
added fazit to presentation
</commit_message>
<xml_diff>
--- a/final/presentation.pptx
+++ b/final/presentation.pptx
@@ -3969,7 +3969,7 @@
             </a:pPr>
             <a:r>
               <a:rPr lang="de-DE" dirty="0"/>
-              <a:t>Codeüberdeckung von 76,2%</a:t>
+              <a:t>Codeüberdeckung von 59% (automatisiert)</a:t>
             </a:r>
           </a:p>
         </p:txBody>
@@ -4116,6 +4116,141 @@
           </a:p>
         </p:txBody>
       </p:sp>
+      <p:sp>
+        <p:nvSpPr>
+          <p:cNvPr id="5" name="Textfeld 4"/>
+          <p:cNvSpPr txBox="1"/>
+          <p:nvPr/>
+        </p:nvSpPr>
+        <p:spPr>
+          <a:xfrm>
+            <a:off x="641221" y="2235198"/>
+            <a:ext cx="7969539" cy="2862322"/>
+          </a:xfrm>
+          <a:prstGeom prst="rect">
+            <a:avLst/>
+          </a:prstGeom>
+          <a:noFill/>
+        </p:spPr>
+        <p:txBody>
+          <a:bodyPr wrap="square" rtlCol="0">
+            <a:spAutoFit/>
+          </a:bodyPr>
+          <a:lstStyle/>
+          <a:p>
+            <a:pPr marL="285750" indent="-285750">
+              <a:buClr>
+                <a:srgbClr val="80A5AB"/>
+              </a:buClr>
+              <a:buFont typeface="Wingdings" panose="05000000000000000000" pitchFamily="2" charset="2"/>
+              <a:buChar char="§"/>
+            </a:pPr>
+            <a:r>
+              <a:rPr lang="de-DE" b="1" dirty="0"/>
+              <a:t>Welche Probleme sind aufgetreten?</a:t>
+            </a:r>
+          </a:p>
+          <a:p>
+            <a:pPr marL="285750" indent="-285750">
+              <a:buClr>
+                <a:srgbClr val="80A5AB"/>
+              </a:buClr>
+              <a:buFont typeface="Wingdings" panose="05000000000000000000" pitchFamily="2" charset="2"/>
+              <a:buChar char="§"/>
+            </a:pPr>
+            <a:endParaRPr lang="de-DE" b="1" dirty="0"/>
+          </a:p>
+          <a:p>
+            <a:pPr marL="285750" indent="-285750">
+              <a:buClr>
+                <a:srgbClr val="80A5AB"/>
+              </a:buClr>
+              <a:buFont typeface="Wingdings" panose="05000000000000000000" pitchFamily="2" charset="2"/>
+              <a:buChar char="§"/>
+            </a:pPr>
+            <a:endParaRPr lang="de-DE" b="1" dirty="0"/>
+          </a:p>
+          <a:p>
+            <a:pPr marL="285750" indent="-285750">
+              <a:buClr>
+                <a:srgbClr val="80A5AB"/>
+              </a:buClr>
+              <a:buFont typeface="Wingdings" panose="05000000000000000000" pitchFamily="2" charset="2"/>
+              <a:buChar char="§"/>
+            </a:pPr>
+            <a:r>
+              <a:rPr lang="de-DE" b="1" dirty="0"/>
+              <a:t>Was lief gut?</a:t>
+            </a:r>
+          </a:p>
+          <a:p>
+            <a:pPr marL="285750" indent="-285750">
+              <a:buClr>
+                <a:srgbClr val="80A5AB"/>
+              </a:buClr>
+              <a:buFont typeface="Wingdings" panose="05000000000000000000" pitchFamily="2" charset="2"/>
+              <a:buChar char="§"/>
+            </a:pPr>
+            <a:endParaRPr lang="de-DE" b="1" dirty="0"/>
+          </a:p>
+          <a:p>
+            <a:pPr marL="285750" indent="-285750">
+              <a:buClr>
+                <a:srgbClr val="80A5AB"/>
+              </a:buClr>
+              <a:buFont typeface="Wingdings" panose="05000000000000000000" pitchFamily="2" charset="2"/>
+              <a:buChar char="§"/>
+            </a:pPr>
+            <a:endParaRPr lang="de-DE" b="1" dirty="0"/>
+          </a:p>
+          <a:p>
+            <a:pPr marL="285750" indent="-285750">
+              <a:buClr>
+                <a:srgbClr val="80A5AB"/>
+              </a:buClr>
+              <a:buFont typeface="Wingdings" panose="05000000000000000000" pitchFamily="2" charset="2"/>
+              <a:buChar char="§"/>
+            </a:pPr>
+            <a:r>
+              <a:rPr lang="de-DE" b="1" dirty="0"/>
+              <a:t>Was würden wir anders machen?</a:t>
+            </a:r>
+          </a:p>
+          <a:p>
+            <a:pPr marL="285750" indent="-285750">
+              <a:buClr>
+                <a:srgbClr val="80A5AB"/>
+              </a:buClr>
+              <a:buFont typeface="Wingdings" panose="05000000000000000000" pitchFamily="2" charset="2"/>
+              <a:buChar char="§"/>
+            </a:pPr>
+            <a:endParaRPr lang="de-DE" b="1" dirty="0"/>
+          </a:p>
+          <a:p>
+            <a:pPr marL="285750" indent="-285750">
+              <a:buClr>
+                <a:srgbClr val="80A5AB"/>
+              </a:buClr>
+              <a:buFont typeface="Wingdings" panose="05000000000000000000" pitchFamily="2" charset="2"/>
+              <a:buChar char="§"/>
+            </a:pPr>
+            <a:endParaRPr lang="de-DE" b="1" dirty="0"/>
+          </a:p>
+          <a:p>
+            <a:pPr marL="285750" indent="-285750">
+              <a:buClr>
+                <a:srgbClr val="80A5AB"/>
+              </a:buClr>
+              <a:buFont typeface="Wingdings" panose="05000000000000000000" pitchFamily="2" charset="2"/>
+              <a:buChar char="§"/>
+            </a:pPr>
+            <a:r>
+              <a:rPr lang="de-DE" b="1" dirty="0"/>
+              <a:t>Was haben wir gelernt?</a:t>
+            </a:r>
+          </a:p>
+        </p:txBody>
+      </p:sp>
     </p:spTree>
     <p:extLst>
       <p:ext uri="{BB962C8B-B14F-4D97-AF65-F5344CB8AC3E}">
@@ -5131,7 +5266,7 @@
             </a:r>
             <a:r>
               <a:rPr lang="de-DE" sz="2000" dirty="0"/>
-              <a:t>Betrachten und Analysieren von Graphen.</a:t>
+              <a:t>Betrachten von Graphen.</a:t>
             </a:r>
           </a:p>
           <a:p>

</xml_diff>

<commit_message>
Added new "Ziel" Slide, changed "Entwurf" and coverage
</commit_message>
<xml_diff>
--- a/final/presentation.pptx
+++ b/final/presentation.pptx
@@ -5,20 +5,21 @@
     <p:sldMasterId id="2147483660" r:id="rId1"/>
   </p:sldMasterIdLst>
   <p:notesMasterIdLst>
-    <p:notesMasterId r:id="rId13"/>
+    <p:notesMasterId r:id="rId14"/>
   </p:notesMasterIdLst>
   <p:sldIdLst>
     <p:sldId id="256" r:id="rId2"/>
     <p:sldId id="266" r:id="rId3"/>
-    <p:sldId id="259" r:id="rId4"/>
-    <p:sldId id="257" r:id="rId5"/>
-    <p:sldId id="265" r:id="rId6"/>
-    <p:sldId id="260" r:id="rId7"/>
-    <p:sldId id="261" r:id="rId8"/>
-    <p:sldId id="262" r:id="rId9"/>
-    <p:sldId id="268" r:id="rId10"/>
-    <p:sldId id="263" r:id="rId11"/>
-    <p:sldId id="264" r:id="rId12"/>
+    <p:sldId id="257" r:id="rId4"/>
+    <p:sldId id="259" r:id="rId5"/>
+    <p:sldId id="269" r:id="rId6"/>
+    <p:sldId id="265" r:id="rId7"/>
+    <p:sldId id="260" r:id="rId8"/>
+    <p:sldId id="261" r:id="rId9"/>
+    <p:sldId id="262" r:id="rId10"/>
+    <p:sldId id="268" r:id="rId11"/>
+    <p:sldId id="263" r:id="rId12"/>
+    <p:sldId id="264" r:id="rId13"/>
   </p:sldIdLst>
   <p:sldSz cx="9144000" cy="6858000" type="screen4x3"/>
   <p:notesSz cx="6858000" cy="9144000"/>
@@ -2067,7 +2068,7 @@
           <a:p>
             <a:fld id="{8525EBD8-2338-401D-BEBD-1C4CA260E0A3}" type="datetimeFigureOut">
               <a:rPr lang="de-DE" smtClean="0"/>
-              <a:t>12.09.2016</a:t>
+              <a:t>21.09.2016</a:t>
             </a:fld>
             <a:endParaRPr lang="de-DE"/>
           </a:p>
@@ -2695,7 +2696,7 @@
           <a:p>
             <a:fld id="{F95B695E-2CB7-4AE2-A912-DE1F0704EC18}" type="datetimeFigureOut">
               <a:rPr lang="de-DE" smtClean="0"/>
-              <a:t>12.09.2016</a:t>
+              <a:t>21.09.2016</a:t>
             </a:fld>
             <a:endParaRPr lang="de-DE"/>
           </a:p>
@@ -2938,7 +2939,7 @@
                 <a:latin typeface="Arial" pitchFamily="34" charset="0"/>
                 <a:cs typeface="Arial" pitchFamily="34" charset="0"/>
               </a:rPr>
-              <a:t>13.09.2016</a:t>
+              <a:t>22.09.2016</a:t>
             </a:r>
           </a:p>
         </p:txBody>
@@ -3841,6 +3842,157 @@
       </p:grpSpPr>
       <p:sp>
         <p:nvSpPr>
+          <p:cNvPr id="3" name="Titel 2"/>
+          <p:cNvSpPr>
+            <a:spLocks noGrp="1"/>
+          </p:cNvSpPr>
+          <p:nvPr>
+            <p:ph type="title"/>
+          </p:nvPr>
+        </p:nvSpPr>
+        <p:spPr/>
+        <p:txBody>
+          <a:bodyPr/>
+          <a:lstStyle/>
+          <a:p>
+            <a:r>
+              <a:rPr lang="de-DE" dirty="0"/>
+              <a:t>Implementierung</a:t>
+            </a:r>
+          </a:p>
+        </p:txBody>
+      </p:sp>
+      <p:graphicFrame>
+        <p:nvGraphicFramePr>
+          <p:cNvPr id="4" name="Diagramm 3"/>
+          <p:cNvGraphicFramePr>
+            <a:graphicFrameLocks/>
+          </p:cNvGraphicFramePr>
+          <p:nvPr>
+            <p:extLst>
+              <p:ext uri="{D42A27DB-BD31-4B8C-83A1-F6EECF244321}">
+                <p14:modId xmlns:p14="http://schemas.microsoft.com/office/powerpoint/2010/main" val="1491071590"/>
+              </p:ext>
+            </p:extLst>
+          </p:nvPr>
+        </p:nvGraphicFramePr>
+        <p:xfrm>
+          <a:off x="4097178" y="1797803"/>
+          <a:ext cx="4057777" cy="3789608"/>
+        </p:xfrm>
+        <a:graphic>
+          <a:graphicData uri="http://schemas.openxmlformats.org/drawingml/2006/chart">
+            <c:chart xmlns:c="http://schemas.openxmlformats.org/drawingml/2006/chart" xmlns:r="http://schemas.openxmlformats.org/officeDocument/2006/relationships" r:id="rId2"/>
+          </a:graphicData>
+        </a:graphic>
+      </p:graphicFrame>
+      <p:sp>
+        <p:nvSpPr>
+          <p:cNvPr id="5" name="Textfeld 4"/>
+          <p:cNvSpPr txBox="1"/>
+          <p:nvPr/>
+        </p:nvSpPr>
+        <p:spPr>
+          <a:xfrm>
+            <a:off x="746450" y="3092442"/>
+            <a:ext cx="2828467" cy="1200329"/>
+          </a:xfrm>
+          <a:prstGeom prst="rect">
+            <a:avLst/>
+          </a:prstGeom>
+          <a:noFill/>
+        </p:spPr>
+        <p:txBody>
+          <a:bodyPr wrap="none" rtlCol="0">
+            <a:spAutoFit/>
+          </a:bodyPr>
+          <a:lstStyle/>
+          <a:p>
+            <a:pPr marL="285750" indent="-285750">
+              <a:buClr>
+                <a:srgbClr val="80A5AB"/>
+              </a:buClr>
+              <a:buFont typeface="Wingdings" panose="05000000000000000000" pitchFamily="2" charset="2"/>
+              <a:buChar char="§"/>
+            </a:pPr>
+            <a:r>
+              <a:rPr lang="de-DE" dirty="0"/>
+              <a:t>105 Klassen</a:t>
+            </a:r>
+          </a:p>
+          <a:p>
+            <a:pPr marL="285750" indent="-285750">
+              <a:buClr>
+                <a:srgbClr val="80A5AB"/>
+              </a:buClr>
+              <a:buFont typeface="Wingdings" panose="05000000000000000000" pitchFamily="2" charset="2"/>
+              <a:buChar char="§"/>
+            </a:pPr>
+            <a:r>
+              <a:rPr lang="de-DE" dirty="0"/>
+              <a:t>37 Interfaces</a:t>
+            </a:r>
+          </a:p>
+          <a:p>
+            <a:pPr marL="285750" indent="-285750">
+              <a:buClr>
+                <a:srgbClr val="80A5AB"/>
+              </a:buClr>
+              <a:buFont typeface="Wingdings" panose="05000000000000000000" pitchFamily="2" charset="2"/>
+              <a:buChar char="§"/>
+            </a:pPr>
+            <a:r>
+              <a:rPr lang="de-DE" dirty="0"/>
+              <a:t>9043 Zeilen Code</a:t>
+            </a:r>
+          </a:p>
+          <a:p>
+            <a:pPr marL="285750" indent="-285750">
+              <a:buClr>
+                <a:srgbClr val="80A5AB"/>
+              </a:buClr>
+              <a:buFont typeface="Wingdings" panose="05000000000000000000" pitchFamily="2" charset="2"/>
+              <a:buChar char="§"/>
+            </a:pPr>
+            <a:r>
+              <a:rPr lang="de-DE" dirty="0"/>
+              <a:t>3070 Zeilen Kommentare</a:t>
+            </a:r>
+          </a:p>
+        </p:txBody>
+      </p:sp>
+    </p:spTree>
+    <p:extLst>
+      <p:ext uri="{BB962C8B-B14F-4D97-AF65-F5344CB8AC3E}">
+        <p14:creationId xmlns:p14="http://schemas.microsoft.com/office/powerpoint/2010/main" val="21897961"/>
+      </p:ext>
+    </p:extLst>
+  </p:cSld>
+  <p:clrMapOvr>
+    <a:masterClrMapping/>
+  </p:clrMapOvr>
+</p:sld>
+</file>
+
+<file path=ppt/slides/slide11.xml><?xml version="1.0" encoding="utf-8"?>
+<p:sld xmlns:a="http://schemas.openxmlformats.org/drawingml/2006/main" xmlns:r="http://schemas.openxmlformats.org/officeDocument/2006/relationships" xmlns:p="http://schemas.openxmlformats.org/presentationml/2006/main">
+  <p:cSld>
+    <p:spTree>
+      <p:nvGrpSpPr>
+        <p:cNvPr id="1" name=""/>
+        <p:cNvGrpSpPr/>
+        <p:nvPr/>
+      </p:nvGrpSpPr>
+      <p:grpSpPr>
+        <a:xfrm>
+          <a:off x="0" y="0"/>
+          <a:ext cx="0" cy="0"/>
+          <a:chOff x="0" y="0"/>
+          <a:chExt cx="0" cy="0"/>
+        </a:xfrm>
+      </p:grpSpPr>
+      <p:sp>
+        <p:nvSpPr>
           <p:cNvPr id="2" name="Titel 1"/>
           <p:cNvSpPr>
             <a:spLocks noGrp="1"/>
@@ -3969,7 +4121,7 @@
             </a:pPr>
             <a:r>
               <a:rPr lang="de-DE" dirty="0"/>
-              <a:t>Codeüberdeckung von 59% (automatisiert)</a:t>
+              <a:t>Codeüberdeckung von ca. 83% (manuell)</a:t>
             </a:r>
           </a:p>
         </p:txBody>
@@ -4077,7 +4229,7 @@
 </p:sld>
 </file>
 
-<file path=ppt/slides/slide11.xml><?xml version="1.0" encoding="utf-8"?>
+<file path=ppt/slides/slide12.xml><?xml version="1.0" encoding="utf-8"?>
 <p:sld xmlns:a="http://schemas.openxmlformats.org/drawingml/2006/main" xmlns:r="http://schemas.openxmlformats.org/officeDocument/2006/relationships" xmlns:p="http://schemas.openxmlformats.org/presentationml/2006/main">
   <p:cSld>
     <p:spTree>
@@ -5127,6 +5279,41 @@
       </p:grpSpPr>
       <p:sp>
         <p:nvSpPr>
+          <p:cNvPr id="9" name="Textfeld 8"/>
+          <p:cNvSpPr txBox="1"/>
+          <p:nvPr/>
+        </p:nvSpPr>
+        <p:spPr>
+          <a:xfrm>
+            <a:off x="432316" y="1598746"/>
+            <a:ext cx="3845205" cy="3333170"/>
+          </a:xfrm>
+          <a:prstGeom prst="rect">
+            <a:avLst/>
+          </a:prstGeom>
+          <a:noFill/>
+          <a:ln>
+            <a:solidFill>
+              <a:srgbClr val="80A5AB"/>
+            </a:solidFill>
+          </a:ln>
+        </p:spPr>
+        <p:txBody>
+          <a:bodyPr wrap="square" rtlCol="0" anchor="t" anchorCtr="0">
+            <a:noAutofit/>
+          </a:bodyPr>
+          <a:lstStyle/>
+          <a:p>
+            <a:endParaRPr lang="en-US" sz="1600" dirty="0">
+              <a:latin typeface="Arial" panose="020B0604020202020204" pitchFamily="34" charset="0"/>
+              <a:cs typeface="Arial" panose="020B0604020202020204" pitchFamily="34" charset="0"/>
+              <a:sym typeface="Wingdings" panose="05000000000000000000" pitchFamily="2" charset="2"/>
+            </a:endParaRPr>
+          </a:p>
+        </p:txBody>
+      </p:sp>
+      <p:sp>
+        <p:nvSpPr>
           <p:cNvPr id="2" name="Titel 1"/>
           <p:cNvSpPr>
             <a:spLocks noGrp="1"/>
@@ -5149,152 +5336,563 @@
       </p:sp>
       <p:sp>
         <p:nvSpPr>
-          <p:cNvPr id="4" name="Textfeld 3"/>
+          <p:cNvPr id="3" name="Pfeil nach rechts 2"/>
+          <p:cNvSpPr/>
+          <p:nvPr/>
+        </p:nvSpPr>
+        <p:spPr>
+          <a:xfrm>
+            <a:off x="4374643" y="2454854"/>
+            <a:ext cx="394714" cy="1556426"/>
+          </a:xfrm>
+          <a:prstGeom prst="rightArrow">
+            <a:avLst>
+              <a:gd name="adj1" fmla="val 100000"/>
+              <a:gd name="adj2" fmla="val 100000"/>
+            </a:avLst>
+          </a:prstGeom>
+          <a:solidFill>
+            <a:schemeClr val="tx1"/>
+          </a:solidFill>
+          <a:ln>
+            <a:solidFill>
+              <a:schemeClr val="tx1"/>
+            </a:solidFill>
+          </a:ln>
+        </p:spPr>
+        <p:style>
+          <a:lnRef idx="2">
+            <a:schemeClr val="accent1">
+              <a:shade val="50000"/>
+            </a:schemeClr>
+          </a:lnRef>
+          <a:fillRef idx="1">
+            <a:schemeClr val="accent1"/>
+          </a:fillRef>
+          <a:effectRef idx="0">
+            <a:schemeClr val="accent1"/>
+          </a:effectRef>
+          <a:fontRef idx="minor">
+            <a:schemeClr val="lt1"/>
+          </a:fontRef>
+        </p:style>
+        <p:txBody>
+          <a:bodyPr rtlCol="0" anchor="ctr"/>
+          <a:lstStyle/>
+          <a:p>
+            <a:pPr algn="ctr"/>
+            <a:endParaRPr lang="de-DE"/>
+          </a:p>
+        </p:txBody>
+      </p:sp>
+      <p:sp>
+        <p:nvSpPr>
+          <p:cNvPr id="10" name="Abgerundetes Rechteck 9"/>
+          <p:cNvSpPr/>
+          <p:nvPr/>
+        </p:nvSpPr>
+        <p:spPr>
+          <a:xfrm>
+            <a:off x="632006" y="1437041"/>
+            <a:ext cx="1809642" cy="314844"/>
+          </a:xfrm>
+          <a:prstGeom prst="roundRect">
+            <a:avLst/>
+          </a:prstGeom>
+          <a:solidFill>
+            <a:schemeClr val="bg1"/>
+          </a:solidFill>
+          <a:ln>
+            <a:noFill/>
+          </a:ln>
+        </p:spPr>
+        <p:style>
+          <a:lnRef idx="2">
+            <a:schemeClr val="accent1">
+              <a:shade val="50000"/>
+            </a:schemeClr>
+          </a:lnRef>
+          <a:fillRef idx="1">
+            <a:schemeClr val="accent1"/>
+          </a:fillRef>
+          <a:effectRef idx="0">
+            <a:schemeClr val="accent1"/>
+          </a:effectRef>
+          <a:fontRef idx="minor">
+            <a:schemeClr val="lt1"/>
+          </a:fontRef>
+        </p:style>
+        <p:txBody>
+          <a:bodyPr rtlCol="0" anchor="ctr"/>
+          <a:lstStyle/>
+          <a:p>
+            <a:r>
+              <a:rPr lang="de-DE" sz="1600" b="1" dirty="0">
+                <a:solidFill>
+                  <a:schemeClr val="tx1"/>
+                </a:solidFill>
+                <a:latin typeface="Arial" panose="020B0604020202020204" pitchFamily="34" charset="0"/>
+                <a:cs typeface="Arial" panose="020B0604020202020204" pitchFamily="34" charset="0"/>
+              </a:rPr>
+              <a:t>Ausgangslage</a:t>
+            </a:r>
+          </a:p>
+        </p:txBody>
+      </p:sp>
+      <p:sp>
+        <p:nvSpPr>
+          <p:cNvPr id="11" name="Textfeld 10"/>
           <p:cNvSpPr txBox="1"/>
           <p:nvPr/>
         </p:nvSpPr>
         <p:spPr>
           <a:xfrm>
-            <a:off x="682641" y="2595758"/>
-            <a:ext cx="7886700" cy="2831544"/>
+            <a:off x="4866995" y="1594463"/>
+            <a:ext cx="3845205" cy="3333170"/>
           </a:xfrm>
           <a:prstGeom prst="rect">
             <a:avLst/>
           </a:prstGeom>
           <a:noFill/>
-        </p:spPr>
-        <p:txBody>
-          <a:bodyPr wrap="square" rtlCol="0">
-            <a:spAutoFit/>
+          <a:ln>
+            <a:solidFill>
+              <a:srgbClr val="80A5AB"/>
+            </a:solidFill>
+          </a:ln>
+        </p:spPr>
+        <p:txBody>
+          <a:bodyPr wrap="square" rtlCol="0" anchor="t" anchorCtr="0">
+            <a:noAutofit/>
           </a:bodyPr>
           <a:lstStyle/>
           <a:p>
-            <a:pPr marL="285750" indent="-285750">
-              <a:buClr>
-                <a:srgbClr val="80A5AB"/>
-              </a:buClr>
-              <a:buFont typeface="Wingdings" panose="05000000000000000000" pitchFamily="2" charset="2"/>
-              <a:buChar char="§"/>
-            </a:pPr>
-            <a:r>
-              <a:rPr lang="de-DE" sz="2000" dirty="0"/>
-              <a:t>Anwendung zur Visualisierung von Programmgraphen</a:t>
-            </a:r>
-          </a:p>
-          <a:p>
-            <a:pPr marL="742950" lvl="1" indent="-285750">
-              <a:buClr>
-                <a:srgbClr val="80A5AB"/>
-              </a:buClr>
-              <a:buFont typeface="Wingdings" panose="05000000000000000000" pitchFamily="2" charset="2"/>
-              <a:buChar char="§"/>
-            </a:pPr>
-            <a:r>
-              <a:rPr lang="de-DE" sz="2000" dirty="0"/>
-              <a:t>Elementare Funktionen</a:t>
-            </a:r>
-          </a:p>
-          <a:p>
-            <a:pPr marL="742950" lvl="1" indent="-285750">
-              <a:buClr>
-                <a:srgbClr val="80A5AB"/>
-              </a:buClr>
-              <a:buFont typeface="Wingdings" panose="05000000000000000000" pitchFamily="2" charset="2"/>
-              <a:buChar char="§"/>
-            </a:pPr>
-            <a:r>
-              <a:rPr lang="de-DE" sz="2000" dirty="0"/>
-              <a:t>JOANA-Programmabhängigkeitsgraphen</a:t>
-            </a:r>
-          </a:p>
-          <a:p>
-            <a:pPr marL="742950" lvl="1" indent="-285750">
-              <a:buClr>
-                <a:srgbClr val="80A5AB"/>
-              </a:buClr>
-              <a:buFont typeface="Wingdings" panose="05000000000000000000" pitchFamily="2" charset="2"/>
-              <a:buChar char="§"/>
-            </a:pPr>
-            <a:r>
-              <a:rPr lang="de-DE" sz="2000" dirty="0"/>
-              <a:t>Leicht austauschbare Bausteine</a:t>
-            </a:r>
-          </a:p>
-          <a:p>
-            <a:pPr marL="742950" lvl="1" indent="-285750">
-              <a:buClr>
-                <a:srgbClr val="80A5AB"/>
-              </a:buClr>
-              <a:buFont typeface="Wingdings" panose="05000000000000000000" pitchFamily="2" charset="2"/>
-              <a:buChar char="§"/>
-            </a:pPr>
-            <a:r>
-              <a:rPr lang="de-DE" sz="2000" dirty="0"/>
-              <a:t>Kein </a:t>
-            </a:r>
-            <a:r>
-              <a:rPr lang="de-DE" sz="2000" dirty="0" err="1"/>
-              <a:t>Grapheditor</a:t>
-            </a:r>
-            <a:endParaRPr lang="de-DE" sz="2000" dirty="0"/>
-          </a:p>
-          <a:p>
-            <a:pPr marL="285750" indent="-285750">
-              <a:buClr>
-                <a:srgbClr val="80A5AB"/>
-              </a:buClr>
-              <a:buFont typeface="Wingdings" panose="05000000000000000000" pitchFamily="2" charset="2"/>
-              <a:buChar char="§"/>
-            </a:pPr>
-            <a:endParaRPr lang="de-DE" sz="2000" dirty="0"/>
-          </a:p>
-          <a:p>
-            <a:pPr marL="285750" indent="-285750">
-              <a:buClr>
-                <a:srgbClr val="80A5AB"/>
-              </a:buClr>
-              <a:buFont typeface="Wingdings" panose="05000000000000000000" pitchFamily="2" charset="2"/>
-              <a:buChar char="§"/>
-            </a:pPr>
-            <a:r>
-              <a:rPr lang="de-DE" sz="2000" b="1" dirty="0"/>
-              <a:t>Zielgruppen: </a:t>
-            </a:r>
-            <a:r>
-              <a:rPr lang="de-DE" sz="2000" dirty="0"/>
-              <a:t>Institute und Forschungsgruppen</a:t>
-            </a:r>
-          </a:p>
-          <a:p>
-            <a:pPr marL="285750" indent="-285750">
-              <a:buClr>
-                <a:srgbClr val="80A5AB"/>
-              </a:buClr>
-              <a:buFont typeface="Wingdings" panose="05000000000000000000" pitchFamily="2" charset="2"/>
-              <a:buChar char="§"/>
-            </a:pPr>
-            <a:r>
-              <a:rPr lang="de-DE" sz="2000" b="1" dirty="0"/>
-              <a:t>Zielzweck: </a:t>
-            </a:r>
-            <a:r>
-              <a:rPr lang="de-DE" sz="2000" dirty="0"/>
-              <a:t>Betrachten von Graphen.</a:t>
-            </a:r>
-          </a:p>
-          <a:p>
-            <a:pPr marL="285750" indent="-285750">
-              <a:buFontTx/>
-              <a:buChar char="-"/>
-            </a:pPr>
-            <a:endParaRPr lang="de-DE" dirty="0"/>
-          </a:p>
-        </p:txBody>
-      </p:sp>
+            <a:endParaRPr lang="en-US" sz="1600" dirty="0">
+              <a:latin typeface="Arial" panose="020B0604020202020204" pitchFamily="34" charset="0"/>
+              <a:cs typeface="Arial" panose="020B0604020202020204" pitchFamily="34" charset="0"/>
+              <a:sym typeface="Wingdings" panose="05000000000000000000" pitchFamily="2" charset="2"/>
+            </a:endParaRPr>
+          </a:p>
+        </p:txBody>
+      </p:sp>
+      <p:sp>
+        <p:nvSpPr>
+          <p:cNvPr id="12" name="Abgerundetes Rechteck 11"/>
+          <p:cNvSpPr/>
+          <p:nvPr/>
+        </p:nvSpPr>
+        <p:spPr>
+          <a:xfrm>
+            <a:off x="5066685" y="1437947"/>
+            <a:ext cx="1809642" cy="314844"/>
+          </a:xfrm>
+          <a:prstGeom prst="roundRect">
+            <a:avLst/>
+          </a:prstGeom>
+          <a:solidFill>
+            <a:schemeClr val="bg1"/>
+          </a:solidFill>
+          <a:ln>
+            <a:noFill/>
+          </a:ln>
+        </p:spPr>
+        <p:style>
+          <a:lnRef idx="2">
+            <a:schemeClr val="accent1">
+              <a:shade val="50000"/>
+            </a:schemeClr>
+          </a:lnRef>
+          <a:fillRef idx="1">
+            <a:schemeClr val="accent1"/>
+          </a:fillRef>
+          <a:effectRef idx="0">
+            <a:schemeClr val="accent1"/>
+          </a:effectRef>
+          <a:fontRef idx="minor">
+            <a:schemeClr val="lt1"/>
+          </a:fontRef>
+        </p:style>
+        <p:txBody>
+          <a:bodyPr rtlCol="0" anchor="ctr"/>
+          <a:lstStyle/>
+          <a:p>
+            <a:r>
+              <a:rPr lang="de-DE" sz="1600" b="1" dirty="0">
+                <a:solidFill>
+                  <a:schemeClr val="tx1"/>
+                </a:solidFill>
+                <a:latin typeface="Arial" panose="020B0604020202020204" pitchFamily="34" charset="0"/>
+                <a:cs typeface="Arial" panose="020B0604020202020204" pitchFamily="34" charset="0"/>
+              </a:rPr>
+              <a:t>Ergebnis</a:t>
+            </a:r>
+          </a:p>
+        </p:txBody>
+      </p:sp>
+      <p:sp>
+        <p:nvSpPr>
+          <p:cNvPr id="13" name="Abgerundetes Rechteck 12"/>
+          <p:cNvSpPr/>
+          <p:nvPr/>
+        </p:nvSpPr>
+        <p:spPr>
+          <a:xfrm>
+            <a:off x="296124" y="5397401"/>
+            <a:ext cx="8416076" cy="1127943"/>
+          </a:xfrm>
+          <a:prstGeom prst="roundRect">
+            <a:avLst/>
+          </a:prstGeom>
+          <a:solidFill>
+            <a:srgbClr val="D7D7D7"/>
+          </a:solidFill>
+          <a:ln>
+            <a:noFill/>
+          </a:ln>
+        </p:spPr>
+        <p:style>
+          <a:lnRef idx="2">
+            <a:schemeClr val="accent1">
+              <a:shade val="50000"/>
+            </a:schemeClr>
+          </a:lnRef>
+          <a:fillRef idx="1">
+            <a:schemeClr val="accent1"/>
+          </a:fillRef>
+          <a:effectRef idx="0">
+            <a:schemeClr val="accent1"/>
+          </a:effectRef>
+          <a:fontRef idx="minor">
+            <a:schemeClr val="lt1"/>
+          </a:fontRef>
+        </p:style>
+        <p:txBody>
+          <a:bodyPr rtlCol="0" anchor="t"/>
+          <a:lstStyle/>
+          <a:p>
+            <a:r>
+              <a:rPr lang="en-US" sz="1600" b="1" dirty="0">
+                <a:solidFill>
+                  <a:schemeClr val="tx1"/>
+                </a:solidFill>
+                <a:latin typeface="Arial" panose="020B0604020202020204" pitchFamily="34" charset="0"/>
+                <a:cs typeface="Arial" panose="020B0604020202020204" pitchFamily="34" charset="0"/>
+              </a:rPr>
+              <a:t>Die JOANA-</a:t>
+            </a:r>
+            <a:r>
+              <a:rPr lang="en-US" sz="1600" b="1" dirty="0" err="1">
+                <a:solidFill>
+                  <a:schemeClr val="tx1"/>
+                </a:solidFill>
+                <a:latin typeface="Arial" panose="020B0604020202020204" pitchFamily="34" charset="0"/>
+                <a:cs typeface="Arial" panose="020B0604020202020204" pitchFamily="34" charset="0"/>
+              </a:rPr>
+              <a:t>Programmabhängigkeitsgraphen</a:t>
+            </a:r>
+            <a:r>
+              <a:rPr lang="en-US" sz="1600" b="1" dirty="0">
+                <a:solidFill>
+                  <a:schemeClr val="tx1"/>
+                </a:solidFill>
+                <a:latin typeface="Arial" panose="020B0604020202020204" pitchFamily="34" charset="0"/>
+                <a:cs typeface="Arial" panose="020B0604020202020204" pitchFamily="34" charset="0"/>
+              </a:rPr>
+              <a:t> </a:t>
+            </a:r>
+            <a:r>
+              <a:rPr lang="en-US" sz="1600" b="1" dirty="0" err="1">
+                <a:solidFill>
+                  <a:schemeClr val="tx1"/>
+                </a:solidFill>
+                <a:latin typeface="Arial" panose="020B0604020202020204" pitchFamily="34" charset="0"/>
+                <a:cs typeface="Arial" panose="020B0604020202020204" pitchFamily="34" charset="0"/>
+              </a:rPr>
+              <a:t>sollen</a:t>
+            </a:r>
+            <a:r>
+              <a:rPr lang="en-US" sz="1600" b="1" dirty="0">
+                <a:solidFill>
+                  <a:schemeClr val="tx1"/>
+                </a:solidFill>
+                <a:latin typeface="Arial" panose="020B0604020202020204" pitchFamily="34" charset="0"/>
+                <a:cs typeface="Arial" panose="020B0604020202020204" pitchFamily="34" charset="0"/>
+              </a:rPr>
+              <a:t> </a:t>
+            </a:r>
+            <a:r>
+              <a:rPr lang="en-US" sz="1600" b="1" dirty="0" err="1">
+                <a:solidFill>
+                  <a:schemeClr val="tx1"/>
+                </a:solidFill>
+                <a:latin typeface="Arial" panose="020B0604020202020204" pitchFamily="34" charset="0"/>
+                <a:cs typeface="Arial" panose="020B0604020202020204" pitchFamily="34" charset="0"/>
+              </a:rPr>
+              <a:t>für</a:t>
+            </a:r>
+            <a:r>
+              <a:rPr lang="en-US" sz="1600" b="1" dirty="0">
+                <a:solidFill>
+                  <a:schemeClr val="tx1"/>
+                </a:solidFill>
+                <a:latin typeface="Arial" panose="020B0604020202020204" pitchFamily="34" charset="0"/>
+                <a:cs typeface="Arial" panose="020B0604020202020204" pitchFamily="34" charset="0"/>
+              </a:rPr>
+              <a:t> das </a:t>
+            </a:r>
+            <a:r>
+              <a:rPr lang="en-US" sz="1600" b="1" dirty="0" err="1">
+                <a:solidFill>
+                  <a:schemeClr val="tx1"/>
+                </a:solidFill>
+                <a:latin typeface="Arial" panose="020B0604020202020204" pitchFamily="34" charset="0"/>
+                <a:cs typeface="Arial" panose="020B0604020202020204" pitchFamily="34" charset="0"/>
+              </a:rPr>
+              <a:t>menschliche</a:t>
+            </a:r>
+            <a:r>
+              <a:rPr lang="en-US" sz="1600" b="1" dirty="0">
+                <a:solidFill>
+                  <a:schemeClr val="tx1"/>
+                </a:solidFill>
+                <a:latin typeface="Arial" panose="020B0604020202020204" pitchFamily="34" charset="0"/>
+                <a:cs typeface="Arial" panose="020B0604020202020204" pitchFamily="34" charset="0"/>
+              </a:rPr>
+              <a:t> </a:t>
+            </a:r>
+            <a:r>
+              <a:rPr lang="en-US" sz="1600" b="1" dirty="0" err="1">
+                <a:solidFill>
+                  <a:schemeClr val="tx1"/>
+                </a:solidFill>
+                <a:latin typeface="Arial" panose="020B0604020202020204" pitchFamily="34" charset="0"/>
+                <a:cs typeface="Arial" panose="020B0604020202020204" pitchFamily="34" charset="0"/>
+              </a:rPr>
+              <a:t>Auge</a:t>
+            </a:r>
+            <a:r>
+              <a:rPr lang="en-US" sz="1600" b="1" dirty="0">
+                <a:solidFill>
+                  <a:schemeClr val="tx1"/>
+                </a:solidFill>
+                <a:latin typeface="Arial" panose="020B0604020202020204" pitchFamily="34" charset="0"/>
+                <a:cs typeface="Arial" panose="020B0604020202020204" pitchFamily="34" charset="0"/>
+              </a:rPr>
+              <a:t> </a:t>
+            </a:r>
+            <a:r>
+              <a:rPr lang="en-US" sz="1600" b="1" dirty="0" err="1">
+                <a:solidFill>
+                  <a:schemeClr val="tx1"/>
+                </a:solidFill>
+                <a:latin typeface="Arial" panose="020B0604020202020204" pitchFamily="34" charset="0"/>
+                <a:cs typeface="Arial" panose="020B0604020202020204" pitchFamily="34" charset="0"/>
+              </a:rPr>
+              <a:t>übersichtlicht</a:t>
+            </a:r>
+            <a:r>
+              <a:rPr lang="en-US" sz="1600" b="1" dirty="0">
+                <a:solidFill>
+                  <a:schemeClr val="tx1"/>
+                </a:solidFill>
+                <a:latin typeface="Arial" panose="020B0604020202020204" pitchFamily="34" charset="0"/>
+                <a:cs typeface="Arial" panose="020B0604020202020204" pitchFamily="34" charset="0"/>
+              </a:rPr>
+              <a:t> </a:t>
+            </a:r>
+            <a:r>
+              <a:rPr lang="en-US" sz="1600" b="1" dirty="0" err="1">
+                <a:solidFill>
+                  <a:schemeClr val="tx1"/>
+                </a:solidFill>
+                <a:latin typeface="Arial" panose="020B0604020202020204" pitchFamily="34" charset="0"/>
+                <a:cs typeface="Arial" panose="020B0604020202020204" pitchFamily="34" charset="0"/>
+              </a:rPr>
+              <a:t>dargestellt</a:t>
+            </a:r>
+            <a:r>
+              <a:rPr lang="en-US" sz="1600" b="1" dirty="0">
+                <a:solidFill>
+                  <a:schemeClr val="tx1"/>
+                </a:solidFill>
+                <a:latin typeface="Arial" panose="020B0604020202020204" pitchFamily="34" charset="0"/>
+                <a:cs typeface="Arial" panose="020B0604020202020204" pitchFamily="34" charset="0"/>
+              </a:rPr>
+              <a:t> </a:t>
+            </a:r>
+            <a:r>
+              <a:rPr lang="en-US" sz="1600" b="1" dirty="0" err="1">
+                <a:solidFill>
+                  <a:schemeClr val="tx1"/>
+                </a:solidFill>
+                <a:latin typeface="Arial" panose="020B0604020202020204" pitchFamily="34" charset="0"/>
+                <a:cs typeface="Arial" panose="020B0604020202020204" pitchFamily="34" charset="0"/>
+              </a:rPr>
+              <a:t>werden</a:t>
+            </a:r>
+            <a:r>
+              <a:rPr lang="en-US" sz="1600" b="1" dirty="0">
+                <a:solidFill>
+                  <a:schemeClr val="tx1"/>
+                </a:solidFill>
+                <a:latin typeface="Arial" panose="020B0604020202020204" pitchFamily="34" charset="0"/>
+                <a:cs typeface="Arial" panose="020B0604020202020204" pitchFamily="34" charset="0"/>
+              </a:rPr>
+              <a:t>, um </a:t>
+            </a:r>
+            <a:r>
+              <a:rPr lang="en-US" sz="1600" b="1" dirty="0" err="1">
+                <a:solidFill>
+                  <a:schemeClr val="tx1"/>
+                </a:solidFill>
+                <a:latin typeface="Arial" panose="020B0604020202020204" pitchFamily="34" charset="0"/>
+                <a:cs typeface="Arial" panose="020B0604020202020204" pitchFamily="34" charset="0"/>
+              </a:rPr>
+              <a:t>Programmstrukturen</a:t>
+            </a:r>
+            <a:r>
+              <a:rPr lang="en-US" sz="1600" b="1" dirty="0">
+                <a:solidFill>
+                  <a:schemeClr val="tx1"/>
+                </a:solidFill>
+                <a:latin typeface="Arial" panose="020B0604020202020204" pitchFamily="34" charset="0"/>
+                <a:cs typeface="Arial" panose="020B0604020202020204" pitchFamily="34" charset="0"/>
+              </a:rPr>
+              <a:t> </a:t>
+            </a:r>
+            <a:r>
+              <a:rPr lang="en-US" sz="1600" b="1" dirty="0" err="1">
+                <a:solidFill>
+                  <a:schemeClr val="tx1"/>
+                </a:solidFill>
+                <a:latin typeface="Arial" panose="020B0604020202020204" pitchFamily="34" charset="0"/>
+                <a:cs typeface="Arial" panose="020B0604020202020204" pitchFamily="34" charset="0"/>
+              </a:rPr>
+              <a:t>leicht</a:t>
+            </a:r>
+            <a:r>
+              <a:rPr lang="en-US" sz="1600" b="1" dirty="0">
+                <a:solidFill>
+                  <a:schemeClr val="tx1"/>
+                </a:solidFill>
+                <a:latin typeface="Arial" panose="020B0604020202020204" pitchFamily="34" charset="0"/>
+                <a:cs typeface="Arial" panose="020B0604020202020204" pitchFamily="34" charset="0"/>
+              </a:rPr>
+              <a:t> </a:t>
+            </a:r>
+            <a:r>
+              <a:rPr lang="en-US" sz="1600" b="1" dirty="0" err="1">
+                <a:solidFill>
+                  <a:schemeClr val="tx1"/>
+                </a:solidFill>
+                <a:latin typeface="Arial" panose="020B0604020202020204" pitchFamily="34" charset="0"/>
+                <a:cs typeface="Arial" panose="020B0604020202020204" pitchFamily="34" charset="0"/>
+              </a:rPr>
+              <a:t>zu</a:t>
+            </a:r>
+            <a:r>
+              <a:rPr lang="en-US" sz="1600" b="1" dirty="0">
+                <a:solidFill>
+                  <a:schemeClr val="tx1"/>
+                </a:solidFill>
+                <a:latin typeface="Arial" panose="020B0604020202020204" pitchFamily="34" charset="0"/>
+                <a:cs typeface="Arial" panose="020B0604020202020204" pitchFamily="34" charset="0"/>
+              </a:rPr>
+              <a:t> </a:t>
+            </a:r>
+            <a:r>
+              <a:rPr lang="en-US" sz="1600" b="1" dirty="0" err="1">
+                <a:solidFill>
+                  <a:schemeClr val="tx1"/>
+                </a:solidFill>
+                <a:latin typeface="Arial" panose="020B0604020202020204" pitchFamily="34" charset="0"/>
+                <a:cs typeface="Arial" panose="020B0604020202020204" pitchFamily="34" charset="0"/>
+              </a:rPr>
+              <a:t>erkennen</a:t>
+            </a:r>
+            <a:r>
+              <a:rPr lang="en-US" sz="1600" b="1" dirty="0">
+                <a:solidFill>
+                  <a:schemeClr val="tx1"/>
+                </a:solidFill>
+                <a:latin typeface="Arial" panose="020B0604020202020204" pitchFamily="34" charset="0"/>
+                <a:cs typeface="Arial" panose="020B0604020202020204" pitchFamily="34" charset="0"/>
+              </a:rPr>
+              <a:t>.</a:t>
+            </a:r>
+            <a:endParaRPr lang="en-US" sz="1600" dirty="0">
+              <a:solidFill>
+                <a:schemeClr val="tx1"/>
+              </a:solidFill>
+              <a:latin typeface="Arial" panose="020B0604020202020204" pitchFamily="34" charset="0"/>
+              <a:cs typeface="Arial" panose="020B0604020202020204" pitchFamily="34" charset="0"/>
+            </a:endParaRPr>
+          </a:p>
+        </p:txBody>
+      </p:sp>
+      <p:pic>
+        <p:nvPicPr>
+          <p:cNvPr id="4" name="Grafik 3"/>
+          <p:cNvPicPr>
+            <a:picLocks noChangeAspect="1"/>
+          </p:cNvPicPr>
+          <p:nvPr/>
+        </p:nvPicPr>
+        <p:blipFill>
+          <a:blip r:embed="rId2">
+            <a:extLst>
+              <a:ext uri="{28A0092B-C50C-407E-A947-70E740481C1C}">
+                <a14:useLocalDpi xmlns:a14="http://schemas.microsoft.com/office/drawing/2010/main" val="0"/>
+              </a:ext>
+            </a:extLst>
+          </a:blip>
+          <a:stretch>
+            <a:fillRect/>
+          </a:stretch>
+        </p:blipFill>
+        <p:spPr>
+          <a:xfrm>
+            <a:off x="1092738" y="1913590"/>
+            <a:ext cx="2580102" cy="2818266"/>
+          </a:xfrm>
+          <a:prstGeom prst="rect">
+            <a:avLst/>
+          </a:prstGeom>
+        </p:spPr>
+      </p:pic>
+      <p:pic>
+        <p:nvPicPr>
+          <p:cNvPr id="7" name="Grafik 6"/>
+          <p:cNvPicPr>
+            <a:picLocks noChangeAspect="1"/>
+          </p:cNvPicPr>
+          <p:nvPr/>
+        </p:nvPicPr>
+        <p:blipFill>
+          <a:blip r:embed="rId3">
+            <a:extLst>
+              <a:ext uri="{28A0092B-C50C-407E-A947-70E740481C1C}">
+                <a14:useLocalDpi xmlns:a14="http://schemas.microsoft.com/office/drawing/2010/main" val="0"/>
+              </a:ext>
+            </a:extLst>
+          </a:blip>
+          <a:stretch>
+            <a:fillRect/>
+          </a:stretch>
+        </p:blipFill>
+        <p:spPr>
+          <a:xfrm>
+            <a:off x="5038636" y="2007377"/>
+            <a:ext cx="3501921" cy="2507342"/>
+          </a:xfrm>
+          <a:prstGeom prst="rect">
+            <a:avLst/>
+          </a:prstGeom>
+        </p:spPr>
+      </p:pic>
     </p:spTree>
     <p:extLst>
       <p:ext uri="{BB962C8B-B14F-4D97-AF65-F5344CB8AC3E}">
-        <p14:creationId xmlns:p14="http://schemas.microsoft.com/office/powerpoint/2010/main" val="3180397636"/>
+        <p14:creationId xmlns:p14="http://schemas.microsoft.com/office/powerpoint/2010/main" val="79720666"/>
       </p:ext>
     </p:extLst>
   </p:cSld>
@@ -5323,41 +5921,6 @@
       </p:grpSpPr>
       <p:sp>
         <p:nvSpPr>
-          <p:cNvPr id="9" name="Textfeld 8"/>
-          <p:cNvSpPr txBox="1"/>
-          <p:nvPr/>
-        </p:nvSpPr>
-        <p:spPr>
-          <a:xfrm>
-            <a:off x="432316" y="1598746"/>
-            <a:ext cx="3845205" cy="3333170"/>
-          </a:xfrm>
-          <a:prstGeom prst="rect">
-            <a:avLst/>
-          </a:prstGeom>
-          <a:noFill/>
-          <a:ln>
-            <a:solidFill>
-              <a:srgbClr val="80A5AB"/>
-            </a:solidFill>
-          </a:ln>
-        </p:spPr>
-        <p:txBody>
-          <a:bodyPr wrap="square" rtlCol="0" anchor="t" anchorCtr="0">
-            <a:noAutofit/>
-          </a:bodyPr>
-          <a:lstStyle/>
-          <a:p>
-            <a:endParaRPr lang="en-US" sz="1600" dirty="0">
-              <a:latin typeface="Arial" panose="020B0604020202020204" pitchFamily="34" charset="0"/>
-              <a:cs typeface="Arial" panose="020B0604020202020204" pitchFamily="34" charset="0"/>
-              <a:sym typeface="Wingdings" panose="05000000000000000000" pitchFamily="2" charset="2"/>
-            </a:endParaRPr>
-          </a:p>
-        </p:txBody>
-      </p:sp>
-      <p:sp>
-        <p:nvSpPr>
           <p:cNvPr id="2" name="Titel 1"/>
           <p:cNvSpPr>
             <a:spLocks noGrp="1"/>
@@ -5380,563 +5943,152 @@
       </p:sp>
       <p:sp>
         <p:nvSpPr>
-          <p:cNvPr id="3" name="Pfeil nach rechts 2"/>
-          <p:cNvSpPr/>
-          <p:nvPr/>
-        </p:nvSpPr>
-        <p:spPr>
-          <a:xfrm>
-            <a:off x="4374643" y="2454854"/>
-            <a:ext cx="394714" cy="1556426"/>
-          </a:xfrm>
-          <a:prstGeom prst="rightArrow">
-            <a:avLst>
-              <a:gd name="adj1" fmla="val 100000"/>
-              <a:gd name="adj2" fmla="val 100000"/>
-            </a:avLst>
-          </a:prstGeom>
-          <a:solidFill>
-            <a:schemeClr val="tx1"/>
-          </a:solidFill>
-          <a:ln>
-            <a:solidFill>
-              <a:schemeClr val="tx1"/>
-            </a:solidFill>
-          </a:ln>
-        </p:spPr>
-        <p:style>
-          <a:lnRef idx="2">
-            <a:schemeClr val="accent1">
-              <a:shade val="50000"/>
-            </a:schemeClr>
-          </a:lnRef>
-          <a:fillRef idx="1">
-            <a:schemeClr val="accent1"/>
-          </a:fillRef>
-          <a:effectRef idx="0">
-            <a:schemeClr val="accent1"/>
-          </a:effectRef>
-          <a:fontRef idx="minor">
-            <a:schemeClr val="lt1"/>
-          </a:fontRef>
-        </p:style>
-        <p:txBody>
-          <a:bodyPr rtlCol="0" anchor="ctr"/>
-          <a:lstStyle/>
-          <a:p>
-            <a:pPr algn="ctr"/>
-            <a:endParaRPr lang="de-DE"/>
-          </a:p>
-        </p:txBody>
-      </p:sp>
-      <p:sp>
-        <p:nvSpPr>
-          <p:cNvPr id="10" name="Abgerundetes Rechteck 9"/>
-          <p:cNvSpPr/>
-          <p:nvPr/>
-        </p:nvSpPr>
-        <p:spPr>
-          <a:xfrm>
-            <a:off x="632006" y="1437041"/>
-            <a:ext cx="1809642" cy="314844"/>
-          </a:xfrm>
-          <a:prstGeom prst="roundRect">
-            <a:avLst/>
-          </a:prstGeom>
-          <a:solidFill>
-            <a:schemeClr val="bg1"/>
-          </a:solidFill>
-          <a:ln>
-            <a:noFill/>
-          </a:ln>
-        </p:spPr>
-        <p:style>
-          <a:lnRef idx="2">
-            <a:schemeClr val="accent1">
-              <a:shade val="50000"/>
-            </a:schemeClr>
-          </a:lnRef>
-          <a:fillRef idx="1">
-            <a:schemeClr val="accent1"/>
-          </a:fillRef>
-          <a:effectRef idx="0">
-            <a:schemeClr val="accent1"/>
-          </a:effectRef>
-          <a:fontRef idx="minor">
-            <a:schemeClr val="lt1"/>
-          </a:fontRef>
-        </p:style>
-        <p:txBody>
-          <a:bodyPr rtlCol="0" anchor="ctr"/>
-          <a:lstStyle/>
-          <a:p>
-            <a:r>
-              <a:rPr lang="de-DE" sz="1600" b="1" dirty="0">
-                <a:solidFill>
-                  <a:schemeClr val="tx1"/>
-                </a:solidFill>
-                <a:latin typeface="Arial" panose="020B0604020202020204" pitchFamily="34" charset="0"/>
-                <a:cs typeface="Arial" panose="020B0604020202020204" pitchFamily="34" charset="0"/>
-              </a:rPr>
-              <a:t>Ausgangslage</a:t>
-            </a:r>
-          </a:p>
-        </p:txBody>
-      </p:sp>
-      <p:sp>
-        <p:nvSpPr>
-          <p:cNvPr id="11" name="Textfeld 10"/>
+          <p:cNvPr id="4" name="Textfeld 3"/>
           <p:cNvSpPr txBox="1"/>
           <p:nvPr/>
         </p:nvSpPr>
         <p:spPr>
           <a:xfrm>
-            <a:off x="4866995" y="1594463"/>
-            <a:ext cx="3845205" cy="3333170"/>
+            <a:off x="682641" y="2595758"/>
+            <a:ext cx="7886700" cy="2831544"/>
           </a:xfrm>
           <a:prstGeom prst="rect">
             <a:avLst/>
           </a:prstGeom>
           <a:noFill/>
-          <a:ln>
-            <a:solidFill>
-              <a:srgbClr val="80A5AB"/>
-            </a:solidFill>
-          </a:ln>
-        </p:spPr>
-        <p:txBody>
-          <a:bodyPr wrap="square" rtlCol="0" anchor="t" anchorCtr="0">
-            <a:noAutofit/>
+        </p:spPr>
+        <p:txBody>
+          <a:bodyPr wrap="square" rtlCol="0">
+            <a:spAutoFit/>
           </a:bodyPr>
           <a:lstStyle/>
           <a:p>
-            <a:endParaRPr lang="en-US" sz="1600" dirty="0">
-              <a:latin typeface="Arial" panose="020B0604020202020204" pitchFamily="34" charset="0"/>
-              <a:cs typeface="Arial" panose="020B0604020202020204" pitchFamily="34" charset="0"/>
-              <a:sym typeface="Wingdings" panose="05000000000000000000" pitchFamily="2" charset="2"/>
-            </a:endParaRPr>
-          </a:p>
-        </p:txBody>
-      </p:sp>
-      <p:sp>
-        <p:nvSpPr>
-          <p:cNvPr id="12" name="Abgerundetes Rechteck 11"/>
-          <p:cNvSpPr/>
-          <p:nvPr/>
-        </p:nvSpPr>
-        <p:spPr>
-          <a:xfrm>
-            <a:off x="5066685" y="1437947"/>
-            <a:ext cx="1809642" cy="314844"/>
-          </a:xfrm>
-          <a:prstGeom prst="roundRect">
-            <a:avLst/>
-          </a:prstGeom>
-          <a:solidFill>
-            <a:schemeClr val="bg1"/>
-          </a:solidFill>
-          <a:ln>
-            <a:noFill/>
-          </a:ln>
-        </p:spPr>
-        <p:style>
-          <a:lnRef idx="2">
-            <a:schemeClr val="accent1">
-              <a:shade val="50000"/>
-            </a:schemeClr>
-          </a:lnRef>
-          <a:fillRef idx="1">
-            <a:schemeClr val="accent1"/>
-          </a:fillRef>
-          <a:effectRef idx="0">
-            <a:schemeClr val="accent1"/>
-          </a:effectRef>
-          <a:fontRef idx="minor">
-            <a:schemeClr val="lt1"/>
-          </a:fontRef>
-        </p:style>
-        <p:txBody>
-          <a:bodyPr rtlCol="0" anchor="ctr"/>
-          <a:lstStyle/>
-          <a:p>
-            <a:r>
-              <a:rPr lang="de-DE" sz="1600" b="1" dirty="0">
-                <a:solidFill>
-                  <a:schemeClr val="tx1"/>
-                </a:solidFill>
-                <a:latin typeface="Arial" panose="020B0604020202020204" pitchFamily="34" charset="0"/>
-                <a:cs typeface="Arial" panose="020B0604020202020204" pitchFamily="34" charset="0"/>
-              </a:rPr>
-              <a:t>Ergebnis</a:t>
-            </a:r>
-          </a:p>
-        </p:txBody>
-      </p:sp>
-      <p:sp>
-        <p:nvSpPr>
-          <p:cNvPr id="13" name="Abgerundetes Rechteck 12"/>
-          <p:cNvSpPr/>
-          <p:nvPr/>
-        </p:nvSpPr>
-        <p:spPr>
-          <a:xfrm>
-            <a:off x="296124" y="5397401"/>
-            <a:ext cx="8416076" cy="1127943"/>
-          </a:xfrm>
-          <a:prstGeom prst="roundRect">
-            <a:avLst/>
-          </a:prstGeom>
-          <a:solidFill>
-            <a:srgbClr val="D7D7D7"/>
-          </a:solidFill>
-          <a:ln>
-            <a:noFill/>
-          </a:ln>
-        </p:spPr>
-        <p:style>
-          <a:lnRef idx="2">
-            <a:schemeClr val="accent1">
-              <a:shade val="50000"/>
-            </a:schemeClr>
-          </a:lnRef>
-          <a:fillRef idx="1">
-            <a:schemeClr val="accent1"/>
-          </a:fillRef>
-          <a:effectRef idx="0">
-            <a:schemeClr val="accent1"/>
-          </a:effectRef>
-          <a:fontRef idx="minor">
-            <a:schemeClr val="lt1"/>
-          </a:fontRef>
-        </p:style>
-        <p:txBody>
-          <a:bodyPr rtlCol="0" anchor="t"/>
-          <a:lstStyle/>
-          <a:p>
-            <a:r>
-              <a:rPr lang="en-US" sz="1600" b="1" dirty="0">
-                <a:solidFill>
-                  <a:schemeClr val="tx1"/>
-                </a:solidFill>
-                <a:latin typeface="Arial" panose="020B0604020202020204" pitchFamily="34" charset="0"/>
-                <a:cs typeface="Arial" panose="020B0604020202020204" pitchFamily="34" charset="0"/>
-              </a:rPr>
-              <a:t>Die JOANA-</a:t>
-            </a:r>
-            <a:r>
-              <a:rPr lang="en-US" sz="1600" b="1" dirty="0" err="1">
-                <a:solidFill>
-                  <a:schemeClr val="tx1"/>
-                </a:solidFill>
-                <a:latin typeface="Arial" panose="020B0604020202020204" pitchFamily="34" charset="0"/>
-                <a:cs typeface="Arial" panose="020B0604020202020204" pitchFamily="34" charset="0"/>
-              </a:rPr>
-              <a:t>Programmabhängigkeitsgraphen</a:t>
-            </a:r>
-            <a:r>
-              <a:rPr lang="en-US" sz="1600" b="1" dirty="0">
-                <a:solidFill>
-                  <a:schemeClr val="tx1"/>
-                </a:solidFill>
-                <a:latin typeface="Arial" panose="020B0604020202020204" pitchFamily="34" charset="0"/>
-                <a:cs typeface="Arial" panose="020B0604020202020204" pitchFamily="34" charset="0"/>
-              </a:rPr>
-              <a:t> </a:t>
-            </a:r>
-            <a:r>
-              <a:rPr lang="en-US" sz="1600" b="1" dirty="0" err="1">
-                <a:solidFill>
-                  <a:schemeClr val="tx1"/>
-                </a:solidFill>
-                <a:latin typeface="Arial" panose="020B0604020202020204" pitchFamily="34" charset="0"/>
-                <a:cs typeface="Arial" panose="020B0604020202020204" pitchFamily="34" charset="0"/>
-              </a:rPr>
-              <a:t>sollen</a:t>
-            </a:r>
-            <a:r>
-              <a:rPr lang="en-US" sz="1600" b="1" dirty="0">
-                <a:solidFill>
-                  <a:schemeClr val="tx1"/>
-                </a:solidFill>
-                <a:latin typeface="Arial" panose="020B0604020202020204" pitchFamily="34" charset="0"/>
-                <a:cs typeface="Arial" panose="020B0604020202020204" pitchFamily="34" charset="0"/>
-              </a:rPr>
-              <a:t> </a:t>
-            </a:r>
-            <a:r>
-              <a:rPr lang="en-US" sz="1600" b="1" dirty="0" err="1">
-                <a:solidFill>
-                  <a:schemeClr val="tx1"/>
-                </a:solidFill>
-                <a:latin typeface="Arial" panose="020B0604020202020204" pitchFamily="34" charset="0"/>
-                <a:cs typeface="Arial" panose="020B0604020202020204" pitchFamily="34" charset="0"/>
-              </a:rPr>
-              <a:t>für</a:t>
-            </a:r>
-            <a:r>
-              <a:rPr lang="en-US" sz="1600" b="1" dirty="0">
-                <a:solidFill>
-                  <a:schemeClr val="tx1"/>
-                </a:solidFill>
-                <a:latin typeface="Arial" panose="020B0604020202020204" pitchFamily="34" charset="0"/>
-                <a:cs typeface="Arial" panose="020B0604020202020204" pitchFamily="34" charset="0"/>
-              </a:rPr>
-              <a:t> das </a:t>
-            </a:r>
-            <a:r>
-              <a:rPr lang="en-US" sz="1600" b="1" dirty="0" err="1">
-                <a:solidFill>
-                  <a:schemeClr val="tx1"/>
-                </a:solidFill>
-                <a:latin typeface="Arial" panose="020B0604020202020204" pitchFamily="34" charset="0"/>
-                <a:cs typeface="Arial" panose="020B0604020202020204" pitchFamily="34" charset="0"/>
-              </a:rPr>
-              <a:t>menschliche</a:t>
-            </a:r>
-            <a:r>
-              <a:rPr lang="en-US" sz="1600" b="1" dirty="0">
-                <a:solidFill>
-                  <a:schemeClr val="tx1"/>
-                </a:solidFill>
-                <a:latin typeface="Arial" panose="020B0604020202020204" pitchFamily="34" charset="0"/>
-                <a:cs typeface="Arial" panose="020B0604020202020204" pitchFamily="34" charset="0"/>
-              </a:rPr>
-              <a:t> </a:t>
-            </a:r>
-            <a:r>
-              <a:rPr lang="en-US" sz="1600" b="1" dirty="0" err="1">
-                <a:solidFill>
-                  <a:schemeClr val="tx1"/>
-                </a:solidFill>
-                <a:latin typeface="Arial" panose="020B0604020202020204" pitchFamily="34" charset="0"/>
-                <a:cs typeface="Arial" panose="020B0604020202020204" pitchFamily="34" charset="0"/>
-              </a:rPr>
-              <a:t>Auge</a:t>
-            </a:r>
-            <a:r>
-              <a:rPr lang="en-US" sz="1600" b="1" dirty="0">
-                <a:solidFill>
-                  <a:schemeClr val="tx1"/>
-                </a:solidFill>
-                <a:latin typeface="Arial" panose="020B0604020202020204" pitchFamily="34" charset="0"/>
-                <a:cs typeface="Arial" panose="020B0604020202020204" pitchFamily="34" charset="0"/>
-              </a:rPr>
-              <a:t> </a:t>
-            </a:r>
-            <a:r>
-              <a:rPr lang="en-US" sz="1600" b="1" dirty="0" err="1">
-                <a:solidFill>
-                  <a:schemeClr val="tx1"/>
-                </a:solidFill>
-                <a:latin typeface="Arial" panose="020B0604020202020204" pitchFamily="34" charset="0"/>
-                <a:cs typeface="Arial" panose="020B0604020202020204" pitchFamily="34" charset="0"/>
-              </a:rPr>
-              <a:t>übersichtlicht</a:t>
-            </a:r>
-            <a:r>
-              <a:rPr lang="en-US" sz="1600" b="1" dirty="0">
-                <a:solidFill>
-                  <a:schemeClr val="tx1"/>
-                </a:solidFill>
-                <a:latin typeface="Arial" panose="020B0604020202020204" pitchFamily="34" charset="0"/>
-                <a:cs typeface="Arial" panose="020B0604020202020204" pitchFamily="34" charset="0"/>
-              </a:rPr>
-              <a:t> </a:t>
-            </a:r>
-            <a:r>
-              <a:rPr lang="en-US" sz="1600" b="1" dirty="0" err="1">
-                <a:solidFill>
-                  <a:schemeClr val="tx1"/>
-                </a:solidFill>
-                <a:latin typeface="Arial" panose="020B0604020202020204" pitchFamily="34" charset="0"/>
-                <a:cs typeface="Arial" panose="020B0604020202020204" pitchFamily="34" charset="0"/>
-              </a:rPr>
-              <a:t>dargestellt</a:t>
-            </a:r>
-            <a:r>
-              <a:rPr lang="en-US" sz="1600" b="1" dirty="0">
-                <a:solidFill>
-                  <a:schemeClr val="tx1"/>
-                </a:solidFill>
-                <a:latin typeface="Arial" panose="020B0604020202020204" pitchFamily="34" charset="0"/>
-                <a:cs typeface="Arial" panose="020B0604020202020204" pitchFamily="34" charset="0"/>
-              </a:rPr>
-              <a:t> </a:t>
-            </a:r>
-            <a:r>
-              <a:rPr lang="en-US" sz="1600" b="1" dirty="0" err="1">
-                <a:solidFill>
-                  <a:schemeClr val="tx1"/>
-                </a:solidFill>
-                <a:latin typeface="Arial" panose="020B0604020202020204" pitchFamily="34" charset="0"/>
-                <a:cs typeface="Arial" panose="020B0604020202020204" pitchFamily="34" charset="0"/>
-              </a:rPr>
-              <a:t>werden</a:t>
-            </a:r>
-            <a:r>
-              <a:rPr lang="en-US" sz="1600" b="1" dirty="0">
-                <a:solidFill>
-                  <a:schemeClr val="tx1"/>
-                </a:solidFill>
-                <a:latin typeface="Arial" panose="020B0604020202020204" pitchFamily="34" charset="0"/>
-                <a:cs typeface="Arial" panose="020B0604020202020204" pitchFamily="34" charset="0"/>
-              </a:rPr>
-              <a:t>, um </a:t>
-            </a:r>
-            <a:r>
-              <a:rPr lang="en-US" sz="1600" b="1" dirty="0" err="1">
-                <a:solidFill>
-                  <a:schemeClr val="tx1"/>
-                </a:solidFill>
-                <a:latin typeface="Arial" panose="020B0604020202020204" pitchFamily="34" charset="0"/>
-                <a:cs typeface="Arial" panose="020B0604020202020204" pitchFamily="34" charset="0"/>
-              </a:rPr>
-              <a:t>Programmstrukturen</a:t>
-            </a:r>
-            <a:r>
-              <a:rPr lang="en-US" sz="1600" b="1" dirty="0">
-                <a:solidFill>
-                  <a:schemeClr val="tx1"/>
-                </a:solidFill>
-                <a:latin typeface="Arial" panose="020B0604020202020204" pitchFamily="34" charset="0"/>
-                <a:cs typeface="Arial" panose="020B0604020202020204" pitchFamily="34" charset="0"/>
-              </a:rPr>
-              <a:t> </a:t>
-            </a:r>
-            <a:r>
-              <a:rPr lang="en-US" sz="1600" b="1" dirty="0" err="1">
-                <a:solidFill>
-                  <a:schemeClr val="tx1"/>
-                </a:solidFill>
-                <a:latin typeface="Arial" panose="020B0604020202020204" pitchFamily="34" charset="0"/>
-                <a:cs typeface="Arial" panose="020B0604020202020204" pitchFamily="34" charset="0"/>
-              </a:rPr>
-              <a:t>leicht</a:t>
-            </a:r>
-            <a:r>
-              <a:rPr lang="en-US" sz="1600" b="1" dirty="0">
-                <a:solidFill>
-                  <a:schemeClr val="tx1"/>
-                </a:solidFill>
-                <a:latin typeface="Arial" panose="020B0604020202020204" pitchFamily="34" charset="0"/>
-                <a:cs typeface="Arial" panose="020B0604020202020204" pitchFamily="34" charset="0"/>
-              </a:rPr>
-              <a:t> </a:t>
-            </a:r>
-            <a:r>
-              <a:rPr lang="en-US" sz="1600" b="1" dirty="0" err="1">
-                <a:solidFill>
-                  <a:schemeClr val="tx1"/>
-                </a:solidFill>
-                <a:latin typeface="Arial" panose="020B0604020202020204" pitchFamily="34" charset="0"/>
-                <a:cs typeface="Arial" panose="020B0604020202020204" pitchFamily="34" charset="0"/>
-              </a:rPr>
-              <a:t>zu</a:t>
-            </a:r>
-            <a:r>
-              <a:rPr lang="en-US" sz="1600" b="1" dirty="0">
-                <a:solidFill>
-                  <a:schemeClr val="tx1"/>
-                </a:solidFill>
-                <a:latin typeface="Arial" panose="020B0604020202020204" pitchFamily="34" charset="0"/>
-                <a:cs typeface="Arial" panose="020B0604020202020204" pitchFamily="34" charset="0"/>
-              </a:rPr>
-              <a:t> </a:t>
-            </a:r>
-            <a:r>
-              <a:rPr lang="en-US" sz="1600" b="1" dirty="0" err="1">
-                <a:solidFill>
-                  <a:schemeClr val="tx1"/>
-                </a:solidFill>
-                <a:latin typeface="Arial" panose="020B0604020202020204" pitchFamily="34" charset="0"/>
-                <a:cs typeface="Arial" panose="020B0604020202020204" pitchFamily="34" charset="0"/>
-              </a:rPr>
-              <a:t>erkennen</a:t>
-            </a:r>
-            <a:r>
-              <a:rPr lang="en-US" sz="1600" b="1" dirty="0">
-                <a:solidFill>
-                  <a:schemeClr val="tx1"/>
-                </a:solidFill>
-                <a:latin typeface="Arial" panose="020B0604020202020204" pitchFamily="34" charset="0"/>
-                <a:cs typeface="Arial" panose="020B0604020202020204" pitchFamily="34" charset="0"/>
-              </a:rPr>
-              <a:t>.</a:t>
-            </a:r>
-            <a:endParaRPr lang="en-US" sz="1600" dirty="0">
-              <a:solidFill>
-                <a:schemeClr val="tx1"/>
-              </a:solidFill>
-              <a:latin typeface="Arial" panose="020B0604020202020204" pitchFamily="34" charset="0"/>
-              <a:cs typeface="Arial" panose="020B0604020202020204" pitchFamily="34" charset="0"/>
-            </a:endParaRPr>
-          </a:p>
-        </p:txBody>
-      </p:sp>
-      <p:pic>
-        <p:nvPicPr>
-          <p:cNvPr id="4" name="Grafik 3"/>
-          <p:cNvPicPr>
-            <a:picLocks noChangeAspect="1"/>
-          </p:cNvPicPr>
-          <p:nvPr/>
-        </p:nvPicPr>
-        <p:blipFill>
-          <a:blip r:embed="rId2">
-            <a:extLst>
-              <a:ext uri="{28A0092B-C50C-407E-A947-70E740481C1C}">
-                <a14:useLocalDpi xmlns:a14="http://schemas.microsoft.com/office/drawing/2010/main" val="0"/>
-              </a:ext>
-            </a:extLst>
-          </a:blip>
-          <a:stretch>
-            <a:fillRect/>
-          </a:stretch>
-        </p:blipFill>
-        <p:spPr>
-          <a:xfrm>
-            <a:off x="1092738" y="1913590"/>
-            <a:ext cx="2580102" cy="2818266"/>
-          </a:xfrm>
-          <a:prstGeom prst="rect">
-            <a:avLst/>
-          </a:prstGeom>
-        </p:spPr>
-      </p:pic>
-      <p:pic>
-        <p:nvPicPr>
-          <p:cNvPr id="7" name="Grafik 6"/>
-          <p:cNvPicPr>
-            <a:picLocks noChangeAspect="1"/>
-          </p:cNvPicPr>
-          <p:nvPr/>
-        </p:nvPicPr>
-        <p:blipFill>
-          <a:blip r:embed="rId3">
-            <a:extLst>
-              <a:ext uri="{28A0092B-C50C-407E-A947-70E740481C1C}">
-                <a14:useLocalDpi xmlns:a14="http://schemas.microsoft.com/office/drawing/2010/main" val="0"/>
-              </a:ext>
-            </a:extLst>
-          </a:blip>
-          <a:stretch>
-            <a:fillRect/>
-          </a:stretch>
-        </p:blipFill>
-        <p:spPr>
-          <a:xfrm>
-            <a:off x="5038636" y="2007377"/>
-            <a:ext cx="3501921" cy="2507342"/>
-          </a:xfrm>
-          <a:prstGeom prst="rect">
-            <a:avLst/>
-          </a:prstGeom>
-        </p:spPr>
-      </p:pic>
+            <a:pPr marL="285750" indent="-285750">
+              <a:buClr>
+                <a:srgbClr val="80A5AB"/>
+              </a:buClr>
+              <a:buFont typeface="Wingdings" panose="05000000000000000000" pitchFamily="2" charset="2"/>
+              <a:buChar char="§"/>
+            </a:pPr>
+            <a:r>
+              <a:rPr lang="de-DE" sz="2000" dirty="0"/>
+              <a:t>Anwendung zur Visualisierung von Programmgraphen</a:t>
+            </a:r>
+          </a:p>
+          <a:p>
+            <a:pPr marL="742950" lvl="1" indent="-285750">
+              <a:buClr>
+                <a:srgbClr val="80A5AB"/>
+              </a:buClr>
+              <a:buFont typeface="Wingdings" panose="05000000000000000000" pitchFamily="2" charset="2"/>
+              <a:buChar char="§"/>
+            </a:pPr>
+            <a:r>
+              <a:rPr lang="de-DE" sz="2000" dirty="0"/>
+              <a:t>Elementare Funktionen</a:t>
+            </a:r>
+          </a:p>
+          <a:p>
+            <a:pPr marL="742950" lvl="1" indent="-285750">
+              <a:buClr>
+                <a:srgbClr val="80A5AB"/>
+              </a:buClr>
+              <a:buFont typeface="Wingdings" panose="05000000000000000000" pitchFamily="2" charset="2"/>
+              <a:buChar char="§"/>
+            </a:pPr>
+            <a:r>
+              <a:rPr lang="de-DE" sz="2000" dirty="0"/>
+              <a:t>JOANA-Programmabhängigkeitsgraphen</a:t>
+            </a:r>
+          </a:p>
+          <a:p>
+            <a:pPr marL="742950" lvl="1" indent="-285750">
+              <a:buClr>
+                <a:srgbClr val="80A5AB"/>
+              </a:buClr>
+              <a:buFont typeface="Wingdings" panose="05000000000000000000" pitchFamily="2" charset="2"/>
+              <a:buChar char="§"/>
+            </a:pPr>
+            <a:r>
+              <a:rPr lang="de-DE" sz="2000" dirty="0"/>
+              <a:t>Leicht austauschbare Bausteine</a:t>
+            </a:r>
+          </a:p>
+          <a:p>
+            <a:pPr marL="742950" lvl="1" indent="-285750">
+              <a:buClr>
+                <a:srgbClr val="80A5AB"/>
+              </a:buClr>
+              <a:buFont typeface="Wingdings" panose="05000000000000000000" pitchFamily="2" charset="2"/>
+              <a:buChar char="§"/>
+            </a:pPr>
+            <a:r>
+              <a:rPr lang="de-DE" sz="2000" dirty="0"/>
+              <a:t>Kein </a:t>
+            </a:r>
+            <a:r>
+              <a:rPr lang="de-DE" sz="2000" dirty="0" err="1"/>
+              <a:t>Grapheditor</a:t>
+            </a:r>
+            <a:endParaRPr lang="de-DE" sz="2000" dirty="0"/>
+          </a:p>
+          <a:p>
+            <a:pPr marL="285750" indent="-285750">
+              <a:buClr>
+                <a:srgbClr val="80A5AB"/>
+              </a:buClr>
+              <a:buFont typeface="Wingdings" panose="05000000000000000000" pitchFamily="2" charset="2"/>
+              <a:buChar char="§"/>
+            </a:pPr>
+            <a:endParaRPr lang="de-DE" sz="2000" dirty="0"/>
+          </a:p>
+          <a:p>
+            <a:pPr marL="285750" indent="-285750">
+              <a:buClr>
+                <a:srgbClr val="80A5AB"/>
+              </a:buClr>
+              <a:buFont typeface="Wingdings" panose="05000000000000000000" pitchFamily="2" charset="2"/>
+              <a:buChar char="§"/>
+            </a:pPr>
+            <a:r>
+              <a:rPr lang="de-DE" sz="2000" b="1" dirty="0"/>
+              <a:t>Zielgruppen: </a:t>
+            </a:r>
+            <a:r>
+              <a:rPr lang="de-DE" sz="2000" dirty="0"/>
+              <a:t>Institute und Forschungsgruppen</a:t>
+            </a:r>
+          </a:p>
+          <a:p>
+            <a:pPr marL="285750" indent="-285750">
+              <a:buClr>
+                <a:srgbClr val="80A5AB"/>
+              </a:buClr>
+              <a:buFont typeface="Wingdings" panose="05000000000000000000" pitchFamily="2" charset="2"/>
+              <a:buChar char="§"/>
+            </a:pPr>
+            <a:r>
+              <a:rPr lang="de-DE" sz="2000" b="1" dirty="0"/>
+              <a:t>Zielzweck: </a:t>
+            </a:r>
+            <a:r>
+              <a:rPr lang="de-DE" sz="2000" dirty="0"/>
+              <a:t>Betrachten von Graphen.</a:t>
+            </a:r>
+          </a:p>
+          <a:p>
+            <a:pPr marL="285750" indent="-285750">
+              <a:buFontTx/>
+              <a:buChar char="-"/>
+            </a:pPr>
+            <a:endParaRPr lang="de-DE" dirty="0"/>
+          </a:p>
+        </p:txBody>
+      </p:sp>
     </p:spTree>
     <p:extLst>
       <p:ext uri="{BB962C8B-B14F-4D97-AF65-F5344CB8AC3E}">
-        <p14:creationId xmlns:p14="http://schemas.microsoft.com/office/powerpoint/2010/main" val="79720666"/>
+        <p14:creationId xmlns:p14="http://schemas.microsoft.com/office/powerpoint/2010/main" val="3180397636"/>
       </p:ext>
     </p:extLst>
   </p:cSld>
@@ -5965,6 +6117,41 @@
       </p:grpSpPr>
       <p:sp>
         <p:nvSpPr>
+          <p:cNvPr id="9" name="Textfeld 8"/>
+          <p:cNvSpPr txBox="1"/>
+          <p:nvPr/>
+        </p:nvSpPr>
+        <p:spPr>
+          <a:xfrm>
+            <a:off x="366235" y="2614745"/>
+            <a:ext cx="4068000" cy="3333170"/>
+          </a:xfrm>
+          <a:prstGeom prst="rect">
+            <a:avLst/>
+          </a:prstGeom>
+          <a:noFill/>
+          <a:ln>
+            <a:solidFill>
+              <a:srgbClr val="80A5AB"/>
+            </a:solidFill>
+          </a:ln>
+        </p:spPr>
+        <p:txBody>
+          <a:bodyPr wrap="square" rtlCol="0" anchor="t" anchorCtr="0">
+            <a:noAutofit/>
+          </a:bodyPr>
+          <a:lstStyle/>
+          <a:p>
+            <a:endParaRPr lang="en-US" sz="1600" dirty="0">
+              <a:latin typeface="Arial" panose="020B0604020202020204" pitchFamily="34" charset="0"/>
+              <a:cs typeface="Arial" panose="020B0604020202020204" pitchFamily="34" charset="0"/>
+              <a:sym typeface="Wingdings" panose="05000000000000000000" pitchFamily="2" charset="2"/>
+            </a:endParaRPr>
+          </a:p>
+        </p:txBody>
+      </p:sp>
+      <p:sp>
+        <p:nvSpPr>
           <p:cNvPr id="2" name="Titel 1"/>
           <p:cNvSpPr>
             <a:spLocks noGrp="1"/>
@@ -5980,14 +6167,174 @@
           <a:p>
             <a:r>
               <a:rPr lang="de-DE" dirty="0"/>
-              <a:t>Live-demo</a:t>
+              <a:t>Ziel</a:t>
+            </a:r>
+          </a:p>
+        </p:txBody>
+      </p:sp>
+      <p:sp>
+        <p:nvSpPr>
+          <p:cNvPr id="10" name="Abgerundetes Rechteck 9"/>
+          <p:cNvSpPr/>
+          <p:nvPr/>
+        </p:nvSpPr>
+        <p:spPr>
+          <a:xfrm>
+            <a:off x="559759" y="2457323"/>
+            <a:ext cx="2745433" cy="314844"/>
+          </a:xfrm>
+          <a:prstGeom prst="roundRect">
+            <a:avLst/>
+          </a:prstGeom>
+          <a:solidFill>
+            <a:schemeClr val="bg1"/>
+          </a:solidFill>
+          <a:ln>
+            <a:noFill/>
+          </a:ln>
+        </p:spPr>
+        <p:style>
+          <a:lnRef idx="2">
+            <a:schemeClr val="accent1">
+              <a:shade val="50000"/>
+            </a:schemeClr>
+          </a:lnRef>
+          <a:fillRef idx="1">
+            <a:schemeClr val="accent1"/>
+          </a:fillRef>
+          <a:effectRef idx="0">
+            <a:schemeClr val="accent1"/>
+          </a:effectRef>
+          <a:fontRef idx="minor">
+            <a:schemeClr val="lt1"/>
+          </a:fontRef>
+        </p:style>
+        <p:txBody>
+          <a:bodyPr rtlCol="0" anchor="ctr"/>
+          <a:lstStyle/>
+          <a:p>
+            <a:r>
+              <a:rPr lang="de-DE" sz="1600" b="1" dirty="0">
+                <a:solidFill>
+                  <a:schemeClr val="tx1"/>
+                </a:solidFill>
+                <a:latin typeface="Arial" panose="020B0604020202020204" pitchFamily="34" charset="0"/>
+                <a:cs typeface="Arial" panose="020B0604020202020204" pitchFamily="34" charset="0"/>
+              </a:rPr>
+              <a:t>Generischer </a:t>
+            </a:r>
+            <a:r>
+              <a:rPr lang="de-DE" sz="1600" b="1" dirty="0" err="1">
+                <a:solidFill>
+                  <a:schemeClr val="tx1"/>
+                </a:solidFill>
+                <a:latin typeface="Arial" panose="020B0604020202020204" pitchFamily="34" charset="0"/>
+                <a:cs typeface="Arial" panose="020B0604020202020204" pitchFamily="34" charset="0"/>
+              </a:rPr>
+              <a:t>GraphViewer</a:t>
+            </a:r>
+            <a:endParaRPr lang="de-DE" sz="1600" b="1" dirty="0">
+              <a:solidFill>
+                <a:schemeClr val="tx1"/>
+              </a:solidFill>
+              <a:latin typeface="Arial" panose="020B0604020202020204" pitchFamily="34" charset="0"/>
+              <a:cs typeface="Arial" panose="020B0604020202020204" pitchFamily="34" charset="0"/>
+            </a:endParaRPr>
+          </a:p>
+        </p:txBody>
+      </p:sp>
+      <p:sp>
+        <p:nvSpPr>
+          <p:cNvPr id="11" name="Textfeld 10"/>
+          <p:cNvSpPr txBox="1"/>
+          <p:nvPr/>
+        </p:nvSpPr>
+        <p:spPr>
+          <a:xfrm>
+            <a:off x="4625991" y="2614745"/>
+            <a:ext cx="4068000" cy="3333170"/>
+          </a:xfrm>
+          <a:prstGeom prst="rect">
+            <a:avLst/>
+          </a:prstGeom>
+          <a:noFill/>
+          <a:ln>
+            <a:solidFill>
+              <a:srgbClr val="80A5AB"/>
+            </a:solidFill>
+          </a:ln>
+        </p:spPr>
+        <p:txBody>
+          <a:bodyPr wrap="square" rtlCol="0" anchor="t" anchorCtr="0">
+            <a:noAutofit/>
+          </a:bodyPr>
+          <a:lstStyle/>
+          <a:p>
+            <a:endParaRPr lang="en-US" sz="1600" dirty="0">
+              <a:latin typeface="Arial" panose="020B0604020202020204" pitchFamily="34" charset="0"/>
+              <a:cs typeface="Arial" panose="020B0604020202020204" pitchFamily="34" charset="0"/>
+              <a:sym typeface="Wingdings" panose="05000000000000000000" pitchFamily="2" charset="2"/>
+            </a:endParaRPr>
+          </a:p>
+        </p:txBody>
+      </p:sp>
+      <p:sp>
+        <p:nvSpPr>
+          <p:cNvPr id="12" name="Abgerundetes Rechteck 11"/>
+          <p:cNvSpPr/>
+          <p:nvPr/>
+        </p:nvSpPr>
+        <p:spPr>
+          <a:xfrm>
+            <a:off x="4751222" y="2457323"/>
+            <a:ext cx="2276224" cy="314844"/>
+          </a:xfrm>
+          <a:prstGeom prst="roundRect">
+            <a:avLst/>
+          </a:prstGeom>
+          <a:solidFill>
+            <a:schemeClr val="bg1"/>
+          </a:solidFill>
+          <a:ln>
+            <a:noFill/>
+          </a:ln>
+        </p:spPr>
+        <p:style>
+          <a:lnRef idx="2">
+            <a:schemeClr val="accent1">
+              <a:shade val="50000"/>
+            </a:schemeClr>
+          </a:lnRef>
+          <a:fillRef idx="1">
+            <a:schemeClr val="accent1"/>
+          </a:fillRef>
+          <a:effectRef idx="0">
+            <a:schemeClr val="accent1"/>
+          </a:effectRef>
+          <a:fontRef idx="minor">
+            <a:schemeClr val="lt1"/>
+          </a:fontRef>
+        </p:style>
+        <p:txBody>
+          <a:bodyPr rtlCol="0" anchor="ctr"/>
+          <a:lstStyle/>
+          <a:p>
+            <a:r>
+              <a:rPr lang="de-DE" sz="1600" b="1" dirty="0">
+                <a:solidFill>
+                  <a:schemeClr val="tx1"/>
+                </a:solidFill>
+                <a:latin typeface="Arial" panose="020B0604020202020204" pitchFamily="34" charset="0"/>
+                <a:cs typeface="Arial" panose="020B0604020202020204" pitchFamily="34" charset="0"/>
+              </a:rPr>
+              <a:t>Graph Von Ansicht</a:t>
             </a:r>
           </a:p>
         </p:txBody>
       </p:sp>
       <p:pic>
         <p:nvPicPr>
-          <p:cNvPr id="3" name="Grafik 2"/>
+          <p:cNvPr id="5" name="Grafik 4"/>
           <p:cNvPicPr>
             <a:picLocks noChangeAspect="1"/>
           </p:cNvPicPr>
@@ -6007,18 +6354,77 @@
         </p:blipFill>
         <p:spPr>
           <a:xfrm>
-            <a:off x="1682563" y="1575194"/>
-            <a:ext cx="5886856" cy="4488652"/>
+            <a:off x="700952" y="2733478"/>
+            <a:ext cx="3103003" cy="3094668"/>
           </a:xfrm>
           <a:prstGeom prst="rect">
             <a:avLst/>
           </a:prstGeom>
         </p:spPr>
       </p:pic>
+      <p:pic>
+        <p:nvPicPr>
+          <p:cNvPr id="6" name="Grafik 5"/>
+          <p:cNvPicPr>
+            <a:picLocks noChangeAspect="1"/>
+          </p:cNvPicPr>
+          <p:nvPr/>
+        </p:nvPicPr>
+        <p:blipFill>
+          <a:blip r:embed="rId3">
+            <a:extLst>
+              <a:ext uri="{28A0092B-C50C-407E-A947-70E740481C1C}">
+                <a14:useLocalDpi xmlns:a14="http://schemas.microsoft.com/office/drawing/2010/main" val="0"/>
+              </a:ext>
+            </a:extLst>
+          </a:blip>
+          <a:stretch>
+            <a:fillRect/>
+          </a:stretch>
+        </p:blipFill>
+        <p:spPr>
+          <a:xfrm>
+            <a:off x="4751222" y="2929589"/>
+            <a:ext cx="3849739" cy="2788217"/>
+          </a:xfrm>
+          <a:prstGeom prst="rect">
+            <a:avLst/>
+          </a:prstGeom>
+        </p:spPr>
+      </p:pic>
+      <p:sp>
+        <p:nvSpPr>
+          <p:cNvPr id="8" name="Textfeld 7"/>
+          <p:cNvSpPr txBox="1"/>
+          <p:nvPr/>
+        </p:nvSpPr>
+        <p:spPr>
+          <a:xfrm>
+            <a:off x="1504014" y="1472620"/>
+            <a:ext cx="6243953" cy="369332"/>
+          </a:xfrm>
+          <a:prstGeom prst="rect">
+            <a:avLst/>
+          </a:prstGeom>
+          <a:noFill/>
+        </p:spPr>
+        <p:txBody>
+          <a:bodyPr wrap="none" rtlCol="0">
+            <a:spAutoFit/>
+          </a:bodyPr>
+          <a:lstStyle/>
+          <a:p>
+            <a:r>
+              <a:rPr lang="de-DE" b="1" dirty="0"/>
+              <a:t>An JOANA-Programmabhängigkeitsgraphen angepasstes Layout</a:t>
+            </a:r>
+          </a:p>
+        </p:txBody>
+      </p:sp>
     </p:spTree>
     <p:extLst>
       <p:ext uri="{BB962C8B-B14F-4D97-AF65-F5344CB8AC3E}">
-        <p14:creationId xmlns:p14="http://schemas.microsoft.com/office/powerpoint/2010/main" val="2174044139"/>
+        <p14:creationId xmlns:p14="http://schemas.microsoft.com/office/powerpoint/2010/main" val="1298665472"/>
       </p:ext>
     </p:extLst>
   </p:cSld>
@@ -6062,157 +6468,14 @@
           <a:p>
             <a:r>
               <a:rPr lang="de-DE" dirty="0"/>
-              <a:t>Pflichtenheft</a:t>
-            </a:r>
-          </a:p>
-        </p:txBody>
-      </p:sp>
-      <p:sp>
-        <p:nvSpPr>
-          <p:cNvPr id="3" name="Textfeld 2"/>
-          <p:cNvSpPr txBox="1"/>
-          <p:nvPr/>
-        </p:nvSpPr>
-        <p:spPr>
-          <a:xfrm>
-            <a:off x="628650" y="1690689"/>
-            <a:ext cx="6794296" cy="646331"/>
-          </a:xfrm>
-          <a:prstGeom prst="rect">
-            <a:avLst/>
-          </a:prstGeom>
-          <a:noFill/>
-        </p:spPr>
-        <p:txBody>
-          <a:bodyPr wrap="none" rtlCol="0">
-            <a:spAutoFit/>
-          </a:bodyPr>
-          <a:lstStyle/>
-          <a:p>
-            <a:r>
-              <a:rPr lang="de-DE" dirty="0"/>
-              <a:t>Entwicklung eines </a:t>
-            </a:r>
-            <a:r>
-              <a:rPr lang="de-DE" dirty="0" err="1"/>
-              <a:t>GraphViewer</a:t>
-            </a:r>
-            <a:r>
-              <a:rPr lang="de-DE" dirty="0"/>
-              <a:t>, welcher durch </a:t>
-            </a:r>
-            <a:r>
-              <a:rPr lang="de-DE" dirty="0" err="1"/>
-              <a:t>Plugins</a:t>
-            </a:r>
-            <a:r>
-              <a:rPr lang="de-DE" dirty="0"/>
-              <a:t> erweiterbar ist.</a:t>
-            </a:r>
-          </a:p>
-          <a:p>
-            <a:endParaRPr lang="de-DE" dirty="0"/>
-          </a:p>
-        </p:txBody>
-      </p:sp>
-      <p:sp>
-        <p:nvSpPr>
-          <p:cNvPr id="4" name="Textfeld 3"/>
-          <p:cNvSpPr txBox="1"/>
-          <p:nvPr/>
-        </p:nvSpPr>
-        <p:spPr>
-          <a:xfrm>
-            <a:off x="1281792" y="3894547"/>
-            <a:ext cx="5439747" cy="1754326"/>
-          </a:xfrm>
-          <a:prstGeom prst="rect">
-            <a:avLst/>
-          </a:prstGeom>
-          <a:noFill/>
-        </p:spPr>
-        <p:txBody>
-          <a:bodyPr wrap="square" rtlCol="0">
-            <a:spAutoFit/>
-          </a:bodyPr>
-          <a:lstStyle/>
-          <a:p>
-            <a:pPr marL="285750" indent="-285750">
-              <a:buClr>
-                <a:srgbClr val="80A5AB"/>
-              </a:buClr>
-              <a:buFont typeface="Wingdings" panose="05000000000000000000" pitchFamily="2" charset="2"/>
-              <a:buChar char="§"/>
-            </a:pPr>
-            <a:r>
-              <a:rPr lang="de-DE" dirty="0"/>
-              <a:t>Anzeigen und Navigieren von Graphen</a:t>
-            </a:r>
-          </a:p>
-          <a:p>
-            <a:pPr marL="285750" indent="-285750">
-              <a:buClr>
-                <a:srgbClr val="80A5AB"/>
-              </a:buClr>
-              <a:buFont typeface="Wingdings" panose="05000000000000000000" pitchFamily="2" charset="2"/>
-              <a:buChar char="§"/>
-            </a:pPr>
-            <a:r>
-              <a:rPr lang="de-DE" dirty="0"/>
-              <a:t>Filtern bestimmter Knoten und Kanten</a:t>
-            </a:r>
-          </a:p>
-          <a:p>
-            <a:pPr marL="285750" indent="-285750">
-              <a:buClr>
-                <a:srgbClr val="80A5AB"/>
-              </a:buClr>
-              <a:buFont typeface="Wingdings" panose="05000000000000000000" pitchFamily="2" charset="2"/>
-              <a:buChar char="§"/>
-            </a:pPr>
-            <a:r>
-              <a:rPr lang="de-DE" dirty="0"/>
-              <a:t>Speichern der visualisierten Graphen</a:t>
-            </a:r>
-          </a:p>
-          <a:p>
-            <a:pPr marL="285750" indent="-285750">
-              <a:buClr>
-                <a:srgbClr val="80A5AB"/>
-              </a:buClr>
-              <a:buFont typeface="Wingdings" panose="05000000000000000000" pitchFamily="2" charset="2"/>
-              <a:buChar char="§"/>
-            </a:pPr>
-            <a:r>
-              <a:rPr lang="de-DE" dirty="0"/>
-              <a:t>Laden von Programmgraphen</a:t>
-            </a:r>
-          </a:p>
-          <a:p>
-            <a:pPr marL="285750" indent="-285750">
-              <a:buClr>
-                <a:srgbClr val="80A5AB"/>
-              </a:buClr>
-              <a:buFont typeface="Wingdings" panose="05000000000000000000" pitchFamily="2" charset="2"/>
-              <a:buChar char="§"/>
-            </a:pPr>
-            <a:r>
-              <a:rPr lang="de-DE" dirty="0"/>
-              <a:t>An JOANA angepasste Visualisierung</a:t>
-            </a:r>
-          </a:p>
-          <a:p>
-            <a:pPr marL="285750" indent="-285750">
-              <a:buFontTx/>
-              <a:buChar char="-"/>
-            </a:pPr>
-            <a:endParaRPr lang="de-DE" dirty="0"/>
+              <a:t>Live-demo</a:t>
+            </a:r>
           </a:p>
         </p:txBody>
       </p:sp>
       <p:pic>
         <p:nvPicPr>
-          <p:cNvPr id="5" name="Grafik 4"/>
+          <p:cNvPr id="3" name="Grafik 2"/>
           <p:cNvPicPr>
             <a:picLocks noChangeAspect="1"/>
           </p:cNvPicPr>
@@ -6232,68 +6495,8 @@
         </p:blipFill>
         <p:spPr>
           <a:xfrm>
-            <a:off x="6721539" y="4459348"/>
-            <a:ext cx="910901" cy="910901"/>
-          </a:xfrm>
-          <a:prstGeom prst="rect">
-            <a:avLst/>
-          </a:prstGeom>
-        </p:spPr>
-      </p:pic>
-      <p:pic>
-        <p:nvPicPr>
-          <p:cNvPr id="6" name="Grafik 5"/>
-          <p:cNvPicPr>
-            <a:picLocks noChangeAspect="1"/>
-          </p:cNvPicPr>
-          <p:nvPr/>
-        </p:nvPicPr>
-        <p:blipFill>
-          <a:blip r:embed="rId3">
-            <a:extLst>
-              <a:ext uri="{28A0092B-C50C-407E-A947-70E740481C1C}">
-                <a14:useLocalDpi xmlns:a14="http://schemas.microsoft.com/office/drawing/2010/main" val="0"/>
-              </a:ext>
-            </a:extLst>
-          </a:blip>
-          <a:stretch>
-            <a:fillRect/>
-          </a:stretch>
-        </p:blipFill>
-        <p:spPr>
-          <a:xfrm>
-            <a:off x="6721540" y="3170459"/>
-            <a:ext cx="910901" cy="910901"/>
-          </a:xfrm>
-          <a:prstGeom prst="rect">
-            <a:avLst/>
-          </a:prstGeom>
-        </p:spPr>
-      </p:pic>
-      <p:pic>
-        <p:nvPicPr>
-          <p:cNvPr id="7" name="Grafik 6"/>
-          <p:cNvPicPr>
-            <a:picLocks noChangeAspect="1"/>
-          </p:cNvPicPr>
-          <p:nvPr/>
-        </p:nvPicPr>
-        <p:blipFill>
-          <a:blip r:embed="rId4">
-            <a:extLst>
-              <a:ext uri="{28A0092B-C50C-407E-A947-70E740481C1C}">
-                <a14:useLocalDpi xmlns:a14="http://schemas.microsoft.com/office/drawing/2010/main" val="0"/>
-              </a:ext>
-            </a:extLst>
-          </a:blip>
-          <a:stretch>
-            <a:fillRect/>
-          </a:stretch>
-        </p:blipFill>
-        <p:spPr>
-          <a:xfrm>
-            <a:off x="1326113" y="2337020"/>
-            <a:ext cx="1687674" cy="1119001"/>
+            <a:off x="1682563" y="1575194"/>
+            <a:ext cx="5886856" cy="4488652"/>
           </a:xfrm>
           <a:prstGeom prst="rect">
             <a:avLst/>
@@ -6303,7 +6506,7 @@
     </p:spTree>
     <p:extLst>
       <p:ext uri="{BB962C8B-B14F-4D97-AF65-F5344CB8AC3E}">
-        <p14:creationId xmlns:p14="http://schemas.microsoft.com/office/powerpoint/2010/main" val="605918426"/>
+        <p14:creationId xmlns:p14="http://schemas.microsoft.com/office/powerpoint/2010/main" val="2174044139"/>
       </p:ext>
     </p:extLst>
   </p:cSld>
@@ -6347,6 +6550,291 @@
           <a:p>
             <a:r>
               <a:rPr lang="de-DE" dirty="0"/>
+              <a:t>Pflichtenheft</a:t>
+            </a:r>
+          </a:p>
+        </p:txBody>
+      </p:sp>
+      <p:sp>
+        <p:nvSpPr>
+          <p:cNvPr id="3" name="Textfeld 2"/>
+          <p:cNvSpPr txBox="1"/>
+          <p:nvPr/>
+        </p:nvSpPr>
+        <p:spPr>
+          <a:xfrm>
+            <a:off x="628650" y="1690689"/>
+            <a:ext cx="6794296" cy="646331"/>
+          </a:xfrm>
+          <a:prstGeom prst="rect">
+            <a:avLst/>
+          </a:prstGeom>
+          <a:noFill/>
+        </p:spPr>
+        <p:txBody>
+          <a:bodyPr wrap="none" rtlCol="0">
+            <a:spAutoFit/>
+          </a:bodyPr>
+          <a:lstStyle/>
+          <a:p>
+            <a:r>
+              <a:rPr lang="de-DE" dirty="0"/>
+              <a:t>Entwicklung eines </a:t>
+            </a:r>
+            <a:r>
+              <a:rPr lang="de-DE" dirty="0" err="1"/>
+              <a:t>GraphViewer</a:t>
+            </a:r>
+            <a:r>
+              <a:rPr lang="de-DE" dirty="0"/>
+              <a:t>, welcher durch </a:t>
+            </a:r>
+            <a:r>
+              <a:rPr lang="de-DE" dirty="0" err="1"/>
+              <a:t>Plugins</a:t>
+            </a:r>
+            <a:r>
+              <a:rPr lang="de-DE" dirty="0"/>
+              <a:t> erweiterbar ist.</a:t>
+            </a:r>
+          </a:p>
+          <a:p>
+            <a:endParaRPr lang="de-DE" dirty="0"/>
+          </a:p>
+        </p:txBody>
+      </p:sp>
+      <p:sp>
+        <p:nvSpPr>
+          <p:cNvPr id="4" name="Textfeld 3"/>
+          <p:cNvSpPr txBox="1"/>
+          <p:nvPr/>
+        </p:nvSpPr>
+        <p:spPr>
+          <a:xfrm>
+            <a:off x="1281792" y="3894547"/>
+            <a:ext cx="5439747" cy="1754326"/>
+          </a:xfrm>
+          <a:prstGeom prst="rect">
+            <a:avLst/>
+          </a:prstGeom>
+          <a:noFill/>
+        </p:spPr>
+        <p:txBody>
+          <a:bodyPr wrap="square" rtlCol="0">
+            <a:spAutoFit/>
+          </a:bodyPr>
+          <a:lstStyle/>
+          <a:p>
+            <a:pPr marL="285750" indent="-285750">
+              <a:buClr>
+                <a:srgbClr val="80A5AB"/>
+              </a:buClr>
+              <a:buFont typeface="Wingdings" panose="05000000000000000000" pitchFamily="2" charset="2"/>
+              <a:buChar char="§"/>
+            </a:pPr>
+            <a:r>
+              <a:rPr lang="de-DE" dirty="0"/>
+              <a:t>Anzeigen und Navigieren von Graphen</a:t>
+            </a:r>
+          </a:p>
+          <a:p>
+            <a:pPr marL="285750" indent="-285750">
+              <a:buClr>
+                <a:srgbClr val="80A5AB"/>
+              </a:buClr>
+              <a:buFont typeface="Wingdings" panose="05000000000000000000" pitchFamily="2" charset="2"/>
+              <a:buChar char="§"/>
+            </a:pPr>
+            <a:r>
+              <a:rPr lang="de-DE" dirty="0"/>
+              <a:t>Filtern bestimmter Knoten und Kanten</a:t>
+            </a:r>
+          </a:p>
+          <a:p>
+            <a:pPr marL="285750" indent="-285750">
+              <a:buClr>
+                <a:srgbClr val="80A5AB"/>
+              </a:buClr>
+              <a:buFont typeface="Wingdings" panose="05000000000000000000" pitchFamily="2" charset="2"/>
+              <a:buChar char="§"/>
+            </a:pPr>
+            <a:r>
+              <a:rPr lang="de-DE" dirty="0"/>
+              <a:t>Speichern der visualisierten Graphen</a:t>
+            </a:r>
+          </a:p>
+          <a:p>
+            <a:pPr marL="285750" indent="-285750">
+              <a:buClr>
+                <a:srgbClr val="80A5AB"/>
+              </a:buClr>
+              <a:buFont typeface="Wingdings" panose="05000000000000000000" pitchFamily="2" charset="2"/>
+              <a:buChar char="§"/>
+            </a:pPr>
+            <a:r>
+              <a:rPr lang="de-DE" dirty="0"/>
+              <a:t>Laden von Programmgraphen</a:t>
+            </a:r>
+          </a:p>
+          <a:p>
+            <a:pPr marL="285750" indent="-285750">
+              <a:buClr>
+                <a:srgbClr val="80A5AB"/>
+              </a:buClr>
+              <a:buFont typeface="Wingdings" panose="05000000000000000000" pitchFamily="2" charset="2"/>
+              <a:buChar char="§"/>
+            </a:pPr>
+            <a:r>
+              <a:rPr lang="de-DE" dirty="0"/>
+              <a:t>An JOANA angepasste Visualisierung</a:t>
+            </a:r>
+          </a:p>
+          <a:p>
+            <a:pPr marL="285750" indent="-285750">
+              <a:buFontTx/>
+              <a:buChar char="-"/>
+            </a:pPr>
+            <a:endParaRPr lang="de-DE" dirty="0"/>
+          </a:p>
+        </p:txBody>
+      </p:sp>
+      <p:pic>
+        <p:nvPicPr>
+          <p:cNvPr id="5" name="Grafik 4"/>
+          <p:cNvPicPr>
+            <a:picLocks noChangeAspect="1"/>
+          </p:cNvPicPr>
+          <p:nvPr/>
+        </p:nvPicPr>
+        <p:blipFill>
+          <a:blip r:embed="rId2">
+            <a:extLst>
+              <a:ext uri="{28A0092B-C50C-407E-A947-70E740481C1C}">
+                <a14:useLocalDpi xmlns:a14="http://schemas.microsoft.com/office/drawing/2010/main" val="0"/>
+              </a:ext>
+            </a:extLst>
+          </a:blip>
+          <a:stretch>
+            <a:fillRect/>
+          </a:stretch>
+        </p:blipFill>
+        <p:spPr>
+          <a:xfrm>
+            <a:off x="6721539" y="4459348"/>
+            <a:ext cx="910901" cy="910901"/>
+          </a:xfrm>
+          <a:prstGeom prst="rect">
+            <a:avLst/>
+          </a:prstGeom>
+        </p:spPr>
+      </p:pic>
+      <p:pic>
+        <p:nvPicPr>
+          <p:cNvPr id="6" name="Grafik 5"/>
+          <p:cNvPicPr>
+            <a:picLocks noChangeAspect="1"/>
+          </p:cNvPicPr>
+          <p:nvPr/>
+        </p:nvPicPr>
+        <p:blipFill>
+          <a:blip r:embed="rId3">
+            <a:extLst>
+              <a:ext uri="{28A0092B-C50C-407E-A947-70E740481C1C}">
+                <a14:useLocalDpi xmlns:a14="http://schemas.microsoft.com/office/drawing/2010/main" val="0"/>
+              </a:ext>
+            </a:extLst>
+          </a:blip>
+          <a:stretch>
+            <a:fillRect/>
+          </a:stretch>
+        </p:blipFill>
+        <p:spPr>
+          <a:xfrm>
+            <a:off x="6721540" y="3170459"/>
+            <a:ext cx="910901" cy="910901"/>
+          </a:xfrm>
+          <a:prstGeom prst="rect">
+            <a:avLst/>
+          </a:prstGeom>
+        </p:spPr>
+      </p:pic>
+      <p:pic>
+        <p:nvPicPr>
+          <p:cNvPr id="7" name="Grafik 6"/>
+          <p:cNvPicPr>
+            <a:picLocks noChangeAspect="1"/>
+          </p:cNvPicPr>
+          <p:nvPr/>
+        </p:nvPicPr>
+        <p:blipFill>
+          <a:blip r:embed="rId4">
+            <a:extLst>
+              <a:ext uri="{28A0092B-C50C-407E-A947-70E740481C1C}">
+                <a14:useLocalDpi xmlns:a14="http://schemas.microsoft.com/office/drawing/2010/main" val="0"/>
+              </a:ext>
+            </a:extLst>
+          </a:blip>
+          <a:stretch>
+            <a:fillRect/>
+          </a:stretch>
+        </p:blipFill>
+        <p:spPr>
+          <a:xfrm>
+            <a:off x="1326113" y="2337020"/>
+            <a:ext cx="1687674" cy="1119001"/>
+          </a:xfrm>
+          <a:prstGeom prst="rect">
+            <a:avLst/>
+          </a:prstGeom>
+        </p:spPr>
+      </p:pic>
+    </p:spTree>
+    <p:extLst>
+      <p:ext uri="{BB962C8B-B14F-4D97-AF65-F5344CB8AC3E}">
+        <p14:creationId xmlns:p14="http://schemas.microsoft.com/office/powerpoint/2010/main" val="605918426"/>
+      </p:ext>
+    </p:extLst>
+  </p:cSld>
+  <p:clrMapOvr>
+    <a:masterClrMapping/>
+  </p:clrMapOvr>
+</p:sld>
+</file>
+
+<file path=ppt/slides/slide8.xml><?xml version="1.0" encoding="utf-8"?>
+<p:sld xmlns:a="http://schemas.openxmlformats.org/drawingml/2006/main" xmlns:r="http://schemas.openxmlformats.org/officeDocument/2006/relationships" xmlns:p="http://schemas.openxmlformats.org/presentationml/2006/main">
+  <p:cSld>
+    <p:spTree>
+      <p:nvGrpSpPr>
+        <p:cNvPr id="1" name=""/>
+        <p:cNvGrpSpPr/>
+        <p:nvPr/>
+      </p:nvGrpSpPr>
+      <p:grpSpPr>
+        <a:xfrm>
+          <a:off x="0" y="0"/>
+          <a:ext cx="0" cy="0"/>
+          <a:chOff x="0" y="0"/>
+          <a:chExt cx="0" cy="0"/>
+        </a:xfrm>
+      </p:grpSpPr>
+      <p:sp>
+        <p:nvSpPr>
+          <p:cNvPr id="2" name="Titel 1"/>
+          <p:cNvSpPr>
+            <a:spLocks noGrp="1"/>
+          </p:cNvSpPr>
+          <p:nvPr>
+            <p:ph type="title"/>
+          </p:nvPr>
+        </p:nvSpPr>
+        <p:spPr/>
+        <p:txBody>
+          <a:bodyPr/>
+          <a:lstStyle/>
+          <a:p>
+            <a:r>
+              <a:rPr lang="de-DE" dirty="0"/>
               <a:t>Entwurf</a:t>
             </a:r>
           </a:p>
@@ -6396,7 +6884,7 @@
         </p:nvSpPr>
         <p:spPr>
           <a:xfrm>
-            <a:off x="628650" y="3022649"/>
+            <a:off x="628650" y="2810212"/>
             <a:ext cx="7886700" cy="728324"/>
           </a:xfrm>
           <a:prstGeom prst="rect">
@@ -6442,7 +6930,7 @@
         </p:nvSpPr>
         <p:spPr>
           <a:xfrm>
-            <a:off x="790985" y="2853372"/>
+            <a:off x="790985" y="2640935"/>
             <a:ext cx="1726163" cy="338554"/>
           </a:xfrm>
           <a:prstGeom prst="rect">
@@ -6473,7 +6961,7 @@
         </p:nvSpPr>
         <p:spPr>
           <a:xfrm>
-            <a:off x="2517148" y="4828900"/>
+            <a:off x="2517148" y="4616463"/>
             <a:ext cx="2878494" cy="877077"/>
           </a:xfrm>
           <a:prstGeom prst="rect">
@@ -6519,7 +7007,7 @@
         </p:nvSpPr>
         <p:spPr>
           <a:xfrm>
-            <a:off x="2629115" y="4659623"/>
+            <a:off x="2629115" y="4447186"/>
             <a:ext cx="933061" cy="338554"/>
           </a:xfrm>
           <a:prstGeom prst="rect">
@@ -6550,7 +7038,7 @@
         </p:nvSpPr>
         <p:spPr>
           <a:xfrm>
-            <a:off x="2682373" y="5167411"/>
+            <a:off x="2682373" y="4954974"/>
             <a:ext cx="1063690" cy="345233"/>
           </a:xfrm>
           <a:prstGeom prst="rect">
@@ -6596,7 +7084,7 @@
         </p:nvSpPr>
         <p:spPr>
           <a:xfrm>
-            <a:off x="2808786" y="5143312"/>
+            <a:off x="2808786" y="4930875"/>
             <a:ext cx="810863" cy="369332"/>
           </a:xfrm>
           <a:prstGeom prst="rect">
@@ -6625,7 +7113,7 @@
         </p:nvSpPr>
         <p:spPr>
           <a:xfrm>
-            <a:off x="4037701" y="5143312"/>
+            <a:off x="4037701" y="4930875"/>
             <a:ext cx="1063690" cy="345233"/>
           </a:xfrm>
           <a:prstGeom prst="rect">
@@ -6671,7 +7159,7 @@
         </p:nvSpPr>
         <p:spPr>
           <a:xfrm>
-            <a:off x="4147499" y="5143312"/>
+            <a:off x="4147499" y="4930875"/>
             <a:ext cx="846707" cy="369332"/>
           </a:xfrm>
           <a:prstGeom prst="rect">
@@ -6700,7 +7188,7 @@
         </p:nvSpPr>
         <p:spPr>
           <a:xfrm>
-            <a:off x="5639400" y="4828900"/>
+            <a:off x="5639400" y="4616463"/>
             <a:ext cx="1319120" cy="877077"/>
           </a:xfrm>
           <a:prstGeom prst="rect">
@@ -6746,7 +7234,7 @@
         </p:nvSpPr>
         <p:spPr>
           <a:xfrm>
-            <a:off x="5751367" y="4659623"/>
+            <a:off x="5751367" y="4447186"/>
             <a:ext cx="933061" cy="338554"/>
           </a:xfrm>
           <a:prstGeom prst="rect">
@@ -6777,7 +7265,7 @@
         </p:nvSpPr>
         <p:spPr>
           <a:xfrm>
-            <a:off x="5775643" y="5152191"/>
+            <a:off x="5775643" y="4939754"/>
             <a:ext cx="1055161" cy="369332"/>
           </a:xfrm>
           <a:prstGeom prst="rect">
@@ -6807,7 +7295,7 @@
         </p:nvSpPr>
         <p:spPr>
           <a:xfrm>
-            <a:off x="7196230" y="4827040"/>
+            <a:off x="7196230" y="4614603"/>
             <a:ext cx="1319120" cy="877077"/>
           </a:xfrm>
           <a:prstGeom prst="rect">
@@ -6853,7 +7341,7 @@
         </p:nvSpPr>
         <p:spPr>
           <a:xfrm>
-            <a:off x="7308197" y="4657763"/>
+            <a:off x="7308197" y="4445326"/>
             <a:ext cx="933061" cy="338554"/>
           </a:xfrm>
           <a:prstGeom prst="rect">
@@ -6884,7 +7372,7 @@
         </p:nvSpPr>
         <p:spPr>
           <a:xfrm>
-            <a:off x="7571642" y="5152191"/>
+            <a:off x="7571642" y="4939754"/>
             <a:ext cx="563359" cy="369332"/>
           </a:xfrm>
           <a:prstGeom prst="rect">
@@ -6913,7 +7401,7 @@
         </p:nvSpPr>
         <p:spPr>
           <a:xfrm>
-            <a:off x="628650" y="4827040"/>
+            <a:off x="628650" y="4614603"/>
             <a:ext cx="1648850" cy="877077"/>
           </a:xfrm>
           <a:prstGeom prst="rect">
@@ -6959,7 +7447,7 @@
         </p:nvSpPr>
         <p:spPr>
           <a:xfrm>
-            <a:off x="795649" y="4657763"/>
+            <a:off x="795649" y="4445326"/>
             <a:ext cx="875710" cy="338554"/>
           </a:xfrm>
           <a:prstGeom prst="rect">
@@ -6990,7 +7478,7 @@
         </p:nvSpPr>
         <p:spPr>
           <a:xfrm>
-            <a:off x="912830" y="5119213"/>
+            <a:off x="912830" y="4906776"/>
             <a:ext cx="1080489" cy="369332"/>
           </a:xfrm>
           <a:prstGeom prst="rect">
@@ -7020,7 +7508,7 @@
         </p:nvSpPr>
         <p:spPr>
           <a:xfrm>
-            <a:off x="912830" y="4087628"/>
+            <a:off x="912830" y="3875191"/>
             <a:ext cx="1119851" cy="354563"/>
           </a:xfrm>
           <a:prstGeom prst="flowChartMerge">
@@ -7063,7 +7551,7 @@
         </p:nvSpPr>
         <p:spPr>
           <a:xfrm>
-            <a:off x="6159708" y="3234760"/>
+            <a:off x="6159708" y="3022323"/>
             <a:ext cx="1646855" cy="345233"/>
           </a:xfrm>
           <a:prstGeom prst="rect">
@@ -7109,7 +7597,7 @@
         </p:nvSpPr>
         <p:spPr>
           <a:xfrm>
-            <a:off x="6268200" y="3222710"/>
+            <a:off x="6268200" y="3010273"/>
             <a:ext cx="1455527" cy="369332"/>
           </a:xfrm>
           <a:prstGeom prst="rect">
@@ -7138,7 +7626,7 @@
         </p:nvSpPr>
         <p:spPr>
           <a:xfrm>
-            <a:off x="1418054" y="3234881"/>
+            <a:off x="1418054" y="3022444"/>
             <a:ext cx="1646855" cy="345233"/>
           </a:xfrm>
           <a:prstGeom prst="rect">
@@ -7184,7 +7672,7 @@
         </p:nvSpPr>
         <p:spPr>
           <a:xfrm>
-            <a:off x="1973619" y="3234881"/>
+            <a:off x="1973619" y="3022444"/>
             <a:ext cx="535724" cy="369332"/>
           </a:xfrm>
           <a:prstGeom prst="rect">
@@ -7213,7 +7701,7 @@
         </p:nvSpPr>
         <p:spPr>
           <a:xfrm>
-            <a:off x="3802562" y="3222710"/>
+            <a:off x="3802562" y="3010273"/>
             <a:ext cx="1646855" cy="345233"/>
           </a:xfrm>
           <a:prstGeom prst="rect">
@@ -7259,7 +7747,7 @@
         </p:nvSpPr>
         <p:spPr>
           <a:xfrm>
-            <a:off x="4202637" y="3222710"/>
+            <a:off x="4202637" y="3010273"/>
             <a:ext cx="846707" cy="369332"/>
           </a:xfrm>
           <a:prstGeom prst="rect">
@@ -7288,7 +7776,7 @@
         </p:nvSpPr>
         <p:spPr>
           <a:xfrm>
-            <a:off x="3396469" y="4087628"/>
+            <a:off x="3396469" y="3875191"/>
             <a:ext cx="1119851" cy="354563"/>
           </a:xfrm>
           <a:prstGeom prst="flowChartMerge">
@@ -7331,7 +7819,7 @@
         </p:nvSpPr>
         <p:spPr>
           <a:xfrm>
-            <a:off x="5657971" y="4087627"/>
+            <a:off x="5657971" y="3875190"/>
             <a:ext cx="1119851" cy="354563"/>
           </a:xfrm>
           <a:prstGeom prst="flowChartMerge">
@@ -7374,7 +7862,7 @@
         </p:nvSpPr>
         <p:spPr>
           <a:xfrm>
-            <a:off x="7293397" y="4087627"/>
+            <a:off x="7293397" y="3875190"/>
             <a:ext cx="1119851" cy="354563"/>
           </a:xfrm>
           <a:prstGeom prst="flowChartMerge">
@@ -7417,7 +7905,7 @@
         </p:nvSpPr>
         <p:spPr>
           <a:xfrm>
-            <a:off x="929629" y="5143311"/>
+            <a:off x="929629" y="4930874"/>
             <a:ext cx="1063690" cy="345233"/>
           </a:xfrm>
           <a:prstGeom prst="rect">
@@ -7463,7 +7951,7 @@
         </p:nvSpPr>
         <p:spPr>
           <a:xfrm>
-            <a:off x="5767114" y="5161551"/>
+            <a:off x="5767114" y="4949114"/>
             <a:ext cx="1063690" cy="345233"/>
           </a:xfrm>
           <a:prstGeom prst="rect">
@@ -7509,7 +7997,7 @@
         </p:nvSpPr>
         <p:spPr>
           <a:xfrm>
-            <a:off x="7321476" y="5130687"/>
+            <a:off x="7321476" y="4918250"/>
             <a:ext cx="1063690" cy="345233"/>
           </a:xfrm>
           <a:prstGeom prst="rect">
@@ -7547,6 +8035,230 @@
           </a:p>
         </p:txBody>
       </p:sp>
+      <p:sp>
+        <p:nvSpPr>
+          <p:cNvPr id="5" name="Textfeld 4"/>
+          <p:cNvSpPr txBox="1"/>
+          <p:nvPr/>
+        </p:nvSpPr>
+        <p:spPr>
+          <a:xfrm>
+            <a:off x="1334736" y="5568281"/>
+            <a:ext cx="276038" cy="716093"/>
+          </a:xfrm>
+          <a:prstGeom prst="rect">
+            <a:avLst/>
+          </a:prstGeom>
+          <a:noFill/>
+        </p:spPr>
+        <p:txBody>
+          <a:bodyPr wrap="none" rtlCol="0">
+            <a:spAutoFit/>
+          </a:bodyPr>
+          <a:lstStyle/>
+          <a:p>
+            <a:pPr>
+              <a:lnSpc>
+                <a:spcPts val="1500"/>
+              </a:lnSpc>
+            </a:pPr>
+            <a:r>
+              <a:rPr lang="de-DE" sz="2800" dirty="0"/>
+              <a:t>.</a:t>
+            </a:r>
+          </a:p>
+          <a:p>
+            <a:pPr>
+              <a:lnSpc>
+                <a:spcPts val="1500"/>
+              </a:lnSpc>
+            </a:pPr>
+            <a:r>
+              <a:rPr lang="de-DE" sz="2800" dirty="0"/>
+              <a:t>.</a:t>
+            </a:r>
+          </a:p>
+          <a:p>
+            <a:pPr>
+              <a:lnSpc>
+                <a:spcPts val="1500"/>
+              </a:lnSpc>
+            </a:pPr>
+            <a:r>
+              <a:rPr lang="de-DE" sz="2800" dirty="0"/>
+              <a:t>.</a:t>
+            </a:r>
+          </a:p>
+        </p:txBody>
+      </p:sp>
+      <p:sp>
+        <p:nvSpPr>
+          <p:cNvPr id="50" name="Textfeld 49"/>
+          <p:cNvSpPr txBox="1"/>
+          <p:nvPr/>
+        </p:nvSpPr>
+        <p:spPr>
+          <a:xfrm>
+            <a:off x="3818375" y="5568281"/>
+            <a:ext cx="276038" cy="716093"/>
+          </a:xfrm>
+          <a:prstGeom prst="rect">
+            <a:avLst/>
+          </a:prstGeom>
+          <a:noFill/>
+        </p:spPr>
+        <p:txBody>
+          <a:bodyPr wrap="none" rtlCol="0">
+            <a:spAutoFit/>
+          </a:bodyPr>
+          <a:lstStyle/>
+          <a:p>
+            <a:pPr>
+              <a:lnSpc>
+                <a:spcPts val="1500"/>
+              </a:lnSpc>
+            </a:pPr>
+            <a:r>
+              <a:rPr lang="de-DE" sz="2800" dirty="0"/>
+              <a:t>.</a:t>
+            </a:r>
+          </a:p>
+          <a:p>
+            <a:pPr>
+              <a:lnSpc>
+                <a:spcPts val="1500"/>
+              </a:lnSpc>
+            </a:pPr>
+            <a:r>
+              <a:rPr lang="de-DE" sz="2800" dirty="0"/>
+              <a:t>.</a:t>
+            </a:r>
+          </a:p>
+          <a:p>
+            <a:pPr>
+              <a:lnSpc>
+                <a:spcPts val="1500"/>
+              </a:lnSpc>
+            </a:pPr>
+            <a:r>
+              <a:rPr lang="de-DE" sz="2800" dirty="0"/>
+              <a:t>.</a:t>
+            </a:r>
+          </a:p>
+        </p:txBody>
+      </p:sp>
+      <p:sp>
+        <p:nvSpPr>
+          <p:cNvPr id="51" name="Textfeld 50"/>
+          <p:cNvSpPr txBox="1"/>
+          <p:nvPr/>
+        </p:nvSpPr>
+        <p:spPr>
+          <a:xfrm>
+            <a:off x="6079877" y="5568281"/>
+            <a:ext cx="276038" cy="716093"/>
+          </a:xfrm>
+          <a:prstGeom prst="rect">
+            <a:avLst/>
+          </a:prstGeom>
+          <a:noFill/>
+        </p:spPr>
+        <p:txBody>
+          <a:bodyPr wrap="none" rtlCol="0">
+            <a:spAutoFit/>
+          </a:bodyPr>
+          <a:lstStyle/>
+          <a:p>
+            <a:pPr>
+              <a:lnSpc>
+                <a:spcPts val="1500"/>
+              </a:lnSpc>
+            </a:pPr>
+            <a:r>
+              <a:rPr lang="de-DE" sz="2800" dirty="0"/>
+              <a:t>.</a:t>
+            </a:r>
+          </a:p>
+          <a:p>
+            <a:pPr>
+              <a:lnSpc>
+                <a:spcPts val="1500"/>
+              </a:lnSpc>
+            </a:pPr>
+            <a:r>
+              <a:rPr lang="de-DE" sz="2800" dirty="0"/>
+              <a:t>.</a:t>
+            </a:r>
+          </a:p>
+          <a:p>
+            <a:pPr>
+              <a:lnSpc>
+                <a:spcPts val="1500"/>
+              </a:lnSpc>
+            </a:pPr>
+            <a:r>
+              <a:rPr lang="de-DE" sz="2800" dirty="0"/>
+              <a:t>.</a:t>
+            </a:r>
+          </a:p>
+        </p:txBody>
+      </p:sp>
+      <p:sp>
+        <p:nvSpPr>
+          <p:cNvPr id="52" name="Textfeld 51"/>
+          <p:cNvSpPr txBox="1"/>
+          <p:nvPr/>
+        </p:nvSpPr>
+        <p:spPr>
+          <a:xfrm>
+            <a:off x="7701360" y="5567130"/>
+            <a:ext cx="276038" cy="716093"/>
+          </a:xfrm>
+          <a:prstGeom prst="rect">
+            <a:avLst/>
+          </a:prstGeom>
+          <a:noFill/>
+        </p:spPr>
+        <p:txBody>
+          <a:bodyPr wrap="none" rtlCol="0">
+            <a:spAutoFit/>
+          </a:bodyPr>
+          <a:lstStyle/>
+          <a:p>
+            <a:pPr>
+              <a:lnSpc>
+                <a:spcPts val="1500"/>
+              </a:lnSpc>
+            </a:pPr>
+            <a:r>
+              <a:rPr lang="de-DE" sz="2800" dirty="0"/>
+              <a:t>.</a:t>
+            </a:r>
+          </a:p>
+          <a:p>
+            <a:pPr>
+              <a:lnSpc>
+                <a:spcPts val="1500"/>
+              </a:lnSpc>
+            </a:pPr>
+            <a:r>
+              <a:rPr lang="de-DE" sz="2800" dirty="0"/>
+              <a:t>.</a:t>
+            </a:r>
+          </a:p>
+          <a:p>
+            <a:pPr>
+              <a:lnSpc>
+                <a:spcPts val="1500"/>
+              </a:lnSpc>
+            </a:pPr>
+            <a:r>
+              <a:rPr lang="de-DE" sz="2800" dirty="0"/>
+              <a:t>.</a:t>
+            </a:r>
+          </a:p>
+        </p:txBody>
+      </p:sp>
     </p:spTree>
     <p:extLst>
       <p:ext uri="{BB962C8B-B14F-4D97-AF65-F5344CB8AC3E}">
@@ -7560,7 +8272,7 @@
 </p:sld>
 </file>
 
-<file path=ppt/slides/slide8.xml><?xml version="1.0" encoding="utf-8"?>
+<file path=ppt/slides/slide9.xml><?xml version="1.0" encoding="utf-8"?>
 <p:sld xmlns:a="http://schemas.openxmlformats.org/drawingml/2006/main" xmlns:r="http://schemas.openxmlformats.org/officeDocument/2006/relationships" xmlns:p="http://schemas.openxmlformats.org/presentationml/2006/main">
   <p:cSld>
     <p:spTree>
@@ -7656,157 +8368,6 @@
     <p:extLst>
       <p:ext uri="{BB962C8B-B14F-4D97-AF65-F5344CB8AC3E}">
         <p14:creationId xmlns:p14="http://schemas.microsoft.com/office/powerpoint/2010/main" val="40144356"/>
-      </p:ext>
-    </p:extLst>
-  </p:cSld>
-  <p:clrMapOvr>
-    <a:masterClrMapping/>
-  </p:clrMapOvr>
-</p:sld>
-</file>
-
-<file path=ppt/slides/slide9.xml><?xml version="1.0" encoding="utf-8"?>
-<p:sld xmlns:a="http://schemas.openxmlformats.org/drawingml/2006/main" xmlns:r="http://schemas.openxmlformats.org/officeDocument/2006/relationships" xmlns:p="http://schemas.openxmlformats.org/presentationml/2006/main">
-  <p:cSld>
-    <p:spTree>
-      <p:nvGrpSpPr>
-        <p:cNvPr id="1" name=""/>
-        <p:cNvGrpSpPr/>
-        <p:nvPr/>
-      </p:nvGrpSpPr>
-      <p:grpSpPr>
-        <a:xfrm>
-          <a:off x="0" y="0"/>
-          <a:ext cx="0" cy="0"/>
-          <a:chOff x="0" y="0"/>
-          <a:chExt cx="0" cy="0"/>
-        </a:xfrm>
-      </p:grpSpPr>
-      <p:sp>
-        <p:nvSpPr>
-          <p:cNvPr id="3" name="Titel 2"/>
-          <p:cNvSpPr>
-            <a:spLocks noGrp="1"/>
-          </p:cNvSpPr>
-          <p:nvPr>
-            <p:ph type="title"/>
-          </p:nvPr>
-        </p:nvSpPr>
-        <p:spPr/>
-        <p:txBody>
-          <a:bodyPr/>
-          <a:lstStyle/>
-          <a:p>
-            <a:r>
-              <a:rPr lang="de-DE" dirty="0"/>
-              <a:t>Implementierung</a:t>
-            </a:r>
-          </a:p>
-        </p:txBody>
-      </p:sp>
-      <p:graphicFrame>
-        <p:nvGraphicFramePr>
-          <p:cNvPr id="4" name="Diagramm 3"/>
-          <p:cNvGraphicFramePr>
-            <a:graphicFrameLocks/>
-          </p:cNvGraphicFramePr>
-          <p:nvPr>
-            <p:extLst>
-              <p:ext uri="{D42A27DB-BD31-4B8C-83A1-F6EECF244321}">
-                <p14:modId xmlns:p14="http://schemas.microsoft.com/office/powerpoint/2010/main" val="1491071590"/>
-              </p:ext>
-            </p:extLst>
-          </p:nvPr>
-        </p:nvGraphicFramePr>
-        <p:xfrm>
-          <a:off x="4097178" y="1797803"/>
-          <a:ext cx="4057777" cy="3789608"/>
-        </p:xfrm>
-        <a:graphic>
-          <a:graphicData uri="http://schemas.openxmlformats.org/drawingml/2006/chart">
-            <c:chart xmlns:c="http://schemas.openxmlformats.org/drawingml/2006/chart" xmlns:r="http://schemas.openxmlformats.org/officeDocument/2006/relationships" r:id="rId2"/>
-          </a:graphicData>
-        </a:graphic>
-      </p:graphicFrame>
-      <p:sp>
-        <p:nvSpPr>
-          <p:cNvPr id="5" name="Textfeld 4"/>
-          <p:cNvSpPr txBox="1"/>
-          <p:nvPr/>
-        </p:nvSpPr>
-        <p:spPr>
-          <a:xfrm>
-            <a:off x="746450" y="3092442"/>
-            <a:ext cx="2828467" cy="1200329"/>
-          </a:xfrm>
-          <a:prstGeom prst="rect">
-            <a:avLst/>
-          </a:prstGeom>
-          <a:noFill/>
-        </p:spPr>
-        <p:txBody>
-          <a:bodyPr wrap="none" rtlCol="0">
-            <a:spAutoFit/>
-          </a:bodyPr>
-          <a:lstStyle/>
-          <a:p>
-            <a:pPr marL="285750" indent="-285750">
-              <a:buClr>
-                <a:srgbClr val="80A5AB"/>
-              </a:buClr>
-              <a:buFont typeface="Wingdings" panose="05000000000000000000" pitchFamily="2" charset="2"/>
-              <a:buChar char="§"/>
-            </a:pPr>
-            <a:r>
-              <a:rPr lang="de-DE" dirty="0"/>
-              <a:t>105 Klassen</a:t>
-            </a:r>
-          </a:p>
-          <a:p>
-            <a:pPr marL="285750" indent="-285750">
-              <a:buClr>
-                <a:srgbClr val="80A5AB"/>
-              </a:buClr>
-              <a:buFont typeface="Wingdings" panose="05000000000000000000" pitchFamily="2" charset="2"/>
-              <a:buChar char="§"/>
-            </a:pPr>
-            <a:r>
-              <a:rPr lang="de-DE" dirty="0"/>
-              <a:t>37 Interfaces</a:t>
-            </a:r>
-          </a:p>
-          <a:p>
-            <a:pPr marL="285750" indent="-285750">
-              <a:buClr>
-                <a:srgbClr val="80A5AB"/>
-              </a:buClr>
-              <a:buFont typeface="Wingdings" panose="05000000000000000000" pitchFamily="2" charset="2"/>
-              <a:buChar char="§"/>
-            </a:pPr>
-            <a:r>
-              <a:rPr lang="de-DE" dirty="0"/>
-              <a:t>9043 Zeilen Code</a:t>
-            </a:r>
-          </a:p>
-          <a:p>
-            <a:pPr marL="285750" indent="-285750">
-              <a:buClr>
-                <a:srgbClr val="80A5AB"/>
-              </a:buClr>
-              <a:buFont typeface="Wingdings" panose="05000000000000000000" pitchFamily="2" charset="2"/>
-              <a:buChar char="§"/>
-            </a:pPr>
-            <a:r>
-              <a:rPr lang="de-DE" dirty="0"/>
-              <a:t>3070 Zeilen Kommentare</a:t>
-            </a:r>
-          </a:p>
-        </p:txBody>
-      </p:sp>
-    </p:spTree>
-    <p:extLst>
-      <p:ext uri="{BB962C8B-B14F-4D97-AF65-F5344CB8AC3E}">
-        <p14:creationId xmlns:p14="http://schemas.microsoft.com/office/powerpoint/2010/main" val="21897961"/>
       </p:ext>
     </p:extLst>
   </p:cSld>

</xml_diff>